<commit_message>
Finalized presentation, added more figures, and added some new graphing utilities in the code. Also minor bugfixes. Again.
</commit_message>
<xml_diff>
--- a/doc/presentation.pptx
+++ b/doc/presentation.pptx
@@ -7,19 +7,39 @@
     <p:sldMasterId id="2147483672" r:id="rId3"/>
   </p:sldMasterIdLst>
   <p:handoutMasterIdLst>
-    <p:handoutMasterId r:id="rId14"/>
+    <p:handoutMasterId r:id="rId34"/>
   </p:handoutMasterIdLst>
   <p:sldIdLst>
     <p:sldId id="259" r:id="rId4"/>
     <p:sldId id="262" r:id="rId5"/>
     <p:sldId id="260" r:id="rId6"/>
-    <p:sldId id="258" r:id="rId7"/>
-    <p:sldId id="264" r:id="rId8"/>
-    <p:sldId id="266" r:id="rId9"/>
-    <p:sldId id="265" r:id="rId10"/>
-    <p:sldId id="267" r:id="rId11"/>
-    <p:sldId id="268" r:id="rId12"/>
-    <p:sldId id="269" r:id="rId13"/>
+    <p:sldId id="278" r:id="rId7"/>
+    <p:sldId id="258" r:id="rId8"/>
+    <p:sldId id="279" r:id="rId9"/>
+    <p:sldId id="264" r:id="rId10"/>
+    <p:sldId id="266" r:id="rId11"/>
+    <p:sldId id="265" r:id="rId12"/>
+    <p:sldId id="267" r:id="rId13"/>
+    <p:sldId id="268" r:id="rId14"/>
+    <p:sldId id="269" r:id="rId15"/>
+    <p:sldId id="289" r:id="rId16"/>
+    <p:sldId id="290" r:id="rId17"/>
+    <p:sldId id="280" r:id="rId18"/>
+    <p:sldId id="270" r:id="rId19"/>
+    <p:sldId id="275" r:id="rId20"/>
+    <p:sldId id="271" r:id="rId21"/>
+    <p:sldId id="276" r:id="rId22"/>
+    <p:sldId id="273" r:id="rId23"/>
+    <p:sldId id="277" r:id="rId24"/>
+    <p:sldId id="291" r:id="rId25"/>
+    <p:sldId id="293" r:id="rId26"/>
+    <p:sldId id="281" r:id="rId27"/>
+    <p:sldId id="282" r:id="rId28"/>
+    <p:sldId id="283" r:id="rId29"/>
+    <p:sldId id="285" r:id="rId30"/>
+    <p:sldId id="286" r:id="rId31"/>
+    <p:sldId id="287" r:id="rId32"/>
+    <p:sldId id="288" r:id="rId33"/>
   </p:sldIdLst>
   <p:sldSz cx="9144000" cy="5143500" type="screen16x9"/>
   <p:notesSz cx="6858000" cy="9144000"/>
@@ -223,7 +243,7 @@
           <a:p>
             <a:fld id="{8258EE4D-8A6D-FE43-9221-048F51E281B9}" type="datetimeFigureOut">
               <a:rPr lang="en-US" smtClean="0"/>
-              <a:t>4/28/2018</a:t>
+              <a:t>4/29/2018</a:t>
             </a:fld>
             <a:endParaRPr lang="en-US"/>
           </a:p>
@@ -4858,6 +4878,441 @@
             <a:pPr algn="ctr"/>
             <a:r>
               <a:rPr lang="en-US" dirty="0"/>
+              <a:t>Example 2</a:t>
+            </a:r>
+          </a:p>
+        </p:txBody>
+      </p:sp>
+      <p:sp>
+        <p:nvSpPr>
+          <p:cNvPr id="3" name="Text Placeholder 2">
+            <a:extLst>
+              <a:ext uri="{FF2B5EF4-FFF2-40B4-BE49-F238E27FC236}">
+                <a16:creationId xmlns:a16="http://schemas.microsoft.com/office/drawing/2014/main" id="{28A202AE-9865-409D-BCB7-FA4FF773E1B7}"/>
+              </a:ext>
+            </a:extLst>
+          </p:cNvPr>
+          <p:cNvSpPr>
+            <a:spLocks noGrp="1"/>
+          </p:cNvSpPr>
+          <p:nvPr>
+            <p:ph type="body" sz="quarter" idx="11"/>
+          </p:nvPr>
+        </p:nvSpPr>
+        <p:spPr/>
+        <p:txBody>
+          <a:bodyPr/>
+          <a:lstStyle/>
+          <a:p>
+            <a:r>
+              <a:rPr lang="en-US" dirty="0"/>
+              <a:t>More routes added</a:t>
+            </a:r>
+          </a:p>
+        </p:txBody>
+      </p:sp>
+      <p:pic>
+        <p:nvPicPr>
+          <p:cNvPr id="6" name="Picture 5">
+            <a:extLst>
+              <a:ext uri="{FF2B5EF4-FFF2-40B4-BE49-F238E27FC236}">
+                <a16:creationId xmlns:a16="http://schemas.microsoft.com/office/drawing/2014/main" id="{609AADF7-6C3B-4CDA-B784-74EBE0883224}"/>
+              </a:ext>
+            </a:extLst>
+          </p:cNvPr>
+          <p:cNvPicPr>
+            <a:picLocks noChangeAspect="1"/>
+          </p:cNvPicPr>
+          <p:nvPr/>
+        </p:nvPicPr>
+        <p:blipFill>
+          <a:blip r:embed="rId2"/>
+          <a:stretch>
+            <a:fillRect/>
+          </a:stretch>
+        </p:blipFill>
+        <p:spPr>
+          <a:xfrm>
+            <a:off x="6946228" y="935922"/>
+            <a:ext cx="1828800" cy="1592521"/>
+          </a:xfrm>
+          <a:prstGeom prst="rect">
+            <a:avLst/>
+          </a:prstGeom>
+        </p:spPr>
+      </p:pic>
+      <p:pic>
+        <p:nvPicPr>
+          <p:cNvPr id="4" name="Picture 3">
+            <a:extLst>
+              <a:ext uri="{FF2B5EF4-FFF2-40B4-BE49-F238E27FC236}">
+                <a16:creationId xmlns:a16="http://schemas.microsoft.com/office/drawing/2014/main" id="{4F9A6B6D-DB65-414C-BB82-F9EE80452BFD}"/>
+              </a:ext>
+            </a:extLst>
+          </p:cNvPr>
+          <p:cNvPicPr>
+            <a:picLocks noChangeAspect="1"/>
+          </p:cNvPicPr>
+          <p:nvPr/>
+        </p:nvPicPr>
+        <p:blipFill>
+          <a:blip r:embed="rId3"/>
+          <a:stretch>
+            <a:fillRect/>
+          </a:stretch>
+        </p:blipFill>
+        <p:spPr>
+          <a:xfrm>
+            <a:off x="0" y="2725005"/>
+            <a:ext cx="9144000" cy="2418495"/>
+          </a:xfrm>
+          <a:prstGeom prst="rect">
+            <a:avLst/>
+          </a:prstGeom>
+        </p:spPr>
+      </p:pic>
+    </p:spTree>
+    <p:extLst>
+      <p:ext uri="{BB962C8B-B14F-4D97-AF65-F5344CB8AC3E}">
+        <p14:creationId xmlns:p14="http://schemas.microsoft.com/office/powerpoint/2010/main" val="4245807230"/>
+      </p:ext>
+    </p:extLst>
+  </p:cSld>
+  <p:clrMapOvr>
+    <a:masterClrMapping/>
+  </p:clrMapOvr>
+</p:sld>
+</file>
+
+<file path=ppt/slides/slide11.xml><?xml version="1.0" encoding="utf-8"?>
+<p:sld xmlns:a="http://schemas.openxmlformats.org/drawingml/2006/main" xmlns:r="http://schemas.openxmlformats.org/officeDocument/2006/relationships" xmlns:p="http://schemas.openxmlformats.org/presentationml/2006/main">
+  <p:cSld>
+    <p:spTree>
+      <p:nvGrpSpPr>
+        <p:cNvPr id="1" name=""/>
+        <p:cNvGrpSpPr/>
+        <p:nvPr/>
+      </p:nvGrpSpPr>
+      <p:grpSpPr>
+        <a:xfrm>
+          <a:off x="0" y="0"/>
+          <a:ext cx="0" cy="0"/>
+          <a:chOff x="0" y="0"/>
+          <a:chExt cx="0" cy="0"/>
+        </a:xfrm>
+      </p:grpSpPr>
+      <p:sp>
+        <p:nvSpPr>
+          <p:cNvPr id="2" name="Text Placeholder 1">
+            <a:extLst>
+              <a:ext uri="{FF2B5EF4-FFF2-40B4-BE49-F238E27FC236}">
+                <a16:creationId xmlns:a16="http://schemas.microsoft.com/office/drawing/2014/main" id="{ADFB35E9-CC85-4222-B528-A8EC5746E9C3}"/>
+              </a:ext>
+            </a:extLst>
+          </p:cNvPr>
+          <p:cNvSpPr>
+            <a:spLocks noGrp="1"/>
+          </p:cNvSpPr>
+          <p:nvPr>
+            <p:ph type="body" sz="quarter" idx="10"/>
+          </p:nvPr>
+        </p:nvSpPr>
+        <p:spPr/>
+        <p:txBody>
+          <a:bodyPr/>
+          <a:lstStyle/>
+          <a:p>
+            <a:pPr algn="ctr"/>
+            <a:r>
+              <a:rPr lang="en-US" dirty="0"/>
+              <a:t>Example 3</a:t>
+            </a:r>
+          </a:p>
+        </p:txBody>
+      </p:sp>
+      <p:sp>
+        <p:nvSpPr>
+          <p:cNvPr id="3" name="Text Placeholder 2">
+            <a:extLst>
+              <a:ext uri="{FF2B5EF4-FFF2-40B4-BE49-F238E27FC236}">
+                <a16:creationId xmlns:a16="http://schemas.microsoft.com/office/drawing/2014/main" id="{CAE15260-3969-4A3E-93CB-F0D1C7E8B4FA}"/>
+              </a:ext>
+            </a:extLst>
+          </p:cNvPr>
+          <p:cNvSpPr>
+            <a:spLocks noGrp="1"/>
+          </p:cNvSpPr>
+          <p:nvPr>
+            <p:ph type="body" sz="quarter" idx="11"/>
+          </p:nvPr>
+        </p:nvSpPr>
+        <p:spPr>
+          <a:xfrm>
+            <a:off x="2674619" y="1022633"/>
+            <a:ext cx="6294121" cy="3291536"/>
+          </a:xfrm>
+        </p:spPr>
+        <p:txBody>
+          <a:bodyPr/>
+          <a:lstStyle/>
+          <a:p>
+            <a:pPr lvl="1"/>
+            <a:r>
+              <a:rPr lang="en-US" dirty="0"/>
+              <a:t>Sending node D -&gt; G again</a:t>
+            </a:r>
+          </a:p>
+          <a:p>
+            <a:pPr lvl="1"/>
+            <a:r>
+              <a:rPr lang="en-US" dirty="0"/>
+              <a:t>Node E has been moved, breaking links</a:t>
+            </a:r>
+          </a:p>
+          <a:p>
+            <a:endParaRPr lang="en-US" dirty="0"/>
+          </a:p>
+          <a:p>
+            <a:r>
+              <a:rPr lang="en-US" dirty="0"/>
+              <a:t>D tries </a:t>
+            </a:r>
+            <a:r>
+              <a:rPr lang="en-US" dirty="0">
+                <a:solidFill>
+                  <a:srgbClr val="5FDF41"/>
+                </a:solidFill>
+                <a:effectLst>
+                  <a:outerShdw blurRad="38100" dist="38100" dir="2700000" algn="tl">
+                    <a:srgbClr val="000000">
+                      <a:alpha val="43137"/>
+                    </a:srgbClr>
+                  </a:outerShdw>
+                </a:effectLst>
+              </a:rPr>
+              <a:t>sending</a:t>
+            </a:r>
+            <a:r>
+              <a:rPr lang="en-US" dirty="0"/>
+              <a:t> normally</a:t>
+            </a:r>
+          </a:p>
+          <a:p>
+            <a:r>
+              <a:rPr lang="en-US" dirty="0"/>
+              <a:t>A can’t reach E anymore, so replies with </a:t>
+            </a:r>
+            <a:r>
+              <a:rPr lang="en-US" b="1" dirty="0">
+                <a:solidFill>
+                  <a:srgbClr val="FF0000"/>
+                </a:solidFill>
+                <a:effectLst>
+                  <a:outerShdw blurRad="38100" dist="38100" dir="2700000" algn="tl">
+                    <a:srgbClr val="000000">
+                      <a:alpha val="43137"/>
+                    </a:srgbClr>
+                  </a:outerShdw>
+                </a:effectLst>
+              </a:rPr>
+              <a:t>RERR</a:t>
+            </a:r>
+          </a:p>
+          <a:p>
+            <a:r>
+              <a:rPr lang="en-US" dirty="0"/>
+              <a:t>A now knows no routes, so must </a:t>
+            </a:r>
+            <a:r>
+              <a:rPr lang="en-US" dirty="0">
+                <a:solidFill>
+                  <a:srgbClr val="00B0F0"/>
+                </a:solidFill>
+                <a:effectLst>
+                  <a:outerShdw blurRad="38100" dist="38100" dir="2700000" algn="tl">
+                    <a:srgbClr val="000000">
+                      <a:alpha val="43137"/>
+                    </a:srgbClr>
+                  </a:outerShdw>
+                </a:effectLst>
+              </a:rPr>
+              <a:t>flood</a:t>
+            </a:r>
+          </a:p>
+          <a:p>
+            <a:r>
+              <a:rPr lang="en-US" dirty="0"/>
+              <a:t>C knows a route to G so </a:t>
+            </a:r>
+            <a:r>
+              <a:rPr lang="en-US" dirty="0">
+                <a:solidFill>
+                  <a:srgbClr val="0202BE"/>
+                </a:solidFill>
+                <a:effectLst>
+                  <a:outerShdw blurRad="38100" dist="38100" dir="2700000" algn="tl">
+                    <a:srgbClr val="000000">
+                      <a:alpha val="43137"/>
+                    </a:srgbClr>
+                  </a:outerShdw>
+                </a:effectLst>
+              </a:rPr>
+              <a:t>replies</a:t>
+            </a:r>
+          </a:p>
+          <a:p>
+            <a:r>
+              <a:rPr lang="en-US" dirty="0"/>
+              <a:t>D </a:t>
+            </a:r>
+            <a:r>
+              <a:rPr lang="en-US" dirty="0">
+                <a:solidFill>
+                  <a:srgbClr val="5FDF41"/>
+                </a:solidFill>
+                <a:effectLst>
+                  <a:outerShdw blurRad="38100" dist="38100" dir="2700000" algn="tl">
+                    <a:srgbClr val="000000">
+                      <a:alpha val="43137"/>
+                    </a:srgbClr>
+                  </a:outerShdw>
+                </a:effectLst>
+              </a:rPr>
+              <a:t>sends</a:t>
+            </a:r>
+            <a:r>
+              <a:rPr lang="en-US" dirty="0"/>
+              <a:t> to G</a:t>
+            </a:r>
+            <a:endParaRPr lang="en-US" b="1" dirty="0">
+              <a:solidFill>
+                <a:srgbClr val="0202BE"/>
+              </a:solidFill>
+              <a:effectLst>
+                <a:outerShdw blurRad="38100" dist="38100" dir="2700000" algn="tl">
+                  <a:srgbClr val="000000">
+                    <a:alpha val="43137"/>
+                  </a:srgbClr>
+                </a:outerShdw>
+              </a:effectLst>
+            </a:endParaRPr>
+          </a:p>
+        </p:txBody>
+      </p:sp>
+      <p:pic>
+        <p:nvPicPr>
+          <p:cNvPr id="14" name="Picture 13">
+            <a:extLst>
+              <a:ext uri="{FF2B5EF4-FFF2-40B4-BE49-F238E27FC236}">
+                <a16:creationId xmlns:a16="http://schemas.microsoft.com/office/drawing/2014/main" id="{47E6F946-6CEC-493A-BBDC-361C1BA932E5}"/>
+              </a:ext>
+            </a:extLst>
+          </p:cNvPr>
+          <p:cNvPicPr>
+            <a:picLocks noChangeAspect="1"/>
+          </p:cNvPicPr>
+          <p:nvPr/>
+        </p:nvPicPr>
+        <p:blipFill>
+          <a:blip r:embed="rId2"/>
+          <a:stretch>
+            <a:fillRect/>
+          </a:stretch>
+        </p:blipFill>
+        <p:spPr>
+          <a:xfrm>
+            <a:off x="671757" y="2954180"/>
+            <a:ext cx="1828800" cy="1592521"/>
+          </a:xfrm>
+          <a:prstGeom prst="rect">
+            <a:avLst/>
+          </a:prstGeom>
+        </p:spPr>
+      </p:pic>
+      <p:pic>
+        <p:nvPicPr>
+          <p:cNvPr id="18" name="Picture 17">
+            <a:extLst>
+              <a:ext uri="{FF2B5EF4-FFF2-40B4-BE49-F238E27FC236}">
+                <a16:creationId xmlns:a16="http://schemas.microsoft.com/office/drawing/2014/main" id="{081C35C0-38A2-431B-B76F-9D1D8121BDC3}"/>
+              </a:ext>
+            </a:extLst>
+          </p:cNvPr>
+          <p:cNvPicPr>
+            <a:picLocks noChangeAspect="1"/>
+          </p:cNvPicPr>
+          <p:nvPr/>
+        </p:nvPicPr>
+        <p:blipFill>
+          <a:blip r:embed="rId3"/>
+          <a:stretch>
+            <a:fillRect/>
+          </a:stretch>
+        </p:blipFill>
+        <p:spPr>
+          <a:xfrm>
+            <a:off x="671757" y="966787"/>
+            <a:ext cx="1828800" cy="1592521"/>
+          </a:xfrm>
+          <a:prstGeom prst="rect">
+            <a:avLst/>
+          </a:prstGeom>
+        </p:spPr>
+      </p:pic>
+    </p:spTree>
+    <p:extLst>
+      <p:ext uri="{BB962C8B-B14F-4D97-AF65-F5344CB8AC3E}">
+        <p14:creationId xmlns:p14="http://schemas.microsoft.com/office/powerpoint/2010/main" val="1996454356"/>
+      </p:ext>
+    </p:extLst>
+  </p:cSld>
+  <p:clrMapOvr>
+    <a:masterClrMapping/>
+  </p:clrMapOvr>
+</p:sld>
+</file>
+
+<file path=ppt/slides/slide12.xml><?xml version="1.0" encoding="utf-8"?>
+<p:sld xmlns:a="http://schemas.openxmlformats.org/drawingml/2006/main" xmlns:r="http://schemas.openxmlformats.org/officeDocument/2006/relationships" xmlns:p="http://schemas.openxmlformats.org/presentationml/2006/main">
+  <p:cSld>
+    <p:spTree>
+      <p:nvGrpSpPr>
+        <p:cNvPr id="1" name=""/>
+        <p:cNvGrpSpPr/>
+        <p:nvPr/>
+      </p:nvGrpSpPr>
+      <p:grpSpPr>
+        <a:xfrm>
+          <a:off x="0" y="0"/>
+          <a:ext cx="0" cy="0"/>
+          <a:chOff x="0" y="0"/>
+          <a:chExt cx="0" cy="0"/>
+        </a:xfrm>
+      </p:grpSpPr>
+      <p:sp>
+        <p:nvSpPr>
+          <p:cNvPr id="2" name="Text Placeholder 1">
+            <a:extLst>
+              <a:ext uri="{FF2B5EF4-FFF2-40B4-BE49-F238E27FC236}">
+                <a16:creationId xmlns:a16="http://schemas.microsoft.com/office/drawing/2014/main" id="{27555CB1-EAF8-4E0E-BD45-905842BFE65F}"/>
+              </a:ext>
+            </a:extLst>
+          </p:cNvPr>
+          <p:cNvSpPr>
+            <a:spLocks noGrp="1"/>
+          </p:cNvSpPr>
+          <p:nvPr>
+            <p:ph type="body" sz="quarter" idx="10"/>
+          </p:nvPr>
+        </p:nvSpPr>
+        <p:spPr/>
+        <p:txBody>
+          <a:bodyPr/>
+          <a:lstStyle/>
+          <a:p>
+            <a:pPr algn="ctr"/>
+            <a:r>
+              <a:rPr lang="en-US" dirty="0"/>
               <a:t>Example 3</a:t>
             </a:r>
           </a:p>
@@ -4989,6 +5444,1114 @@
 </p:sld>
 </file>
 
+<file path=ppt/slides/slide13.xml><?xml version="1.0" encoding="utf-8"?>
+<p:sld xmlns:a="http://schemas.openxmlformats.org/drawingml/2006/main" xmlns:r="http://schemas.openxmlformats.org/officeDocument/2006/relationships" xmlns:p="http://schemas.openxmlformats.org/presentationml/2006/main">
+  <p:cSld>
+    <p:spTree>
+      <p:nvGrpSpPr>
+        <p:cNvPr id="1" name=""/>
+        <p:cNvGrpSpPr/>
+        <p:nvPr/>
+      </p:nvGrpSpPr>
+      <p:grpSpPr>
+        <a:xfrm>
+          <a:off x="0" y="0"/>
+          <a:ext cx="0" cy="0"/>
+          <a:chOff x="0" y="0"/>
+          <a:chExt cx="0" cy="0"/>
+        </a:xfrm>
+      </p:grpSpPr>
+      <p:sp>
+        <p:nvSpPr>
+          <p:cNvPr id="2" name="Text Placeholder 1">
+            <a:extLst>
+              <a:ext uri="{FF2B5EF4-FFF2-40B4-BE49-F238E27FC236}">
+                <a16:creationId xmlns:a16="http://schemas.microsoft.com/office/drawing/2014/main" id="{ADFB35E9-CC85-4222-B528-A8EC5746E9C3}"/>
+              </a:ext>
+            </a:extLst>
+          </p:cNvPr>
+          <p:cNvSpPr>
+            <a:spLocks noGrp="1"/>
+          </p:cNvSpPr>
+          <p:nvPr>
+            <p:ph type="body" sz="quarter" idx="10"/>
+          </p:nvPr>
+        </p:nvSpPr>
+        <p:spPr/>
+        <p:txBody>
+          <a:bodyPr/>
+          <a:lstStyle/>
+          <a:p>
+            <a:pPr algn="ctr"/>
+            <a:r>
+              <a:rPr lang="en-US" dirty="0"/>
+              <a:t>Example 4</a:t>
+            </a:r>
+          </a:p>
+        </p:txBody>
+      </p:sp>
+      <p:sp>
+        <p:nvSpPr>
+          <p:cNvPr id="3" name="Text Placeholder 2">
+            <a:extLst>
+              <a:ext uri="{FF2B5EF4-FFF2-40B4-BE49-F238E27FC236}">
+                <a16:creationId xmlns:a16="http://schemas.microsoft.com/office/drawing/2014/main" id="{CAE15260-3969-4A3E-93CB-F0D1C7E8B4FA}"/>
+              </a:ext>
+            </a:extLst>
+          </p:cNvPr>
+          <p:cNvSpPr>
+            <a:spLocks noGrp="1"/>
+          </p:cNvSpPr>
+          <p:nvPr>
+            <p:ph type="body" sz="quarter" idx="11"/>
+          </p:nvPr>
+        </p:nvSpPr>
+        <p:spPr>
+          <a:xfrm>
+            <a:off x="2674619" y="1022633"/>
+            <a:ext cx="6294121" cy="3291536"/>
+          </a:xfrm>
+        </p:spPr>
+        <p:txBody>
+          <a:bodyPr/>
+          <a:lstStyle/>
+          <a:p>
+            <a:pPr lvl="1"/>
+            <a:r>
+              <a:rPr lang="en-US" dirty="0"/>
+              <a:t>Much shuffling, routes have almost all changed</a:t>
+            </a:r>
+          </a:p>
+          <a:p>
+            <a:endParaRPr lang="en-US" dirty="0"/>
+          </a:p>
+          <a:p>
+            <a:r>
+              <a:rPr lang="en-US" dirty="0"/>
+              <a:t>Multiple route </a:t>
+            </a:r>
+            <a:r>
+              <a:rPr lang="en-US" b="1" dirty="0">
+                <a:solidFill>
+                  <a:srgbClr val="FF0000"/>
+                </a:solidFill>
+                <a:effectLst>
+                  <a:outerShdw blurRad="38100" dist="38100" dir="2700000" algn="tl">
+                    <a:srgbClr val="000000">
+                      <a:alpha val="43137"/>
+                    </a:srgbClr>
+                  </a:outerShdw>
+                </a:effectLst>
+              </a:rPr>
+              <a:t>cancellations</a:t>
+            </a:r>
+          </a:p>
+          <a:p>
+            <a:r>
+              <a:rPr lang="en-US" dirty="0"/>
+              <a:t>Once C receives a </a:t>
+            </a:r>
+            <a:r>
+              <a:rPr lang="en-US" dirty="0">
+                <a:solidFill>
+                  <a:srgbClr val="0202BE"/>
+                </a:solidFill>
+                <a:effectLst>
+                  <a:outerShdw blurRad="38100" dist="38100" dir="2700000" algn="tl">
+                    <a:srgbClr val="000000">
+                      <a:alpha val="43137"/>
+                    </a:srgbClr>
+                  </a:outerShdw>
+                </a:effectLst>
+              </a:rPr>
+              <a:t>reply</a:t>
+            </a:r>
+            <a:r>
+              <a:rPr lang="en-US" dirty="0"/>
+              <a:t>, it sends out </a:t>
+            </a:r>
+            <a:r>
+              <a:rPr lang="en-US" dirty="0">
+                <a:solidFill>
+                  <a:srgbClr val="5FDF41"/>
+                </a:solidFill>
+                <a:effectLst>
+                  <a:outerShdw blurRad="38100" dist="38100" dir="2700000" algn="tl">
+                    <a:srgbClr val="000000">
+                      <a:alpha val="43137"/>
+                    </a:srgbClr>
+                  </a:outerShdw>
+                </a:effectLst>
+              </a:rPr>
+              <a:t>data</a:t>
+            </a:r>
+            <a:r>
+              <a:rPr lang="en-US" dirty="0"/>
+              <a:t>, to the node with the lowest hop count to destination, expecting it to make it</a:t>
+            </a:r>
+          </a:p>
+          <a:p>
+            <a:r>
+              <a:rPr lang="en-US" dirty="0">
+                <a:solidFill>
+                  <a:srgbClr val="00B0F0"/>
+                </a:solidFill>
+                <a:effectLst>
+                  <a:outerShdw blurRad="38100" dist="38100" dir="2700000" algn="tl">
+                    <a:srgbClr val="000000">
+                      <a:alpha val="43137"/>
+                    </a:srgbClr>
+                  </a:outerShdw>
+                </a:effectLst>
+              </a:rPr>
+              <a:t>Floods</a:t>
+            </a:r>
+            <a:r>
+              <a:rPr lang="en-US" dirty="0"/>
+              <a:t> multiple times</a:t>
+            </a:r>
+          </a:p>
+          <a:p>
+            <a:r>
+              <a:rPr lang="en-US" dirty="0"/>
+              <a:t>D’s route to F is still valid though</a:t>
+            </a:r>
+          </a:p>
+        </p:txBody>
+      </p:sp>
+      <p:pic>
+        <p:nvPicPr>
+          <p:cNvPr id="14" name="Picture 13">
+            <a:extLst>
+              <a:ext uri="{FF2B5EF4-FFF2-40B4-BE49-F238E27FC236}">
+                <a16:creationId xmlns:a16="http://schemas.microsoft.com/office/drawing/2014/main" id="{47E6F946-6CEC-493A-BBDC-361C1BA932E5}"/>
+              </a:ext>
+            </a:extLst>
+          </p:cNvPr>
+          <p:cNvPicPr>
+            <a:picLocks noChangeAspect="1"/>
+          </p:cNvPicPr>
+          <p:nvPr/>
+        </p:nvPicPr>
+        <p:blipFill>
+          <a:blip r:embed="rId2"/>
+          <a:stretch>
+            <a:fillRect/>
+          </a:stretch>
+        </p:blipFill>
+        <p:spPr>
+          <a:xfrm>
+            <a:off x="671757" y="2954180"/>
+            <a:ext cx="1828800" cy="1592520"/>
+          </a:xfrm>
+          <a:prstGeom prst="rect">
+            <a:avLst/>
+          </a:prstGeom>
+        </p:spPr>
+      </p:pic>
+      <p:pic>
+        <p:nvPicPr>
+          <p:cNvPr id="4" name="Picture 3">
+            <a:extLst>
+              <a:ext uri="{FF2B5EF4-FFF2-40B4-BE49-F238E27FC236}">
+                <a16:creationId xmlns:a16="http://schemas.microsoft.com/office/drawing/2014/main" id="{CEE8BDCC-9034-4AA8-9DD5-1AC2F5A75624}"/>
+              </a:ext>
+            </a:extLst>
+          </p:cNvPr>
+          <p:cNvPicPr>
+            <a:picLocks noChangeAspect="1"/>
+          </p:cNvPicPr>
+          <p:nvPr/>
+        </p:nvPicPr>
+        <p:blipFill rotWithShape="1">
+          <a:blip r:embed="rId3"/>
+          <a:srcRect/>
+          <a:stretch/>
+        </p:blipFill>
+        <p:spPr>
+          <a:xfrm>
+            <a:off x="671757" y="1147289"/>
+            <a:ext cx="1828800" cy="1618324"/>
+          </a:xfrm>
+          <a:prstGeom prst="rect">
+            <a:avLst/>
+          </a:prstGeom>
+        </p:spPr>
+      </p:pic>
+      <p:sp>
+        <p:nvSpPr>
+          <p:cNvPr id="5" name="Oval 4">
+            <a:extLst>
+              <a:ext uri="{FF2B5EF4-FFF2-40B4-BE49-F238E27FC236}">
+                <a16:creationId xmlns:a16="http://schemas.microsoft.com/office/drawing/2014/main" id="{95FE203D-DCEB-4B85-83AB-D8C77936D47A}"/>
+              </a:ext>
+            </a:extLst>
+          </p:cNvPr>
+          <p:cNvSpPr/>
+          <p:nvPr/>
+        </p:nvSpPr>
+        <p:spPr>
+          <a:xfrm>
+            <a:off x="800100" y="2484118"/>
+            <a:ext cx="289560" cy="235773"/>
+          </a:xfrm>
+          <a:prstGeom prst="ellipse">
+            <a:avLst/>
+          </a:prstGeom>
+          <a:noFill/>
+          <a:ln w="25400">
+            <a:solidFill>
+              <a:srgbClr val="FFFF00"/>
+            </a:solidFill>
+          </a:ln>
+        </p:spPr>
+        <p:style>
+          <a:lnRef idx="1">
+            <a:schemeClr val="accent1"/>
+          </a:lnRef>
+          <a:fillRef idx="3">
+            <a:schemeClr val="accent1"/>
+          </a:fillRef>
+          <a:effectRef idx="2">
+            <a:schemeClr val="accent1"/>
+          </a:effectRef>
+          <a:fontRef idx="minor">
+            <a:schemeClr val="lt1"/>
+          </a:fontRef>
+        </p:style>
+        <p:txBody>
+          <a:bodyPr rtlCol="0" anchor="ctr"/>
+          <a:lstStyle/>
+          <a:p>
+            <a:pPr algn="ctr"/>
+            <a:endParaRPr lang="en-US"/>
+          </a:p>
+        </p:txBody>
+      </p:sp>
+      <p:sp>
+        <p:nvSpPr>
+          <p:cNvPr id="8" name="Oval 7">
+            <a:extLst>
+              <a:ext uri="{FF2B5EF4-FFF2-40B4-BE49-F238E27FC236}">
+                <a16:creationId xmlns:a16="http://schemas.microsoft.com/office/drawing/2014/main" id="{E5FD367B-E410-4895-BFAF-BCC7C4068012}"/>
+              </a:ext>
+            </a:extLst>
+          </p:cNvPr>
+          <p:cNvSpPr/>
+          <p:nvPr/>
+        </p:nvSpPr>
+        <p:spPr>
+          <a:xfrm>
+            <a:off x="1242060" y="1162529"/>
+            <a:ext cx="289560" cy="235773"/>
+          </a:xfrm>
+          <a:prstGeom prst="ellipse">
+            <a:avLst/>
+          </a:prstGeom>
+          <a:noFill/>
+          <a:ln w="25400">
+            <a:solidFill>
+              <a:srgbClr val="FFFF00"/>
+            </a:solidFill>
+          </a:ln>
+        </p:spPr>
+        <p:style>
+          <a:lnRef idx="1">
+            <a:schemeClr val="accent1"/>
+          </a:lnRef>
+          <a:fillRef idx="3">
+            <a:schemeClr val="accent1"/>
+          </a:fillRef>
+          <a:effectRef idx="2">
+            <a:schemeClr val="accent1"/>
+          </a:effectRef>
+          <a:fontRef idx="minor">
+            <a:schemeClr val="lt1"/>
+          </a:fontRef>
+        </p:style>
+        <p:txBody>
+          <a:bodyPr rtlCol="0" anchor="ctr"/>
+          <a:lstStyle/>
+          <a:p>
+            <a:pPr algn="ctr"/>
+            <a:endParaRPr lang="en-US"/>
+          </a:p>
+        </p:txBody>
+      </p:sp>
+    </p:spTree>
+    <p:extLst>
+      <p:ext uri="{BB962C8B-B14F-4D97-AF65-F5344CB8AC3E}">
+        <p14:creationId xmlns:p14="http://schemas.microsoft.com/office/powerpoint/2010/main" val="355245985"/>
+      </p:ext>
+    </p:extLst>
+  </p:cSld>
+  <p:clrMapOvr>
+    <a:masterClrMapping/>
+  </p:clrMapOvr>
+</p:sld>
+</file>
+
+<file path=ppt/slides/slide14.xml><?xml version="1.0" encoding="utf-8"?>
+<p:sld xmlns:a="http://schemas.openxmlformats.org/drawingml/2006/main" xmlns:r="http://schemas.openxmlformats.org/officeDocument/2006/relationships" xmlns:p="http://schemas.openxmlformats.org/presentationml/2006/main">
+  <p:cSld>
+    <p:spTree>
+      <p:nvGrpSpPr>
+        <p:cNvPr id="1" name=""/>
+        <p:cNvGrpSpPr/>
+        <p:nvPr/>
+      </p:nvGrpSpPr>
+      <p:grpSpPr>
+        <a:xfrm>
+          <a:off x="0" y="0"/>
+          <a:ext cx="0" cy="0"/>
+          <a:chOff x="0" y="0"/>
+          <a:chExt cx="0" cy="0"/>
+        </a:xfrm>
+      </p:grpSpPr>
+      <p:sp>
+        <p:nvSpPr>
+          <p:cNvPr id="2" name="Text Placeholder 1">
+            <a:extLst>
+              <a:ext uri="{FF2B5EF4-FFF2-40B4-BE49-F238E27FC236}">
+                <a16:creationId xmlns:a16="http://schemas.microsoft.com/office/drawing/2014/main" id="{27555CB1-EAF8-4E0E-BD45-905842BFE65F}"/>
+              </a:ext>
+            </a:extLst>
+          </p:cNvPr>
+          <p:cNvSpPr>
+            <a:spLocks noGrp="1"/>
+          </p:cNvSpPr>
+          <p:nvPr>
+            <p:ph type="body" sz="quarter" idx="10"/>
+          </p:nvPr>
+        </p:nvSpPr>
+        <p:spPr/>
+        <p:txBody>
+          <a:bodyPr/>
+          <a:lstStyle/>
+          <a:p>
+            <a:pPr algn="ctr"/>
+            <a:r>
+              <a:rPr lang="en-US" dirty="0"/>
+              <a:t>Example 4</a:t>
+            </a:r>
+          </a:p>
+        </p:txBody>
+      </p:sp>
+      <p:sp>
+        <p:nvSpPr>
+          <p:cNvPr id="3" name="Text Placeholder 2">
+            <a:extLst>
+              <a:ext uri="{FF2B5EF4-FFF2-40B4-BE49-F238E27FC236}">
+                <a16:creationId xmlns:a16="http://schemas.microsoft.com/office/drawing/2014/main" id="{28A202AE-9865-409D-BCB7-FA4FF773E1B7}"/>
+              </a:ext>
+            </a:extLst>
+          </p:cNvPr>
+          <p:cNvSpPr>
+            <a:spLocks noGrp="1"/>
+          </p:cNvSpPr>
+          <p:nvPr>
+            <p:ph type="body" sz="quarter" idx="11"/>
+          </p:nvPr>
+        </p:nvSpPr>
+        <p:spPr/>
+        <p:txBody>
+          <a:bodyPr/>
+          <a:lstStyle/>
+          <a:p>
+            <a:endParaRPr lang="en-US" dirty="0"/>
+          </a:p>
+        </p:txBody>
+      </p:sp>
+      <p:pic>
+        <p:nvPicPr>
+          <p:cNvPr id="4" name="Picture 3">
+            <a:extLst>
+              <a:ext uri="{FF2B5EF4-FFF2-40B4-BE49-F238E27FC236}">
+                <a16:creationId xmlns:a16="http://schemas.microsoft.com/office/drawing/2014/main" id="{CFAC51E4-CF38-4AAD-9ADE-EA4648798347}"/>
+              </a:ext>
+            </a:extLst>
+          </p:cNvPr>
+          <p:cNvPicPr>
+            <a:picLocks noChangeAspect="1"/>
+          </p:cNvPicPr>
+          <p:nvPr/>
+        </p:nvPicPr>
+        <p:blipFill rotWithShape="1">
+          <a:blip r:embed="rId2"/>
+          <a:srcRect b="23856"/>
+          <a:stretch/>
+        </p:blipFill>
+        <p:spPr>
+          <a:xfrm>
+            <a:off x="0" y="1670249"/>
+            <a:ext cx="9144000" cy="3473251"/>
+          </a:xfrm>
+          <a:prstGeom prst="rect">
+            <a:avLst/>
+          </a:prstGeom>
+        </p:spPr>
+      </p:pic>
+    </p:spTree>
+    <p:extLst>
+      <p:ext uri="{BB962C8B-B14F-4D97-AF65-F5344CB8AC3E}">
+        <p14:creationId xmlns:p14="http://schemas.microsoft.com/office/powerpoint/2010/main" val="3583992903"/>
+      </p:ext>
+    </p:extLst>
+  </p:cSld>
+  <p:clrMapOvr>
+    <a:masterClrMapping/>
+  </p:clrMapOvr>
+</p:sld>
+</file>
+
+<file path=ppt/slides/slide15.xml><?xml version="1.0" encoding="utf-8"?>
+<p:sld xmlns:a="http://schemas.openxmlformats.org/drawingml/2006/main" xmlns:r="http://schemas.openxmlformats.org/officeDocument/2006/relationships" xmlns:p="http://schemas.openxmlformats.org/presentationml/2006/main">
+  <p:cSld>
+    <p:spTree>
+      <p:nvGrpSpPr>
+        <p:cNvPr id="1" name=""/>
+        <p:cNvGrpSpPr/>
+        <p:nvPr/>
+      </p:nvGrpSpPr>
+      <p:grpSpPr>
+        <a:xfrm>
+          <a:off x="0" y="0"/>
+          <a:ext cx="0" cy="0"/>
+          <a:chOff x="0" y="0"/>
+          <a:chExt cx="0" cy="0"/>
+        </a:xfrm>
+      </p:grpSpPr>
+      <p:sp>
+        <p:nvSpPr>
+          <p:cNvPr id="2" name="Text Placeholder 1"/>
+          <p:cNvSpPr>
+            <a:spLocks noGrp="1"/>
+          </p:cNvSpPr>
+          <p:nvPr>
+            <p:ph type="body" sz="quarter" idx="11"/>
+          </p:nvPr>
+        </p:nvSpPr>
+        <p:spPr/>
+        <p:txBody>
+          <a:bodyPr/>
+          <a:lstStyle/>
+          <a:p>
+            <a:r>
+              <a:rPr lang="en-US" dirty="0"/>
+              <a:t>Background</a:t>
+            </a:r>
+          </a:p>
+          <a:p>
+            <a:r>
+              <a:rPr lang="en-US" dirty="0"/>
+              <a:t>Examples</a:t>
+            </a:r>
+          </a:p>
+          <a:p>
+            <a:r>
+              <a:rPr lang="en-US" b="1" dirty="0">
+                <a:solidFill>
+                  <a:srgbClr val="005F83"/>
+                </a:solidFill>
+              </a:rPr>
+              <a:t>Traffic Statistics</a:t>
+            </a:r>
+          </a:p>
+          <a:p>
+            <a:r>
+              <a:rPr lang="en-US" dirty="0"/>
+              <a:t>Future Work</a:t>
+            </a:r>
+          </a:p>
+          <a:p>
+            <a:r>
+              <a:rPr lang="en-US" dirty="0"/>
+              <a:t>Conclusions</a:t>
+            </a:r>
+          </a:p>
+          <a:p>
+            <a:r>
+              <a:rPr lang="en-US" dirty="0"/>
+              <a:t>Demo</a:t>
+            </a:r>
+          </a:p>
+          <a:p>
+            <a:endParaRPr lang="en-US" dirty="0"/>
+          </a:p>
+        </p:txBody>
+      </p:sp>
+      <p:sp>
+        <p:nvSpPr>
+          <p:cNvPr id="3" name="Text Placeholder 2"/>
+          <p:cNvSpPr>
+            <a:spLocks noGrp="1"/>
+          </p:cNvSpPr>
+          <p:nvPr>
+            <p:ph type="body" sz="quarter" idx="12"/>
+          </p:nvPr>
+        </p:nvSpPr>
+        <p:spPr/>
+        <p:txBody>
+          <a:bodyPr/>
+          <a:lstStyle/>
+          <a:p>
+            <a:r>
+              <a:rPr lang="en-US" dirty="0"/>
+              <a:t>FONTS</a:t>
+            </a:r>
+          </a:p>
+        </p:txBody>
+      </p:sp>
+    </p:spTree>
+    <p:extLst>
+      <p:ext uri="{BB962C8B-B14F-4D97-AF65-F5344CB8AC3E}">
+        <p14:creationId xmlns:p14="http://schemas.microsoft.com/office/powerpoint/2010/main" val="1226428970"/>
+      </p:ext>
+    </p:extLst>
+  </p:cSld>
+  <p:clrMapOvr>
+    <a:masterClrMapping/>
+  </p:clrMapOvr>
+</p:sld>
+</file>
+
+<file path=ppt/slides/slide16.xml><?xml version="1.0" encoding="utf-8"?>
+<p:sld xmlns:a="http://schemas.openxmlformats.org/drawingml/2006/main" xmlns:r="http://schemas.openxmlformats.org/officeDocument/2006/relationships" xmlns:p="http://schemas.openxmlformats.org/presentationml/2006/main">
+  <p:cSld>
+    <p:spTree>
+      <p:nvGrpSpPr>
+        <p:cNvPr id="1" name=""/>
+        <p:cNvGrpSpPr/>
+        <p:nvPr/>
+      </p:nvGrpSpPr>
+      <p:grpSpPr>
+        <a:xfrm>
+          <a:off x="0" y="0"/>
+          <a:ext cx="0" cy="0"/>
+          <a:chOff x="0" y="0"/>
+          <a:chExt cx="0" cy="0"/>
+        </a:xfrm>
+      </p:grpSpPr>
+      <p:sp>
+        <p:nvSpPr>
+          <p:cNvPr id="2" name="Text Placeholder 1">
+            <a:extLst>
+              <a:ext uri="{FF2B5EF4-FFF2-40B4-BE49-F238E27FC236}">
+                <a16:creationId xmlns:a16="http://schemas.microsoft.com/office/drawing/2014/main" id="{55F5DA41-E620-4CD7-8D1E-DDAC4A88CC52}"/>
+              </a:ext>
+            </a:extLst>
+          </p:cNvPr>
+          <p:cNvSpPr>
+            <a:spLocks noGrp="1"/>
+          </p:cNvSpPr>
+          <p:nvPr>
+            <p:ph type="body" sz="quarter" idx="10"/>
+          </p:nvPr>
+        </p:nvSpPr>
+        <p:spPr/>
+        <p:txBody>
+          <a:bodyPr/>
+          <a:lstStyle/>
+          <a:p>
+            <a:pPr algn="ctr"/>
+            <a:r>
+              <a:rPr lang="en-US" dirty="0"/>
+              <a:t>Static Network</a:t>
+            </a:r>
+          </a:p>
+        </p:txBody>
+      </p:sp>
+      <p:sp>
+        <p:nvSpPr>
+          <p:cNvPr id="3" name="Text Placeholder 2">
+            <a:extLst>
+              <a:ext uri="{FF2B5EF4-FFF2-40B4-BE49-F238E27FC236}">
+                <a16:creationId xmlns:a16="http://schemas.microsoft.com/office/drawing/2014/main" id="{1E701D65-BD27-4895-957D-EBCF7126A2CD}"/>
+              </a:ext>
+            </a:extLst>
+          </p:cNvPr>
+          <p:cNvSpPr>
+            <a:spLocks noGrp="1"/>
+          </p:cNvSpPr>
+          <p:nvPr>
+            <p:ph type="body" sz="quarter" idx="11"/>
+          </p:nvPr>
+        </p:nvSpPr>
+        <p:spPr>
+          <a:xfrm>
+            <a:off x="5050315" y="1302545"/>
+            <a:ext cx="3805200" cy="3011623"/>
+          </a:xfrm>
+        </p:spPr>
+        <p:txBody>
+          <a:bodyPr/>
+          <a:lstStyle/>
+          <a:p>
+            <a:r>
+              <a:rPr lang="en-US" dirty="0"/>
+              <a:t>500 random packets sent</a:t>
+            </a:r>
+          </a:p>
+          <a:p>
+            <a:r>
+              <a:rPr lang="en-US" dirty="0"/>
+              <a:t>No movement, nodes remain in the same place</a:t>
+            </a:r>
+          </a:p>
+          <a:p>
+            <a:r>
+              <a:rPr lang="en-US" dirty="0"/>
+              <a:t>No </a:t>
+            </a:r>
+            <a:r>
+              <a:rPr lang="en-US" b="1" dirty="0">
+                <a:solidFill>
+                  <a:srgbClr val="FF0000"/>
+                </a:solidFill>
+                <a:effectLst>
+                  <a:outerShdw blurRad="38100" dist="38100" dir="2700000" algn="tl">
+                    <a:srgbClr val="000000">
+                      <a:alpha val="43137"/>
+                    </a:srgbClr>
+                  </a:outerShdw>
+                </a:effectLst>
+              </a:rPr>
+              <a:t>RERR</a:t>
+            </a:r>
+            <a:r>
+              <a:rPr lang="en-US" dirty="0"/>
+              <a:t>s</a:t>
+            </a:r>
+          </a:p>
+        </p:txBody>
+      </p:sp>
+      <p:pic>
+        <p:nvPicPr>
+          <p:cNvPr id="5" name="Picture 4">
+            <a:extLst>
+              <a:ext uri="{FF2B5EF4-FFF2-40B4-BE49-F238E27FC236}">
+                <a16:creationId xmlns:a16="http://schemas.microsoft.com/office/drawing/2014/main" id="{B8F3F7EC-D1D2-4118-AAE8-283CB3DC68B7}"/>
+              </a:ext>
+            </a:extLst>
+          </p:cNvPr>
+          <p:cNvPicPr>
+            <a:picLocks noChangeAspect="1"/>
+          </p:cNvPicPr>
+          <p:nvPr/>
+        </p:nvPicPr>
+        <p:blipFill>
+          <a:blip r:embed="rId2"/>
+          <a:stretch>
+            <a:fillRect/>
+          </a:stretch>
+        </p:blipFill>
+        <p:spPr>
+          <a:xfrm>
+            <a:off x="478315" y="1302545"/>
+            <a:ext cx="4571999" cy="3429000"/>
+          </a:xfrm>
+          <a:prstGeom prst="rect">
+            <a:avLst/>
+          </a:prstGeom>
+        </p:spPr>
+      </p:pic>
+    </p:spTree>
+    <p:extLst>
+      <p:ext uri="{BB962C8B-B14F-4D97-AF65-F5344CB8AC3E}">
+        <p14:creationId xmlns:p14="http://schemas.microsoft.com/office/powerpoint/2010/main" val="4276717774"/>
+      </p:ext>
+    </p:extLst>
+  </p:cSld>
+  <p:clrMapOvr>
+    <a:masterClrMapping/>
+  </p:clrMapOvr>
+</p:sld>
+</file>
+
+<file path=ppt/slides/slide17.xml><?xml version="1.0" encoding="utf-8"?>
+<p:sld xmlns:a="http://schemas.openxmlformats.org/drawingml/2006/main" xmlns:r="http://schemas.openxmlformats.org/officeDocument/2006/relationships" xmlns:p="http://schemas.openxmlformats.org/presentationml/2006/main">
+  <p:cSld>
+    <p:spTree>
+      <p:nvGrpSpPr>
+        <p:cNvPr id="1" name=""/>
+        <p:cNvGrpSpPr/>
+        <p:nvPr/>
+      </p:nvGrpSpPr>
+      <p:grpSpPr>
+        <a:xfrm>
+          <a:off x="0" y="0"/>
+          <a:ext cx="0" cy="0"/>
+          <a:chOff x="0" y="0"/>
+          <a:chExt cx="0" cy="0"/>
+        </a:xfrm>
+      </p:grpSpPr>
+      <p:sp>
+        <p:nvSpPr>
+          <p:cNvPr id="2" name="Text Placeholder 1">
+            <a:extLst>
+              <a:ext uri="{FF2B5EF4-FFF2-40B4-BE49-F238E27FC236}">
+                <a16:creationId xmlns:a16="http://schemas.microsoft.com/office/drawing/2014/main" id="{55F5DA41-E620-4CD7-8D1E-DDAC4A88CC52}"/>
+              </a:ext>
+            </a:extLst>
+          </p:cNvPr>
+          <p:cNvSpPr>
+            <a:spLocks noGrp="1"/>
+          </p:cNvSpPr>
+          <p:nvPr>
+            <p:ph type="body" sz="quarter" idx="10"/>
+          </p:nvPr>
+        </p:nvSpPr>
+        <p:spPr/>
+        <p:txBody>
+          <a:bodyPr/>
+          <a:lstStyle/>
+          <a:p>
+            <a:pPr algn="ctr"/>
+            <a:r>
+              <a:rPr lang="en-US" dirty="0"/>
+              <a:t>Static Network</a:t>
+            </a:r>
+          </a:p>
+        </p:txBody>
+      </p:sp>
+      <p:sp>
+        <p:nvSpPr>
+          <p:cNvPr id="3" name="Text Placeholder 2">
+            <a:extLst>
+              <a:ext uri="{FF2B5EF4-FFF2-40B4-BE49-F238E27FC236}">
+                <a16:creationId xmlns:a16="http://schemas.microsoft.com/office/drawing/2014/main" id="{1E701D65-BD27-4895-957D-EBCF7126A2CD}"/>
+              </a:ext>
+            </a:extLst>
+          </p:cNvPr>
+          <p:cNvSpPr>
+            <a:spLocks noGrp="1"/>
+          </p:cNvSpPr>
+          <p:nvPr>
+            <p:ph type="body" sz="quarter" idx="11"/>
+          </p:nvPr>
+        </p:nvSpPr>
+        <p:spPr>
+          <a:xfrm>
+            <a:off x="5050315" y="1302545"/>
+            <a:ext cx="3805200" cy="3011623"/>
+          </a:xfrm>
+        </p:spPr>
+        <p:txBody>
+          <a:bodyPr/>
+          <a:lstStyle/>
+          <a:p>
+            <a:r>
+              <a:rPr lang="en-US" dirty="0"/>
+              <a:t>No movement</a:t>
+            </a:r>
+          </a:p>
+          <a:p>
+            <a:r>
+              <a:rPr lang="en-US" dirty="0"/>
+              <a:t>Propagation delays</a:t>
+            </a:r>
+          </a:p>
+        </p:txBody>
+      </p:sp>
+      <p:pic>
+        <p:nvPicPr>
+          <p:cNvPr id="5" name="Picture 4">
+            <a:extLst>
+              <a:ext uri="{FF2B5EF4-FFF2-40B4-BE49-F238E27FC236}">
+                <a16:creationId xmlns:a16="http://schemas.microsoft.com/office/drawing/2014/main" id="{B8F3F7EC-D1D2-4118-AAE8-283CB3DC68B7}"/>
+              </a:ext>
+            </a:extLst>
+          </p:cNvPr>
+          <p:cNvPicPr>
+            <a:picLocks noChangeAspect="1"/>
+          </p:cNvPicPr>
+          <p:nvPr/>
+        </p:nvPicPr>
+        <p:blipFill>
+          <a:blip r:embed="rId2"/>
+          <a:stretch>
+            <a:fillRect/>
+          </a:stretch>
+        </p:blipFill>
+        <p:spPr>
+          <a:xfrm>
+            <a:off x="478315" y="1302545"/>
+            <a:ext cx="4571999" cy="3428999"/>
+          </a:xfrm>
+          <a:prstGeom prst="rect">
+            <a:avLst/>
+          </a:prstGeom>
+        </p:spPr>
+      </p:pic>
+    </p:spTree>
+    <p:extLst>
+      <p:ext uri="{BB962C8B-B14F-4D97-AF65-F5344CB8AC3E}">
+        <p14:creationId xmlns:p14="http://schemas.microsoft.com/office/powerpoint/2010/main" val="3939320531"/>
+      </p:ext>
+    </p:extLst>
+  </p:cSld>
+  <p:clrMapOvr>
+    <a:masterClrMapping/>
+  </p:clrMapOvr>
+</p:sld>
+</file>
+
+<file path=ppt/slides/slide18.xml><?xml version="1.0" encoding="utf-8"?>
+<p:sld xmlns:a="http://schemas.openxmlformats.org/drawingml/2006/main" xmlns:r="http://schemas.openxmlformats.org/officeDocument/2006/relationships" xmlns:p="http://schemas.openxmlformats.org/presentationml/2006/main">
+  <p:cSld>
+    <p:spTree>
+      <p:nvGrpSpPr>
+        <p:cNvPr id="1" name=""/>
+        <p:cNvGrpSpPr/>
+        <p:nvPr/>
+      </p:nvGrpSpPr>
+      <p:grpSpPr>
+        <a:xfrm>
+          <a:off x="0" y="0"/>
+          <a:ext cx="0" cy="0"/>
+          <a:chOff x="0" y="0"/>
+          <a:chExt cx="0" cy="0"/>
+        </a:xfrm>
+      </p:grpSpPr>
+      <p:sp>
+        <p:nvSpPr>
+          <p:cNvPr id="2" name="Text Placeholder 1">
+            <a:extLst>
+              <a:ext uri="{FF2B5EF4-FFF2-40B4-BE49-F238E27FC236}">
+                <a16:creationId xmlns:a16="http://schemas.microsoft.com/office/drawing/2014/main" id="{55F5DA41-E620-4CD7-8D1E-DDAC4A88CC52}"/>
+              </a:ext>
+            </a:extLst>
+          </p:cNvPr>
+          <p:cNvSpPr>
+            <a:spLocks noGrp="1"/>
+          </p:cNvSpPr>
+          <p:nvPr>
+            <p:ph type="body" sz="quarter" idx="10"/>
+          </p:nvPr>
+        </p:nvSpPr>
+        <p:spPr/>
+        <p:txBody>
+          <a:bodyPr/>
+          <a:lstStyle/>
+          <a:p>
+            <a:pPr algn="ctr"/>
+            <a:r>
+              <a:rPr lang="en-US" dirty="0"/>
+              <a:t>Mobile Network</a:t>
+            </a:r>
+          </a:p>
+        </p:txBody>
+      </p:sp>
+      <p:sp>
+        <p:nvSpPr>
+          <p:cNvPr id="3" name="Text Placeholder 2">
+            <a:extLst>
+              <a:ext uri="{FF2B5EF4-FFF2-40B4-BE49-F238E27FC236}">
+                <a16:creationId xmlns:a16="http://schemas.microsoft.com/office/drawing/2014/main" id="{1E701D65-BD27-4895-957D-EBCF7126A2CD}"/>
+              </a:ext>
+            </a:extLst>
+          </p:cNvPr>
+          <p:cNvSpPr>
+            <a:spLocks noGrp="1"/>
+          </p:cNvSpPr>
+          <p:nvPr>
+            <p:ph type="body" sz="quarter" idx="11"/>
+          </p:nvPr>
+        </p:nvSpPr>
+        <p:spPr>
+          <a:xfrm>
+            <a:off x="5050315" y="1302545"/>
+            <a:ext cx="3805200" cy="3011623"/>
+          </a:xfrm>
+        </p:spPr>
+        <p:txBody>
+          <a:bodyPr/>
+          <a:lstStyle/>
+          <a:p>
+            <a:r>
+              <a:rPr lang="en-US" dirty="0"/>
+              <a:t>500 random packets sent</a:t>
+            </a:r>
+          </a:p>
+          <a:p>
+            <a:r>
+              <a:rPr lang="en-US" dirty="0"/>
+              <a:t>Movement every 50 packets</a:t>
+            </a:r>
+          </a:p>
+        </p:txBody>
+      </p:sp>
+      <p:pic>
+        <p:nvPicPr>
+          <p:cNvPr id="5" name="Picture 4">
+            <a:extLst>
+              <a:ext uri="{FF2B5EF4-FFF2-40B4-BE49-F238E27FC236}">
+                <a16:creationId xmlns:a16="http://schemas.microsoft.com/office/drawing/2014/main" id="{B8F3F7EC-D1D2-4118-AAE8-283CB3DC68B7}"/>
+              </a:ext>
+            </a:extLst>
+          </p:cNvPr>
+          <p:cNvPicPr>
+            <a:picLocks noChangeAspect="1"/>
+          </p:cNvPicPr>
+          <p:nvPr/>
+        </p:nvPicPr>
+        <p:blipFill>
+          <a:blip r:embed="rId2"/>
+          <a:stretch>
+            <a:fillRect/>
+          </a:stretch>
+        </p:blipFill>
+        <p:spPr>
+          <a:xfrm>
+            <a:off x="478315" y="1302545"/>
+            <a:ext cx="4571999" cy="3429000"/>
+          </a:xfrm>
+          <a:prstGeom prst="rect">
+            <a:avLst/>
+          </a:prstGeom>
+        </p:spPr>
+      </p:pic>
+    </p:spTree>
+    <p:extLst>
+      <p:ext uri="{BB962C8B-B14F-4D97-AF65-F5344CB8AC3E}">
+        <p14:creationId xmlns:p14="http://schemas.microsoft.com/office/powerpoint/2010/main" val="2540642590"/>
+      </p:ext>
+    </p:extLst>
+  </p:cSld>
+  <p:clrMapOvr>
+    <a:masterClrMapping/>
+  </p:clrMapOvr>
+</p:sld>
+</file>
+
+<file path=ppt/slides/slide19.xml><?xml version="1.0" encoding="utf-8"?>
+<p:sld xmlns:a="http://schemas.openxmlformats.org/drawingml/2006/main" xmlns:r="http://schemas.openxmlformats.org/officeDocument/2006/relationships" xmlns:p="http://schemas.openxmlformats.org/presentationml/2006/main">
+  <p:cSld>
+    <p:spTree>
+      <p:nvGrpSpPr>
+        <p:cNvPr id="1" name=""/>
+        <p:cNvGrpSpPr/>
+        <p:nvPr/>
+      </p:nvGrpSpPr>
+      <p:grpSpPr>
+        <a:xfrm>
+          <a:off x="0" y="0"/>
+          <a:ext cx="0" cy="0"/>
+          <a:chOff x="0" y="0"/>
+          <a:chExt cx="0" cy="0"/>
+        </a:xfrm>
+      </p:grpSpPr>
+      <p:sp>
+        <p:nvSpPr>
+          <p:cNvPr id="2" name="Text Placeholder 1">
+            <a:extLst>
+              <a:ext uri="{FF2B5EF4-FFF2-40B4-BE49-F238E27FC236}">
+                <a16:creationId xmlns:a16="http://schemas.microsoft.com/office/drawing/2014/main" id="{55F5DA41-E620-4CD7-8D1E-DDAC4A88CC52}"/>
+              </a:ext>
+            </a:extLst>
+          </p:cNvPr>
+          <p:cNvSpPr>
+            <a:spLocks noGrp="1"/>
+          </p:cNvSpPr>
+          <p:nvPr>
+            <p:ph type="body" sz="quarter" idx="10"/>
+          </p:nvPr>
+        </p:nvSpPr>
+        <p:spPr/>
+        <p:txBody>
+          <a:bodyPr/>
+          <a:lstStyle/>
+          <a:p>
+            <a:pPr algn="ctr"/>
+            <a:r>
+              <a:rPr lang="en-US" dirty="0"/>
+              <a:t>Static Network</a:t>
+            </a:r>
+          </a:p>
+        </p:txBody>
+      </p:sp>
+      <p:sp>
+        <p:nvSpPr>
+          <p:cNvPr id="3" name="Text Placeholder 2">
+            <a:extLst>
+              <a:ext uri="{FF2B5EF4-FFF2-40B4-BE49-F238E27FC236}">
+                <a16:creationId xmlns:a16="http://schemas.microsoft.com/office/drawing/2014/main" id="{1E701D65-BD27-4895-957D-EBCF7126A2CD}"/>
+              </a:ext>
+            </a:extLst>
+          </p:cNvPr>
+          <p:cNvSpPr>
+            <a:spLocks noGrp="1"/>
+          </p:cNvSpPr>
+          <p:nvPr>
+            <p:ph type="body" sz="quarter" idx="11"/>
+          </p:nvPr>
+        </p:nvSpPr>
+        <p:spPr>
+          <a:xfrm>
+            <a:off x="5050315" y="1302545"/>
+            <a:ext cx="3805200" cy="3011623"/>
+          </a:xfrm>
+        </p:spPr>
+        <p:txBody>
+          <a:bodyPr/>
+          <a:lstStyle/>
+          <a:p>
+            <a:r>
+              <a:rPr lang="en-US" dirty="0"/>
+              <a:t>Movement every 50 packets</a:t>
+            </a:r>
+          </a:p>
+          <a:p>
+            <a:r>
+              <a:rPr lang="en-US" dirty="0"/>
+              <a:t>Propagation delays</a:t>
+            </a:r>
+          </a:p>
+        </p:txBody>
+      </p:sp>
+      <p:pic>
+        <p:nvPicPr>
+          <p:cNvPr id="5" name="Picture 4">
+            <a:extLst>
+              <a:ext uri="{FF2B5EF4-FFF2-40B4-BE49-F238E27FC236}">
+                <a16:creationId xmlns:a16="http://schemas.microsoft.com/office/drawing/2014/main" id="{B8F3F7EC-D1D2-4118-AAE8-283CB3DC68B7}"/>
+              </a:ext>
+            </a:extLst>
+          </p:cNvPr>
+          <p:cNvPicPr>
+            <a:picLocks noChangeAspect="1"/>
+          </p:cNvPicPr>
+          <p:nvPr/>
+        </p:nvPicPr>
+        <p:blipFill>
+          <a:blip r:embed="rId2"/>
+          <a:stretch>
+            <a:fillRect/>
+          </a:stretch>
+        </p:blipFill>
+        <p:spPr>
+          <a:xfrm>
+            <a:off x="478315" y="1302545"/>
+            <a:ext cx="4571998" cy="3428999"/>
+          </a:xfrm>
+          <a:prstGeom prst="rect">
+            <a:avLst/>
+          </a:prstGeom>
+        </p:spPr>
+      </p:pic>
+    </p:spTree>
+    <p:extLst>
+      <p:ext uri="{BB962C8B-B14F-4D97-AF65-F5344CB8AC3E}">
+        <p14:creationId xmlns:p14="http://schemas.microsoft.com/office/powerpoint/2010/main" val="4274964592"/>
+      </p:ext>
+    </p:extLst>
+  </p:cSld>
+  <p:clrMapOvr>
+    <a:masterClrMapping/>
+  </p:clrMapOvr>
+</p:sld>
+</file>
+
 <file path=ppt/slides/slide2.xml><?xml version="1.0" encoding="utf-8"?>
 <p:sld xmlns:a="http://schemas.openxmlformats.org/drawingml/2006/main" xmlns:r="http://schemas.openxmlformats.org/officeDocument/2006/relationships" xmlns:p="http://schemas.openxmlformats.org/presentationml/2006/main">
   <p:cSld>
@@ -5022,7 +6585,11 @@
           <a:lstStyle/>
           <a:p>
             <a:r>
-              <a:rPr lang="en-US" dirty="0"/>
+              <a:rPr lang="en-US" b="1" dirty="0">
+                <a:solidFill>
+                  <a:srgbClr val="005F83"/>
+                </a:solidFill>
+              </a:rPr>
               <a:t>Background</a:t>
             </a:r>
           </a:p>
@@ -5048,6 +6615,12 @@
             <a:r>
               <a:rPr lang="en-US" dirty="0"/>
               <a:t>Conclusions</a:t>
+            </a:r>
+          </a:p>
+          <a:p>
+            <a:r>
+              <a:rPr lang="en-US" dirty="0"/>
+              <a:t>Demo</a:t>
             </a:r>
           </a:p>
         </p:txBody>
@@ -5078,6 +6651,1474 @@
     <p:extLst>
       <p:ext uri="{BB962C8B-B14F-4D97-AF65-F5344CB8AC3E}">
         <p14:creationId xmlns:p14="http://schemas.microsoft.com/office/powerpoint/2010/main" val="858603583"/>
+      </p:ext>
+    </p:extLst>
+  </p:cSld>
+  <p:clrMapOvr>
+    <a:masterClrMapping/>
+  </p:clrMapOvr>
+</p:sld>
+</file>
+
+<file path=ppt/slides/slide20.xml><?xml version="1.0" encoding="utf-8"?>
+<p:sld xmlns:a="http://schemas.openxmlformats.org/drawingml/2006/main" xmlns:r="http://schemas.openxmlformats.org/officeDocument/2006/relationships" xmlns:p="http://schemas.openxmlformats.org/presentationml/2006/main">
+  <p:cSld>
+    <p:spTree>
+      <p:nvGrpSpPr>
+        <p:cNvPr id="1" name=""/>
+        <p:cNvGrpSpPr/>
+        <p:nvPr/>
+      </p:nvGrpSpPr>
+      <p:grpSpPr>
+        <a:xfrm>
+          <a:off x="0" y="0"/>
+          <a:ext cx="0" cy="0"/>
+          <a:chOff x="0" y="0"/>
+          <a:chExt cx="0" cy="0"/>
+        </a:xfrm>
+      </p:grpSpPr>
+      <p:sp>
+        <p:nvSpPr>
+          <p:cNvPr id="2" name="Text Placeholder 1">
+            <a:extLst>
+              <a:ext uri="{FF2B5EF4-FFF2-40B4-BE49-F238E27FC236}">
+                <a16:creationId xmlns:a16="http://schemas.microsoft.com/office/drawing/2014/main" id="{55F5DA41-E620-4CD7-8D1E-DDAC4A88CC52}"/>
+              </a:ext>
+            </a:extLst>
+          </p:cNvPr>
+          <p:cNvSpPr>
+            <a:spLocks noGrp="1"/>
+          </p:cNvSpPr>
+          <p:nvPr>
+            <p:ph type="body" sz="quarter" idx="10"/>
+          </p:nvPr>
+        </p:nvSpPr>
+        <p:spPr/>
+        <p:txBody>
+          <a:bodyPr/>
+          <a:lstStyle/>
+          <a:p>
+            <a:pPr algn="ctr"/>
+            <a:r>
+              <a:rPr lang="en-US" dirty="0"/>
+              <a:t>Highly Mobile Network</a:t>
+            </a:r>
+          </a:p>
+        </p:txBody>
+      </p:sp>
+      <p:sp>
+        <p:nvSpPr>
+          <p:cNvPr id="3" name="Text Placeholder 2">
+            <a:extLst>
+              <a:ext uri="{FF2B5EF4-FFF2-40B4-BE49-F238E27FC236}">
+                <a16:creationId xmlns:a16="http://schemas.microsoft.com/office/drawing/2014/main" id="{1E701D65-BD27-4895-957D-EBCF7126A2CD}"/>
+              </a:ext>
+            </a:extLst>
+          </p:cNvPr>
+          <p:cNvSpPr>
+            <a:spLocks noGrp="1"/>
+          </p:cNvSpPr>
+          <p:nvPr>
+            <p:ph type="body" sz="quarter" idx="11"/>
+          </p:nvPr>
+        </p:nvSpPr>
+        <p:spPr>
+          <a:xfrm>
+            <a:off x="5050315" y="1302545"/>
+            <a:ext cx="3805200" cy="3011623"/>
+          </a:xfrm>
+        </p:spPr>
+        <p:txBody>
+          <a:bodyPr/>
+          <a:lstStyle/>
+          <a:p>
+            <a:r>
+              <a:rPr lang="en-US" dirty="0"/>
+              <a:t>500 random packets sent</a:t>
+            </a:r>
+          </a:p>
+          <a:p>
+            <a:r>
+              <a:rPr lang="en-US" dirty="0"/>
+              <a:t>Movement every 5 packets sent</a:t>
+            </a:r>
+          </a:p>
+        </p:txBody>
+      </p:sp>
+      <p:pic>
+        <p:nvPicPr>
+          <p:cNvPr id="5" name="Picture 4">
+            <a:extLst>
+              <a:ext uri="{FF2B5EF4-FFF2-40B4-BE49-F238E27FC236}">
+                <a16:creationId xmlns:a16="http://schemas.microsoft.com/office/drawing/2014/main" id="{B8F3F7EC-D1D2-4118-AAE8-283CB3DC68B7}"/>
+              </a:ext>
+            </a:extLst>
+          </p:cNvPr>
+          <p:cNvPicPr>
+            <a:picLocks noChangeAspect="1"/>
+          </p:cNvPicPr>
+          <p:nvPr/>
+        </p:nvPicPr>
+        <p:blipFill>
+          <a:blip r:embed="rId2"/>
+          <a:stretch>
+            <a:fillRect/>
+          </a:stretch>
+        </p:blipFill>
+        <p:spPr>
+          <a:xfrm>
+            <a:off x="478315" y="1302545"/>
+            <a:ext cx="4571998" cy="3428999"/>
+          </a:xfrm>
+          <a:prstGeom prst="rect">
+            <a:avLst/>
+          </a:prstGeom>
+        </p:spPr>
+      </p:pic>
+    </p:spTree>
+    <p:extLst>
+      <p:ext uri="{BB962C8B-B14F-4D97-AF65-F5344CB8AC3E}">
+        <p14:creationId xmlns:p14="http://schemas.microsoft.com/office/powerpoint/2010/main" val="271066549"/>
+      </p:ext>
+    </p:extLst>
+  </p:cSld>
+  <p:clrMapOvr>
+    <a:masterClrMapping/>
+  </p:clrMapOvr>
+</p:sld>
+</file>
+
+<file path=ppt/slides/slide21.xml><?xml version="1.0" encoding="utf-8"?>
+<p:sld xmlns:a="http://schemas.openxmlformats.org/drawingml/2006/main" xmlns:r="http://schemas.openxmlformats.org/officeDocument/2006/relationships" xmlns:p="http://schemas.openxmlformats.org/presentationml/2006/main">
+  <p:cSld>
+    <p:spTree>
+      <p:nvGrpSpPr>
+        <p:cNvPr id="1" name=""/>
+        <p:cNvGrpSpPr/>
+        <p:nvPr/>
+      </p:nvGrpSpPr>
+      <p:grpSpPr>
+        <a:xfrm>
+          <a:off x="0" y="0"/>
+          <a:ext cx="0" cy="0"/>
+          <a:chOff x="0" y="0"/>
+          <a:chExt cx="0" cy="0"/>
+        </a:xfrm>
+      </p:grpSpPr>
+      <p:sp>
+        <p:nvSpPr>
+          <p:cNvPr id="2" name="Text Placeholder 1">
+            <a:extLst>
+              <a:ext uri="{FF2B5EF4-FFF2-40B4-BE49-F238E27FC236}">
+                <a16:creationId xmlns:a16="http://schemas.microsoft.com/office/drawing/2014/main" id="{55F5DA41-E620-4CD7-8D1E-DDAC4A88CC52}"/>
+              </a:ext>
+            </a:extLst>
+          </p:cNvPr>
+          <p:cNvSpPr>
+            <a:spLocks noGrp="1"/>
+          </p:cNvSpPr>
+          <p:nvPr>
+            <p:ph type="body" sz="quarter" idx="10"/>
+          </p:nvPr>
+        </p:nvSpPr>
+        <p:spPr/>
+        <p:txBody>
+          <a:bodyPr/>
+          <a:lstStyle/>
+          <a:p>
+            <a:pPr algn="ctr"/>
+            <a:r>
+              <a:rPr lang="en-US" dirty="0"/>
+              <a:t>Static Network</a:t>
+            </a:r>
+          </a:p>
+        </p:txBody>
+      </p:sp>
+      <p:sp>
+        <p:nvSpPr>
+          <p:cNvPr id="3" name="Text Placeholder 2">
+            <a:extLst>
+              <a:ext uri="{FF2B5EF4-FFF2-40B4-BE49-F238E27FC236}">
+                <a16:creationId xmlns:a16="http://schemas.microsoft.com/office/drawing/2014/main" id="{1E701D65-BD27-4895-957D-EBCF7126A2CD}"/>
+              </a:ext>
+            </a:extLst>
+          </p:cNvPr>
+          <p:cNvSpPr>
+            <a:spLocks noGrp="1"/>
+          </p:cNvSpPr>
+          <p:nvPr>
+            <p:ph type="body" sz="quarter" idx="11"/>
+          </p:nvPr>
+        </p:nvSpPr>
+        <p:spPr>
+          <a:xfrm>
+            <a:off x="5050315" y="1302545"/>
+            <a:ext cx="3805200" cy="3011623"/>
+          </a:xfrm>
+        </p:spPr>
+        <p:txBody>
+          <a:bodyPr/>
+          <a:lstStyle/>
+          <a:p>
+            <a:r>
+              <a:rPr lang="en-US" dirty="0"/>
+              <a:t>Movement every 50 packets sent</a:t>
+            </a:r>
+          </a:p>
+          <a:p>
+            <a:r>
+              <a:rPr lang="en-US" dirty="0"/>
+              <a:t>Propagation delays</a:t>
+            </a:r>
+          </a:p>
+        </p:txBody>
+      </p:sp>
+      <p:pic>
+        <p:nvPicPr>
+          <p:cNvPr id="5" name="Picture 4">
+            <a:extLst>
+              <a:ext uri="{FF2B5EF4-FFF2-40B4-BE49-F238E27FC236}">
+                <a16:creationId xmlns:a16="http://schemas.microsoft.com/office/drawing/2014/main" id="{B8F3F7EC-D1D2-4118-AAE8-283CB3DC68B7}"/>
+              </a:ext>
+            </a:extLst>
+          </p:cNvPr>
+          <p:cNvPicPr>
+            <a:picLocks noChangeAspect="1"/>
+          </p:cNvPicPr>
+          <p:nvPr/>
+        </p:nvPicPr>
+        <p:blipFill>
+          <a:blip r:embed="rId2"/>
+          <a:stretch>
+            <a:fillRect/>
+          </a:stretch>
+        </p:blipFill>
+        <p:spPr>
+          <a:xfrm>
+            <a:off x="478315" y="1302545"/>
+            <a:ext cx="4571998" cy="3428999"/>
+          </a:xfrm>
+          <a:prstGeom prst="rect">
+            <a:avLst/>
+          </a:prstGeom>
+        </p:spPr>
+      </p:pic>
+    </p:spTree>
+    <p:extLst>
+      <p:ext uri="{BB962C8B-B14F-4D97-AF65-F5344CB8AC3E}">
+        <p14:creationId xmlns:p14="http://schemas.microsoft.com/office/powerpoint/2010/main" val="1301453758"/>
+      </p:ext>
+    </p:extLst>
+  </p:cSld>
+  <p:clrMapOvr>
+    <a:masterClrMapping/>
+  </p:clrMapOvr>
+</p:sld>
+</file>
+
+<file path=ppt/slides/slide22.xml><?xml version="1.0" encoding="utf-8"?>
+<p:sld xmlns:a="http://schemas.openxmlformats.org/drawingml/2006/main" xmlns:r="http://schemas.openxmlformats.org/officeDocument/2006/relationships" xmlns:p="http://schemas.openxmlformats.org/presentationml/2006/main">
+  <p:cSld>
+    <p:spTree>
+      <p:nvGrpSpPr>
+        <p:cNvPr id="1" name=""/>
+        <p:cNvGrpSpPr/>
+        <p:nvPr/>
+      </p:nvGrpSpPr>
+      <p:grpSpPr>
+        <a:xfrm>
+          <a:off x="0" y="0"/>
+          <a:ext cx="0" cy="0"/>
+          <a:chOff x="0" y="0"/>
+          <a:chExt cx="0" cy="0"/>
+        </a:xfrm>
+      </p:grpSpPr>
+      <p:sp>
+        <p:nvSpPr>
+          <p:cNvPr id="2" name="Text Placeholder 1">
+            <a:extLst>
+              <a:ext uri="{FF2B5EF4-FFF2-40B4-BE49-F238E27FC236}">
+                <a16:creationId xmlns:a16="http://schemas.microsoft.com/office/drawing/2014/main" id="{55F5DA41-E620-4CD7-8D1E-DDAC4A88CC52}"/>
+              </a:ext>
+            </a:extLst>
+          </p:cNvPr>
+          <p:cNvSpPr>
+            <a:spLocks noGrp="1"/>
+          </p:cNvSpPr>
+          <p:nvPr>
+            <p:ph type="body" sz="quarter" idx="10"/>
+          </p:nvPr>
+        </p:nvSpPr>
+        <p:spPr/>
+        <p:txBody>
+          <a:bodyPr/>
+          <a:lstStyle/>
+          <a:p>
+            <a:pPr algn="ctr"/>
+            <a:r>
+              <a:rPr lang="en-US" dirty="0"/>
+              <a:t>One-Dimensional Network</a:t>
+            </a:r>
+          </a:p>
+        </p:txBody>
+      </p:sp>
+      <p:sp>
+        <p:nvSpPr>
+          <p:cNvPr id="3" name="Text Placeholder 2">
+            <a:extLst>
+              <a:ext uri="{FF2B5EF4-FFF2-40B4-BE49-F238E27FC236}">
+                <a16:creationId xmlns:a16="http://schemas.microsoft.com/office/drawing/2014/main" id="{1E701D65-BD27-4895-957D-EBCF7126A2CD}"/>
+              </a:ext>
+            </a:extLst>
+          </p:cNvPr>
+          <p:cNvSpPr>
+            <a:spLocks noGrp="1"/>
+          </p:cNvSpPr>
+          <p:nvPr>
+            <p:ph type="body" sz="quarter" idx="11"/>
+          </p:nvPr>
+        </p:nvSpPr>
+        <p:spPr>
+          <a:xfrm>
+            <a:off x="5050315" y="1302545"/>
+            <a:ext cx="3805200" cy="3011623"/>
+          </a:xfrm>
+        </p:spPr>
+        <p:txBody>
+          <a:bodyPr/>
+          <a:lstStyle/>
+          <a:p>
+            <a:r>
+              <a:rPr lang="en-US" dirty="0"/>
+              <a:t>500 random packets sent</a:t>
+            </a:r>
+          </a:p>
+          <a:p>
+            <a:r>
+              <a:rPr lang="en-US" dirty="0"/>
+              <a:t>Movement every 5 packets sent</a:t>
+            </a:r>
+          </a:p>
+          <a:p>
+            <a:r>
+              <a:rPr lang="en-US" dirty="0"/>
+              <a:t>Nodes only move in the X direction</a:t>
+            </a:r>
+          </a:p>
+        </p:txBody>
+      </p:sp>
+      <p:pic>
+        <p:nvPicPr>
+          <p:cNvPr id="5" name="Picture 4">
+            <a:extLst>
+              <a:ext uri="{FF2B5EF4-FFF2-40B4-BE49-F238E27FC236}">
+                <a16:creationId xmlns:a16="http://schemas.microsoft.com/office/drawing/2014/main" id="{B8F3F7EC-D1D2-4118-AAE8-283CB3DC68B7}"/>
+              </a:ext>
+            </a:extLst>
+          </p:cNvPr>
+          <p:cNvPicPr>
+            <a:picLocks noChangeAspect="1"/>
+          </p:cNvPicPr>
+          <p:nvPr/>
+        </p:nvPicPr>
+        <p:blipFill>
+          <a:blip r:embed="rId2"/>
+          <a:stretch>
+            <a:fillRect/>
+          </a:stretch>
+        </p:blipFill>
+        <p:spPr>
+          <a:xfrm>
+            <a:off x="478315" y="1302545"/>
+            <a:ext cx="4571998" cy="3428998"/>
+          </a:xfrm>
+          <a:prstGeom prst="rect">
+            <a:avLst/>
+          </a:prstGeom>
+        </p:spPr>
+      </p:pic>
+    </p:spTree>
+    <p:extLst>
+      <p:ext uri="{BB962C8B-B14F-4D97-AF65-F5344CB8AC3E}">
+        <p14:creationId xmlns:p14="http://schemas.microsoft.com/office/powerpoint/2010/main" val="363591363"/>
+      </p:ext>
+    </p:extLst>
+  </p:cSld>
+  <p:clrMapOvr>
+    <a:masterClrMapping/>
+  </p:clrMapOvr>
+</p:sld>
+</file>
+
+<file path=ppt/slides/slide23.xml><?xml version="1.0" encoding="utf-8"?>
+<p:sld xmlns:a="http://schemas.openxmlformats.org/drawingml/2006/main" xmlns:r="http://schemas.openxmlformats.org/officeDocument/2006/relationships" xmlns:p="http://schemas.openxmlformats.org/presentationml/2006/main">
+  <p:cSld>
+    <p:spTree>
+      <p:nvGrpSpPr>
+        <p:cNvPr id="1" name=""/>
+        <p:cNvGrpSpPr/>
+        <p:nvPr/>
+      </p:nvGrpSpPr>
+      <p:grpSpPr>
+        <a:xfrm>
+          <a:off x="0" y="0"/>
+          <a:ext cx="0" cy="0"/>
+          <a:chOff x="0" y="0"/>
+          <a:chExt cx="0" cy="0"/>
+        </a:xfrm>
+      </p:grpSpPr>
+      <p:sp>
+        <p:nvSpPr>
+          <p:cNvPr id="2" name="Text Placeholder 1">
+            <a:extLst>
+              <a:ext uri="{FF2B5EF4-FFF2-40B4-BE49-F238E27FC236}">
+                <a16:creationId xmlns:a16="http://schemas.microsoft.com/office/drawing/2014/main" id="{55F5DA41-E620-4CD7-8D1E-DDAC4A88CC52}"/>
+              </a:ext>
+            </a:extLst>
+          </p:cNvPr>
+          <p:cNvSpPr>
+            <a:spLocks noGrp="1"/>
+          </p:cNvSpPr>
+          <p:nvPr>
+            <p:ph type="body" sz="quarter" idx="10"/>
+          </p:nvPr>
+        </p:nvSpPr>
+        <p:spPr/>
+        <p:txBody>
+          <a:bodyPr/>
+          <a:lstStyle/>
+          <a:p>
+            <a:pPr algn="ctr"/>
+            <a:r>
+              <a:rPr lang="en-US" dirty="0"/>
+              <a:t>One-Dimensional Network</a:t>
+            </a:r>
+          </a:p>
+        </p:txBody>
+      </p:sp>
+      <p:pic>
+        <p:nvPicPr>
+          <p:cNvPr id="5" name="Picture 4">
+            <a:extLst>
+              <a:ext uri="{FF2B5EF4-FFF2-40B4-BE49-F238E27FC236}">
+                <a16:creationId xmlns:a16="http://schemas.microsoft.com/office/drawing/2014/main" id="{B8F3F7EC-D1D2-4118-AAE8-283CB3DC68B7}"/>
+              </a:ext>
+            </a:extLst>
+          </p:cNvPr>
+          <p:cNvPicPr>
+            <a:picLocks noChangeAspect="1"/>
+          </p:cNvPicPr>
+          <p:nvPr/>
+        </p:nvPicPr>
+        <p:blipFill>
+          <a:blip r:embed="rId2"/>
+          <a:stretch>
+            <a:fillRect/>
+          </a:stretch>
+        </p:blipFill>
+        <p:spPr>
+          <a:xfrm>
+            <a:off x="4604068" y="1324930"/>
+            <a:ext cx="3657600" cy="2743200"/>
+          </a:xfrm>
+          <a:prstGeom prst="rect">
+            <a:avLst/>
+          </a:prstGeom>
+        </p:spPr>
+      </p:pic>
+      <p:pic>
+        <p:nvPicPr>
+          <p:cNvPr id="7" name="Picture 6">
+            <a:extLst>
+              <a:ext uri="{FF2B5EF4-FFF2-40B4-BE49-F238E27FC236}">
+                <a16:creationId xmlns:a16="http://schemas.microsoft.com/office/drawing/2014/main" id="{85C83E08-54BC-4C69-A435-D1171B7B2760}"/>
+              </a:ext>
+            </a:extLst>
+          </p:cNvPr>
+          <p:cNvPicPr>
+            <a:picLocks noChangeAspect="1"/>
+          </p:cNvPicPr>
+          <p:nvPr/>
+        </p:nvPicPr>
+        <p:blipFill>
+          <a:blip r:embed="rId3"/>
+          <a:stretch>
+            <a:fillRect/>
+          </a:stretch>
+        </p:blipFill>
+        <p:spPr>
+          <a:xfrm>
+            <a:off x="610798" y="1324930"/>
+            <a:ext cx="3657600" cy="2743200"/>
+          </a:xfrm>
+          <a:prstGeom prst="rect">
+            <a:avLst/>
+          </a:prstGeom>
+        </p:spPr>
+      </p:pic>
+      <p:sp>
+        <p:nvSpPr>
+          <p:cNvPr id="8" name="Text Placeholder 1">
+            <a:extLst>
+              <a:ext uri="{FF2B5EF4-FFF2-40B4-BE49-F238E27FC236}">
+                <a16:creationId xmlns:a16="http://schemas.microsoft.com/office/drawing/2014/main" id="{B29FC31F-B482-4137-A969-CF7645980203}"/>
+              </a:ext>
+            </a:extLst>
+          </p:cNvPr>
+          <p:cNvSpPr txBox="1">
+            <a:spLocks/>
+          </p:cNvSpPr>
+          <p:nvPr/>
+        </p:nvSpPr>
+        <p:spPr>
+          <a:xfrm>
+            <a:off x="671758" y="928519"/>
+            <a:ext cx="3657600" cy="396411"/>
+          </a:xfrm>
+          <a:prstGeom prst="rect">
+            <a:avLst/>
+          </a:prstGeom>
+        </p:spPr>
+        <p:txBody>
+          <a:bodyPr>
+            <a:normAutofit/>
+          </a:bodyPr>
+          <a:lstStyle>
+            <a:lvl1pPr marL="0" indent="0" algn="l" defTabSz="457200" rtl="0" eaLnBrk="1" latinLnBrk="0" hangingPunct="1">
+              <a:lnSpc>
+                <a:spcPct val="90000"/>
+              </a:lnSpc>
+              <a:spcBef>
+                <a:spcPct val="20000"/>
+              </a:spcBef>
+              <a:buFont typeface="Arial"/>
+              <a:buNone/>
+              <a:defRPr sz="3000" b="0" i="0" kern="1200" baseline="0">
+                <a:solidFill>
+                  <a:srgbClr val="003B49"/>
+                </a:solidFill>
+                <a:latin typeface="Orgon Slab Medium"/>
+                <a:ea typeface="+mn-ea"/>
+                <a:cs typeface="Orgon Slab Medium"/>
+              </a:defRPr>
+            </a:lvl1pPr>
+            <a:lvl2pPr marL="457200" indent="0" algn="l" defTabSz="457200" rtl="0" eaLnBrk="1" latinLnBrk="0" hangingPunct="1">
+              <a:spcBef>
+                <a:spcPct val="20000"/>
+              </a:spcBef>
+              <a:buFont typeface="Arial"/>
+              <a:buNone/>
+              <a:defRPr sz="2800" b="0" i="0" kern="1200">
+                <a:solidFill>
+                  <a:srgbClr val="E8D3A2"/>
+                </a:solidFill>
+                <a:latin typeface="Encode Sans Normal Black"/>
+                <a:ea typeface="+mn-ea"/>
+                <a:cs typeface="Encode Sans Normal Black"/>
+              </a:defRPr>
+            </a:lvl2pPr>
+            <a:lvl3pPr marL="914400" indent="0" algn="l" defTabSz="457200" rtl="0" eaLnBrk="1" latinLnBrk="0" hangingPunct="1">
+              <a:spcBef>
+                <a:spcPct val="20000"/>
+              </a:spcBef>
+              <a:buFont typeface="Arial"/>
+              <a:buNone/>
+              <a:defRPr sz="2400" b="0" i="0" kern="1200">
+                <a:solidFill>
+                  <a:srgbClr val="E8D3A2"/>
+                </a:solidFill>
+                <a:latin typeface="Encode Sans Normal Black"/>
+                <a:ea typeface="+mn-ea"/>
+                <a:cs typeface="Encode Sans Normal Black"/>
+              </a:defRPr>
+            </a:lvl3pPr>
+            <a:lvl4pPr marL="1371600" indent="0" algn="l" defTabSz="457200" rtl="0" eaLnBrk="1" latinLnBrk="0" hangingPunct="1">
+              <a:spcBef>
+                <a:spcPct val="20000"/>
+              </a:spcBef>
+              <a:buFont typeface="Arial"/>
+              <a:buNone/>
+              <a:defRPr sz="2000" b="0" i="0" kern="1200">
+                <a:solidFill>
+                  <a:srgbClr val="E8D3A2"/>
+                </a:solidFill>
+                <a:latin typeface="Encode Sans Normal Black"/>
+                <a:ea typeface="+mn-ea"/>
+                <a:cs typeface="Encode Sans Normal Black"/>
+              </a:defRPr>
+            </a:lvl4pPr>
+            <a:lvl5pPr marL="1828800" indent="0" algn="l" defTabSz="457200" rtl="0" eaLnBrk="1" latinLnBrk="0" hangingPunct="1">
+              <a:spcBef>
+                <a:spcPct val="20000"/>
+              </a:spcBef>
+              <a:buFont typeface="Arial"/>
+              <a:buNone/>
+              <a:defRPr sz="2000" b="0" i="0" kern="1200">
+                <a:solidFill>
+                  <a:srgbClr val="E8D3A2"/>
+                </a:solidFill>
+                <a:latin typeface="Encode Sans Normal Black"/>
+                <a:ea typeface="+mn-ea"/>
+                <a:cs typeface="Encode Sans Normal Black"/>
+              </a:defRPr>
+            </a:lvl5pPr>
+            <a:lvl6pPr marL="2514600" indent="-228600" algn="l" defTabSz="457200" rtl="0" eaLnBrk="1" latinLnBrk="0" hangingPunct="1">
+              <a:spcBef>
+                <a:spcPct val="20000"/>
+              </a:spcBef>
+              <a:buFont typeface="Arial"/>
+              <a:buChar char="•"/>
+              <a:defRPr sz="2000" kern="1200">
+                <a:solidFill>
+                  <a:schemeClr val="tx1"/>
+                </a:solidFill>
+                <a:latin typeface="+mn-lt"/>
+                <a:ea typeface="+mn-ea"/>
+                <a:cs typeface="+mn-cs"/>
+              </a:defRPr>
+            </a:lvl6pPr>
+            <a:lvl7pPr marL="2971800" indent="-228600" algn="l" defTabSz="457200" rtl="0" eaLnBrk="1" latinLnBrk="0" hangingPunct="1">
+              <a:spcBef>
+                <a:spcPct val="20000"/>
+              </a:spcBef>
+              <a:buFont typeface="Arial"/>
+              <a:buChar char="•"/>
+              <a:defRPr sz="2000" kern="1200">
+                <a:solidFill>
+                  <a:schemeClr val="tx1"/>
+                </a:solidFill>
+                <a:latin typeface="+mn-lt"/>
+                <a:ea typeface="+mn-ea"/>
+                <a:cs typeface="+mn-cs"/>
+              </a:defRPr>
+            </a:lvl7pPr>
+            <a:lvl8pPr marL="3429000" indent="-228600" algn="l" defTabSz="457200" rtl="0" eaLnBrk="1" latinLnBrk="0" hangingPunct="1">
+              <a:spcBef>
+                <a:spcPct val="20000"/>
+              </a:spcBef>
+              <a:buFont typeface="Arial"/>
+              <a:buChar char="•"/>
+              <a:defRPr sz="2000" kern="1200">
+                <a:solidFill>
+                  <a:schemeClr val="tx1"/>
+                </a:solidFill>
+                <a:latin typeface="+mn-lt"/>
+                <a:ea typeface="+mn-ea"/>
+                <a:cs typeface="+mn-cs"/>
+              </a:defRPr>
+            </a:lvl8pPr>
+            <a:lvl9pPr marL="3886200" indent="-228600" algn="l" defTabSz="457200" rtl="0" eaLnBrk="1" latinLnBrk="0" hangingPunct="1">
+              <a:spcBef>
+                <a:spcPct val="20000"/>
+              </a:spcBef>
+              <a:buFont typeface="Arial"/>
+              <a:buChar char="•"/>
+              <a:defRPr sz="2000" kern="1200">
+                <a:solidFill>
+                  <a:schemeClr val="tx1"/>
+                </a:solidFill>
+                <a:latin typeface="+mn-lt"/>
+                <a:ea typeface="+mn-ea"/>
+                <a:cs typeface="+mn-cs"/>
+              </a:defRPr>
+            </a:lvl9pPr>
+          </a:lstStyle>
+          <a:p>
+            <a:pPr algn="ctr"/>
+            <a:r>
+              <a:rPr lang="en-US" sz="1600" u="sng" dirty="0"/>
+              <a:t>Two-Dimensional Network</a:t>
+            </a:r>
+          </a:p>
+        </p:txBody>
+      </p:sp>
+      <p:sp>
+        <p:nvSpPr>
+          <p:cNvPr id="9" name="Text Placeholder 1">
+            <a:extLst>
+              <a:ext uri="{FF2B5EF4-FFF2-40B4-BE49-F238E27FC236}">
+                <a16:creationId xmlns:a16="http://schemas.microsoft.com/office/drawing/2014/main" id="{C4C0F993-7AE3-48EC-8AAD-E472C683DB50}"/>
+              </a:ext>
+            </a:extLst>
+          </p:cNvPr>
+          <p:cNvSpPr txBox="1">
+            <a:spLocks/>
+          </p:cNvSpPr>
+          <p:nvPr/>
+        </p:nvSpPr>
+        <p:spPr>
+          <a:xfrm>
+            <a:off x="4512238" y="928519"/>
+            <a:ext cx="3657600" cy="396411"/>
+          </a:xfrm>
+          <a:prstGeom prst="rect">
+            <a:avLst/>
+          </a:prstGeom>
+        </p:spPr>
+        <p:txBody>
+          <a:bodyPr>
+            <a:normAutofit/>
+          </a:bodyPr>
+          <a:lstStyle>
+            <a:lvl1pPr marL="0" indent="0" algn="l" defTabSz="457200" rtl="0" eaLnBrk="1" latinLnBrk="0" hangingPunct="1">
+              <a:lnSpc>
+                <a:spcPct val="90000"/>
+              </a:lnSpc>
+              <a:spcBef>
+                <a:spcPct val="20000"/>
+              </a:spcBef>
+              <a:buFont typeface="Arial"/>
+              <a:buNone/>
+              <a:defRPr sz="3000" b="0" i="0" kern="1200" baseline="0">
+                <a:solidFill>
+                  <a:srgbClr val="003B49"/>
+                </a:solidFill>
+                <a:latin typeface="Orgon Slab Medium"/>
+                <a:ea typeface="+mn-ea"/>
+                <a:cs typeface="Orgon Slab Medium"/>
+              </a:defRPr>
+            </a:lvl1pPr>
+            <a:lvl2pPr marL="457200" indent="0" algn="l" defTabSz="457200" rtl="0" eaLnBrk="1" latinLnBrk="0" hangingPunct="1">
+              <a:spcBef>
+                <a:spcPct val="20000"/>
+              </a:spcBef>
+              <a:buFont typeface="Arial"/>
+              <a:buNone/>
+              <a:defRPr sz="2800" b="0" i="0" kern="1200">
+                <a:solidFill>
+                  <a:srgbClr val="E8D3A2"/>
+                </a:solidFill>
+                <a:latin typeface="Encode Sans Normal Black"/>
+                <a:ea typeface="+mn-ea"/>
+                <a:cs typeface="Encode Sans Normal Black"/>
+              </a:defRPr>
+            </a:lvl2pPr>
+            <a:lvl3pPr marL="914400" indent="0" algn="l" defTabSz="457200" rtl="0" eaLnBrk="1" latinLnBrk="0" hangingPunct="1">
+              <a:spcBef>
+                <a:spcPct val="20000"/>
+              </a:spcBef>
+              <a:buFont typeface="Arial"/>
+              <a:buNone/>
+              <a:defRPr sz="2400" b="0" i="0" kern="1200">
+                <a:solidFill>
+                  <a:srgbClr val="E8D3A2"/>
+                </a:solidFill>
+                <a:latin typeface="Encode Sans Normal Black"/>
+                <a:ea typeface="+mn-ea"/>
+                <a:cs typeface="Encode Sans Normal Black"/>
+              </a:defRPr>
+            </a:lvl3pPr>
+            <a:lvl4pPr marL="1371600" indent="0" algn="l" defTabSz="457200" rtl="0" eaLnBrk="1" latinLnBrk="0" hangingPunct="1">
+              <a:spcBef>
+                <a:spcPct val="20000"/>
+              </a:spcBef>
+              <a:buFont typeface="Arial"/>
+              <a:buNone/>
+              <a:defRPr sz="2000" b="0" i="0" kern="1200">
+                <a:solidFill>
+                  <a:srgbClr val="E8D3A2"/>
+                </a:solidFill>
+                <a:latin typeface="Encode Sans Normal Black"/>
+                <a:ea typeface="+mn-ea"/>
+                <a:cs typeface="Encode Sans Normal Black"/>
+              </a:defRPr>
+            </a:lvl4pPr>
+            <a:lvl5pPr marL="1828800" indent="0" algn="l" defTabSz="457200" rtl="0" eaLnBrk="1" latinLnBrk="0" hangingPunct="1">
+              <a:spcBef>
+                <a:spcPct val="20000"/>
+              </a:spcBef>
+              <a:buFont typeface="Arial"/>
+              <a:buNone/>
+              <a:defRPr sz="2000" b="0" i="0" kern="1200">
+                <a:solidFill>
+                  <a:srgbClr val="E8D3A2"/>
+                </a:solidFill>
+                <a:latin typeface="Encode Sans Normal Black"/>
+                <a:ea typeface="+mn-ea"/>
+                <a:cs typeface="Encode Sans Normal Black"/>
+              </a:defRPr>
+            </a:lvl5pPr>
+            <a:lvl6pPr marL="2514600" indent="-228600" algn="l" defTabSz="457200" rtl="0" eaLnBrk="1" latinLnBrk="0" hangingPunct="1">
+              <a:spcBef>
+                <a:spcPct val="20000"/>
+              </a:spcBef>
+              <a:buFont typeface="Arial"/>
+              <a:buChar char="•"/>
+              <a:defRPr sz="2000" kern="1200">
+                <a:solidFill>
+                  <a:schemeClr val="tx1"/>
+                </a:solidFill>
+                <a:latin typeface="+mn-lt"/>
+                <a:ea typeface="+mn-ea"/>
+                <a:cs typeface="+mn-cs"/>
+              </a:defRPr>
+            </a:lvl6pPr>
+            <a:lvl7pPr marL="2971800" indent="-228600" algn="l" defTabSz="457200" rtl="0" eaLnBrk="1" latinLnBrk="0" hangingPunct="1">
+              <a:spcBef>
+                <a:spcPct val="20000"/>
+              </a:spcBef>
+              <a:buFont typeface="Arial"/>
+              <a:buChar char="•"/>
+              <a:defRPr sz="2000" kern="1200">
+                <a:solidFill>
+                  <a:schemeClr val="tx1"/>
+                </a:solidFill>
+                <a:latin typeface="+mn-lt"/>
+                <a:ea typeface="+mn-ea"/>
+                <a:cs typeface="+mn-cs"/>
+              </a:defRPr>
+            </a:lvl7pPr>
+            <a:lvl8pPr marL="3429000" indent="-228600" algn="l" defTabSz="457200" rtl="0" eaLnBrk="1" latinLnBrk="0" hangingPunct="1">
+              <a:spcBef>
+                <a:spcPct val="20000"/>
+              </a:spcBef>
+              <a:buFont typeface="Arial"/>
+              <a:buChar char="•"/>
+              <a:defRPr sz="2000" kern="1200">
+                <a:solidFill>
+                  <a:schemeClr val="tx1"/>
+                </a:solidFill>
+                <a:latin typeface="+mn-lt"/>
+                <a:ea typeface="+mn-ea"/>
+                <a:cs typeface="+mn-cs"/>
+              </a:defRPr>
+            </a:lvl8pPr>
+            <a:lvl9pPr marL="3886200" indent="-228600" algn="l" defTabSz="457200" rtl="0" eaLnBrk="1" latinLnBrk="0" hangingPunct="1">
+              <a:spcBef>
+                <a:spcPct val="20000"/>
+              </a:spcBef>
+              <a:buFont typeface="Arial"/>
+              <a:buChar char="•"/>
+              <a:defRPr sz="2000" kern="1200">
+                <a:solidFill>
+                  <a:schemeClr val="tx1"/>
+                </a:solidFill>
+                <a:latin typeface="+mn-lt"/>
+                <a:ea typeface="+mn-ea"/>
+                <a:cs typeface="+mn-cs"/>
+              </a:defRPr>
+            </a:lvl9pPr>
+          </a:lstStyle>
+          <a:p>
+            <a:pPr algn="ctr"/>
+            <a:r>
+              <a:rPr lang="en-US" sz="1600" u="sng" dirty="0"/>
+              <a:t>One-Dimensional Network</a:t>
+            </a:r>
+          </a:p>
+        </p:txBody>
+      </p:sp>
+    </p:spTree>
+    <p:extLst>
+      <p:ext uri="{BB962C8B-B14F-4D97-AF65-F5344CB8AC3E}">
+        <p14:creationId xmlns:p14="http://schemas.microsoft.com/office/powerpoint/2010/main" val="3901681337"/>
+      </p:ext>
+    </p:extLst>
+  </p:cSld>
+  <p:clrMapOvr>
+    <a:masterClrMapping/>
+  </p:clrMapOvr>
+</p:sld>
+</file>
+
+<file path=ppt/slides/slide24.xml><?xml version="1.0" encoding="utf-8"?>
+<p:sld xmlns:a="http://schemas.openxmlformats.org/drawingml/2006/main" xmlns:r="http://schemas.openxmlformats.org/officeDocument/2006/relationships" xmlns:p="http://schemas.openxmlformats.org/presentationml/2006/main">
+  <p:cSld>
+    <p:spTree>
+      <p:nvGrpSpPr>
+        <p:cNvPr id="1" name=""/>
+        <p:cNvGrpSpPr/>
+        <p:nvPr/>
+      </p:nvGrpSpPr>
+      <p:grpSpPr>
+        <a:xfrm>
+          <a:off x="0" y="0"/>
+          <a:ext cx="0" cy="0"/>
+          <a:chOff x="0" y="0"/>
+          <a:chExt cx="0" cy="0"/>
+        </a:xfrm>
+      </p:grpSpPr>
+      <p:sp>
+        <p:nvSpPr>
+          <p:cNvPr id="2" name="Text Placeholder 1"/>
+          <p:cNvSpPr>
+            <a:spLocks noGrp="1"/>
+          </p:cNvSpPr>
+          <p:nvPr>
+            <p:ph type="body" sz="quarter" idx="11"/>
+          </p:nvPr>
+        </p:nvSpPr>
+        <p:spPr/>
+        <p:txBody>
+          <a:bodyPr/>
+          <a:lstStyle/>
+          <a:p>
+            <a:r>
+              <a:rPr lang="en-US" dirty="0"/>
+              <a:t>Background</a:t>
+            </a:r>
+          </a:p>
+          <a:p>
+            <a:r>
+              <a:rPr lang="en-US" dirty="0"/>
+              <a:t>Examples</a:t>
+            </a:r>
+          </a:p>
+          <a:p>
+            <a:r>
+              <a:rPr lang="en-US" dirty="0"/>
+              <a:t>Traffic Statistics</a:t>
+            </a:r>
+          </a:p>
+          <a:p>
+            <a:r>
+              <a:rPr lang="en-US" b="1" dirty="0">
+                <a:solidFill>
+                  <a:srgbClr val="005F83"/>
+                </a:solidFill>
+              </a:rPr>
+              <a:t>Future Work</a:t>
+            </a:r>
+          </a:p>
+          <a:p>
+            <a:r>
+              <a:rPr lang="en-US" dirty="0"/>
+              <a:t>Conclusions</a:t>
+            </a:r>
+          </a:p>
+          <a:p>
+            <a:r>
+              <a:rPr lang="en-US" dirty="0"/>
+              <a:t>Demo</a:t>
+            </a:r>
+          </a:p>
+          <a:p>
+            <a:pPr marL="0" indent="0">
+              <a:buNone/>
+            </a:pPr>
+            <a:endParaRPr lang="en-US" dirty="0"/>
+          </a:p>
+        </p:txBody>
+      </p:sp>
+      <p:sp>
+        <p:nvSpPr>
+          <p:cNvPr id="3" name="Text Placeholder 2"/>
+          <p:cNvSpPr>
+            <a:spLocks noGrp="1"/>
+          </p:cNvSpPr>
+          <p:nvPr>
+            <p:ph type="body" sz="quarter" idx="12"/>
+          </p:nvPr>
+        </p:nvSpPr>
+        <p:spPr/>
+        <p:txBody>
+          <a:bodyPr/>
+          <a:lstStyle/>
+          <a:p>
+            <a:r>
+              <a:rPr lang="en-US" dirty="0"/>
+              <a:t>FONTS</a:t>
+            </a:r>
+          </a:p>
+        </p:txBody>
+      </p:sp>
+    </p:spTree>
+    <p:extLst>
+      <p:ext uri="{BB962C8B-B14F-4D97-AF65-F5344CB8AC3E}">
+        <p14:creationId xmlns:p14="http://schemas.microsoft.com/office/powerpoint/2010/main" val="3089451987"/>
+      </p:ext>
+    </p:extLst>
+  </p:cSld>
+  <p:clrMapOvr>
+    <a:masterClrMapping/>
+  </p:clrMapOvr>
+</p:sld>
+</file>
+
+<file path=ppt/slides/slide25.xml><?xml version="1.0" encoding="utf-8"?>
+<p:sld xmlns:a="http://schemas.openxmlformats.org/drawingml/2006/main" xmlns:r="http://schemas.openxmlformats.org/officeDocument/2006/relationships" xmlns:p="http://schemas.openxmlformats.org/presentationml/2006/main">
+  <p:cSld>
+    <p:spTree>
+      <p:nvGrpSpPr>
+        <p:cNvPr id="1" name=""/>
+        <p:cNvGrpSpPr/>
+        <p:nvPr/>
+      </p:nvGrpSpPr>
+      <p:grpSpPr>
+        <a:xfrm>
+          <a:off x="0" y="0"/>
+          <a:ext cx="0" cy="0"/>
+          <a:chOff x="0" y="0"/>
+          <a:chExt cx="0" cy="0"/>
+        </a:xfrm>
+      </p:grpSpPr>
+      <p:sp>
+        <p:nvSpPr>
+          <p:cNvPr id="2" name="Text Placeholder 1">
+            <a:extLst>
+              <a:ext uri="{FF2B5EF4-FFF2-40B4-BE49-F238E27FC236}">
+                <a16:creationId xmlns:a16="http://schemas.microsoft.com/office/drawing/2014/main" id="{943573FB-C3B3-4B58-ADC1-AE3095509BE5}"/>
+              </a:ext>
+            </a:extLst>
+          </p:cNvPr>
+          <p:cNvSpPr>
+            <a:spLocks noGrp="1"/>
+          </p:cNvSpPr>
+          <p:nvPr>
+            <p:ph type="body" sz="quarter" idx="10"/>
+          </p:nvPr>
+        </p:nvSpPr>
+        <p:spPr/>
+        <p:txBody>
+          <a:bodyPr/>
+          <a:lstStyle/>
+          <a:p>
+            <a:r>
+              <a:rPr lang="en-US" dirty="0"/>
+              <a:t>Future Work</a:t>
+            </a:r>
+          </a:p>
+        </p:txBody>
+      </p:sp>
+      <p:sp>
+        <p:nvSpPr>
+          <p:cNvPr id="3" name="Text Placeholder 2">
+            <a:extLst>
+              <a:ext uri="{FF2B5EF4-FFF2-40B4-BE49-F238E27FC236}">
+                <a16:creationId xmlns:a16="http://schemas.microsoft.com/office/drawing/2014/main" id="{7F911014-BE17-4C52-BA45-87B4DB61D8EA}"/>
+              </a:ext>
+            </a:extLst>
+          </p:cNvPr>
+          <p:cNvSpPr>
+            <a:spLocks noGrp="1"/>
+          </p:cNvSpPr>
+          <p:nvPr>
+            <p:ph type="body" sz="quarter" idx="11"/>
+          </p:nvPr>
+        </p:nvSpPr>
+        <p:spPr/>
+        <p:txBody>
+          <a:bodyPr/>
+          <a:lstStyle/>
+          <a:p>
+            <a:r>
+              <a:rPr lang="en-US" dirty="0"/>
+              <a:t>Compare to other protocol like DSDV or DSR</a:t>
+            </a:r>
+          </a:p>
+          <a:p>
+            <a:r>
+              <a:rPr lang="en-US" dirty="0"/>
+              <a:t>Implement other sources of delay such as queuing</a:t>
+            </a:r>
+          </a:p>
+        </p:txBody>
+      </p:sp>
+    </p:spTree>
+    <p:extLst>
+      <p:ext uri="{BB962C8B-B14F-4D97-AF65-F5344CB8AC3E}">
+        <p14:creationId xmlns:p14="http://schemas.microsoft.com/office/powerpoint/2010/main" val="228130827"/>
+      </p:ext>
+    </p:extLst>
+  </p:cSld>
+  <p:clrMapOvr>
+    <a:masterClrMapping/>
+  </p:clrMapOvr>
+</p:sld>
+</file>
+
+<file path=ppt/slides/slide26.xml><?xml version="1.0" encoding="utf-8"?>
+<p:sld xmlns:a="http://schemas.openxmlformats.org/drawingml/2006/main" xmlns:r="http://schemas.openxmlformats.org/officeDocument/2006/relationships" xmlns:p="http://schemas.openxmlformats.org/presentationml/2006/main">
+  <p:cSld>
+    <p:spTree>
+      <p:nvGrpSpPr>
+        <p:cNvPr id="1" name=""/>
+        <p:cNvGrpSpPr/>
+        <p:nvPr/>
+      </p:nvGrpSpPr>
+      <p:grpSpPr>
+        <a:xfrm>
+          <a:off x="0" y="0"/>
+          <a:ext cx="0" cy="0"/>
+          <a:chOff x="0" y="0"/>
+          <a:chExt cx="0" cy="0"/>
+        </a:xfrm>
+      </p:grpSpPr>
+      <p:sp>
+        <p:nvSpPr>
+          <p:cNvPr id="2" name="Text Placeholder 1"/>
+          <p:cNvSpPr>
+            <a:spLocks noGrp="1"/>
+          </p:cNvSpPr>
+          <p:nvPr>
+            <p:ph type="body" sz="quarter" idx="11"/>
+          </p:nvPr>
+        </p:nvSpPr>
+        <p:spPr/>
+        <p:txBody>
+          <a:bodyPr/>
+          <a:lstStyle/>
+          <a:p>
+            <a:r>
+              <a:rPr lang="en-US" dirty="0"/>
+              <a:t>Background</a:t>
+            </a:r>
+          </a:p>
+          <a:p>
+            <a:r>
+              <a:rPr lang="en-US" dirty="0"/>
+              <a:t>Examples</a:t>
+            </a:r>
+          </a:p>
+          <a:p>
+            <a:r>
+              <a:rPr lang="en-US" dirty="0"/>
+              <a:t>Traffic Statistics</a:t>
+            </a:r>
+          </a:p>
+          <a:p>
+            <a:r>
+              <a:rPr lang="en-US" dirty="0"/>
+              <a:t>Future Work</a:t>
+            </a:r>
+          </a:p>
+          <a:p>
+            <a:r>
+              <a:rPr lang="en-US" b="1" dirty="0">
+                <a:solidFill>
+                  <a:srgbClr val="005F83"/>
+                </a:solidFill>
+              </a:rPr>
+              <a:t>Conclusions</a:t>
+            </a:r>
+          </a:p>
+          <a:p>
+            <a:r>
+              <a:rPr lang="en-US" dirty="0"/>
+              <a:t>Demo</a:t>
+            </a:r>
+          </a:p>
+        </p:txBody>
+      </p:sp>
+      <p:sp>
+        <p:nvSpPr>
+          <p:cNvPr id="3" name="Text Placeholder 2"/>
+          <p:cNvSpPr>
+            <a:spLocks noGrp="1"/>
+          </p:cNvSpPr>
+          <p:nvPr>
+            <p:ph type="body" sz="quarter" idx="12"/>
+          </p:nvPr>
+        </p:nvSpPr>
+        <p:spPr/>
+        <p:txBody>
+          <a:bodyPr/>
+          <a:lstStyle/>
+          <a:p>
+            <a:r>
+              <a:rPr lang="en-US" dirty="0"/>
+              <a:t>FONTS</a:t>
+            </a:r>
+          </a:p>
+        </p:txBody>
+      </p:sp>
+    </p:spTree>
+    <p:extLst>
+      <p:ext uri="{BB962C8B-B14F-4D97-AF65-F5344CB8AC3E}">
+        <p14:creationId xmlns:p14="http://schemas.microsoft.com/office/powerpoint/2010/main" val="3523607220"/>
+      </p:ext>
+    </p:extLst>
+  </p:cSld>
+  <p:clrMapOvr>
+    <a:masterClrMapping/>
+  </p:clrMapOvr>
+</p:sld>
+</file>
+
+<file path=ppt/slides/slide27.xml><?xml version="1.0" encoding="utf-8"?>
+<p:sld xmlns:a="http://schemas.openxmlformats.org/drawingml/2006/main" xmlns:r="http://schemas.openxmlformats.org/officeDocument/2006/relationships" xmlns:p="http://schemas.openxmlformats.org/presentationml/2006/main">
+  <p:cSld>
+    <p:spTree>
+      <p:nvGrpSpPr>
+        <p:cNvPr id="1" name=""/>
+        <p:cNvGrpSpPr/>
+        <p:nvPr/>
+      </p:nvGrpSpPr>
+      <p:grpSpPr>
+        <a:xfrm>
+          <a:off x="0" y="0"/>
+          <a:ext cx="0" cy="0"/>
+          <a:chOff x="0" y="0"/>
+          <a:chExt cx="0" cy="0"/>
+        </a:xfrm>
+      </p:grpSpPr>
+      <p:sp>
+        <p:nvSpPr>
+          <p:cNvPr id="2" name="Text Placeholder 1">
+            <a:extLst>
+              <a:ext uri="{FF2B5EF4-FFF2-40B4-BE49-F238E27FC236}">
+                <a16:creationId xmlns:a16="http://schemas.microsoft.com/office/drawing/2014/main" id="{943573FB-C3B3-4B58-ADC1-AE3095509BE5}"/>
+              </a:ext>
+            </a:extLst>
+          </p:cNvPr>
+          <p:cNvSpPr>
+            <a:spLocks noGrp="1"/>
+          </p:cNvSpPr>
+          <p:nvPr>
+            <p:ph type="body" sz="quarter" idx="10"/>
+          </p:nvPr>
+        </p:nvSpPr>
+        <p:spPr/>
+        <p:txBody>
+          <a:bodyPr/>
+          <a:lstStyle/>
+          <a:p>
+            <a:r>
+              <a:rPr lang="en-US" dirty="0"/>
+              <a:t>Conclusions</a:t>
+            </a:r>
+          </a:p>
+        </p:txBody>
+      </p:sp>
+      <p:sp>
+        <p:nvSpPr>
+          <p:cNvPr id="3" name="Text Placeholder 2">
+            <a:extLst>
+              <a:ext uri="{FF2B5EF4-FFF2-40B4-BE49-F238E27FC236}">
+                <a16:creationId xmlns:a16="http://schemas.microsoft.com/office/drawing/2014/main" id="{7F911014-BE17-4C52-BA45-87B4DB61D8EA}"/>
+              </a:ext>
+            </a:extLst>
+          </p:cNvPr>
+          <p:cNvSpPr>
+            <a:spLocks noGrp="1"/>
+          </p:cNvSpPr>
+          <p:nvPr>
+            <p:ph type="body" sz="quarter" idx="11"/>
+          </p:nvPr>
+        </p:nvSpPr>
+        <p:spPr/>
+        <p:txBody>
+          <a:bodyPr/>
+          <a:lstStyle/>
+          <a:p>
+            <a:r>
+              <a:rPr lang="en-US" dirty="0"/>
+              <a:t>Highly congested networks are a burden for any protocol</a:t>
+            </a:r>
+          </a:p>
+          <a:p>
+            <a:r>
+              <a:rPr lang="en-US" dirty="0"/>
+              <a:t>AODV handles link breakage with minimal overhead in simplistic cases</a:t>
+            </a:r>
+          </a:p>
+          <a:p>
+            <a:r>
+              <a:rPr lang="en-US" dirty="0"/>
+              <a:t>Works best when there aren’t multiple routes to choose or cancel out</a:t>
+            </a:r>
+          </a:p>
+          <a:p>
+            <a:endParaRPr lang="en-US" dirty="0"/>
+          </a:p>
+        </p:txBody>
+      </p:sp>
+    </p:spTree>
+    <p:extLst>
+      <p:ext uri="{BB962C8B-B14F-4D97-AF65-F5344CB8AC3E}">
+        <p14:creationId xmlns:p14="http://schemas.microsoft.com/office/powerpoint/2010/main" val="3360119729"/>
+      </p:ext>
+    </p:extLst>
+  </p:cSld>
+  <p:clrMapOvr>
+    <a:masterClrMapping/>
+  </p:clrMapOvr>
+</p:sld>
+</file>
+
+<file path=ppt/slides/slide28.xml><?xml version="1.0" encoding="utf-8"?>
+<p:sld xmlns:a="http://schemas.openxmlformats.org/drawingml/2006/main" xmlns:r="http://schemas.openxmlformats.org/officeDocument/2006/relationships" xmlns:p="http://schemas.openxmlformats.org/presentationml/2006/main">
+  <p:cSld>
+    <p:spTree>
+      <p:nvGrpSpPr>
+        <p:cNvPr id="1" name=""/>
+        <p:cNvGrpSpPr/>
+        <p:nvPr/>
+      </p:nvGrpSpPr>
+      <p:grpSpPr>
+        <a:xfrm>
+          <a:off x="0" y="0"/>
+          <a:ext cx="0" cy="0"/>
+          <a:chOff x="0" y="0"/>
+          <a:chExt cx="0" cy="0"/>
+        </a:xfrm>
+      </p:grpSpPr>
+      <p:sp>
+        <p:nvSpPr>
+          <p:cNvPr id="2" name="Text Placeholder 1"/>
+          <p:cNvSpPr>
+            <a:spLocks noGrp="1"/>
+          </p:cNvSpPr>
+          <p:nvPr>
+            <p:ph type="body" sz="quarter" idx="11"/>
+          </p:nvPr>
+        </p:nvSpPr>
+        <p:spPr/>
+        <p:txBody>
+          <a:bodyPr/>
+          <a:lstStyle/>
+          <a:p>
+            <a:r>
+              <a:rPr lang="en-US" dirty="0"/>
+              <a:t>Background</a:t>
+            </a:r>
+          </a:p>
+          <a:p>
+            <a:r>
+              <a:rPr lang="en-US" dirty="0"/>
+              <a:t>Examples</a:t>
+            </a:r>
+          </a:p>
+          <a:p>
+            <a:r>
+              <a:rPr lang="en-US" dirty="0"/>
+              <a:t>Traffic Statistics</a:t>
+            </a:r>
+          </a:p>
+          <a:p>
+            <a:r>
+              <a:rPr lang="en-US" dirty="0"/>
+              <a:t>Future Work</a:t>
+            </a:r>
+          </a:p>
+          <a:p>
+            <a:r>
+              <a:rPr lang="en-US" dirty="0"/>
+              <a:t>Conclusions</a:t>
+            </a:r>
+          </a:p>
+          <a:p>
+            <a:r>
+              <a:rPr lang="en-US" b="1" dirty="0">
+                <a:solidFill>
+                  <a:srgbClr val="005F83"/>
+                </a:solidFill>
+              </a:rPr>
+              <a:t>Demo</a:t>
+            </a:r>
+          </a:p>
+        </p:txBody>
+      </p:sp>
+      <p:sp>
+        <p:nvSpPr>
+          <p:cNvPr id="3" name="Text Placeholder 2"/>
+          <p:cNvSpPr>
+            <a:spLocks noGrp="1"/>
+          </p:cNvSpPr>
+          <p:nvPr>
+            <p:ph type="body" sz="quarter" idx="12"/>
+          </p:nvPr>
+        </p:nvSpPr>
+        <p:spPr/>
+        <p:txBody>
+          <a:bodyPr/>
+          <a:lstStyle/>
+          <a:p>
+            <a:r>
+              <a:rPr lang="en-US" dirty="0"/>
+              <a:t>FONTS</a:t>
+            </a:r>
+          </a:p>
+        </p:txBody>
+      </p:sp>
+    </p:spTree>
+    <p:extLst>
+      <p:ext uri="{BB962C8B-B14F-4D97-AF65-F5344CB8AC3E}">
+        <p14:creationId xmlns:p14="http://schemas.microsoft.com/office/powerpoint/2010/main" val="26880505"/>
+      </p:ext>
+    </p:extLst>
+  </p:cSld>
+  <p:clrMapOvr>
+    <a:masterClrMapping/>
+  </p:clrMapOvr>
+</p:sld>
+</file>
+
+<file path=ppt/slides/slide29.xml><?xml version="1.0" encoding="utf-8"?>
+<p:sld xmlns:a="http://schemas.openxmlformats.org/drawingml/2006/main" xmlns:r="http://schemas.openxmlformats.org/officeDocument/2006/relationships" xmlns:p="http://schemas.openxmlformats.org/presentationml/2006/main">
+  <p:cSld>
+    <p:spTree>
+      <p:nvGrpSpPr>
+        <p:cNvPr id="1" name=""/>
+        <p:cNvGrpSpPr/>
+        <p:nvPr/>
+      </p:nvGrpSpPr>
+      <p:grpSpPr>
+        <a:xfrm>
+          <a:off x="0" y="0"/>
+          <a:ext cx="0" cy="0"/>
+          <a:chOff x="0" y="0"/>
+          <a:chExt cx="0" cy="0"/>
+        </a:xfrm>
+      </p:grpSpPr>
+      <p:sp>
+        <p:nvSpPr>
+          <p:cNvPr id="2" name="Text Placeholder 1">
+            <a:extLst>
+              <a:ext uri="{FF2B5EF4-FFF2-40B4-BE49-F238E27FC236}">
+                <a16:creationId xmlns:a16="http://schemas.microsoft.com/office/drawing/2014/main" id="{943573FB-C3B3-4B58-ADC1-AE3095509BE5}"/>
+              </a:ext>
+            </a:extLst>
+          </p:cNvPr>
+          <p:cNvSpPr>
+            <a:spLocks noGrp="1"/>
+          </p:cNvSpPr>
+          <p:nvPr>
+            <p:ph type="body" sz="quarter" idx="10"/>
+          </p:nvPr>
+        </p:nvSpPr>
+        <p:spPr/>
+        <p:txBody>
+          <a:bodyPr/>
+          <a:lstStyle/>
+          <a:p>
+            <a:pPr algn="ctr"/>
+            <a:r>
+              <a:rPr lang="en-US" dirty="0"/>
+              <a:t>Demo</a:t>
+            </a:r>
+          </a:p>
+        </p:txBody>
+      </p:sp>
+      <p:sp>
+        <p:nvSpPr>
+          <p:cNvPr id="3" name="Text Placeholder 2">
+            <a:extLst>
+              <a:ext uri="{FF2B5EF4-FFF2-40B4-BE49-F238E27FC236}">
+                <a16:creationId xmlns:a16="http://schemas.microsoft.com/office/drawing/2014/main" id="{7F911014-BE17-4C52-BA45-87B4DB61D8EA}"/>
+              </a:ext>
+            </a:extLst>
+          </p:cNvPr>
+          <p:cNvSpPr>
+            <a:spLocks noGrp="1"/>
+          </p:cNvSpPr>
+          <p:nvPr>
+            <p:ph type="body" sz="quarter" idx="11"/>
+          </p:nvPr>
+        </p:nvSpPr>
+        <p:spPr/>
+        <p:txBody>
+          <a:bodyPr/>
+          <a:lstStyle/>
+          <a:p>
+            <a:endParaRPr lang="en-US" dirty="0"/>
+          </a:p>
+        </p:txBody>
+      </p:sp>
+    </p:spTree>
+    <p:extLst>
+      <p:ext uri="{BB962C8B-B14F-4D97-AF65-F5344CB8AC3E}">
+        <p14:creationId xmlns:p14="http://schemas.microsoft.com/office/powerpoint/2010/main" val="1765434017"/>
       </p:ext>
     </p:extLst>
   </p:cSld>
@@ -5142,20 +8183,8 @@
           <a:lstStyle/>
           <a:p>
             <a:r>
-              <a:rPr lang="en-US" dirty="0" err="1"/>
-              <a:t>Rouyting</a:t>
-            </a:r>
-            <a:r>
-              <a:rPr lang="en-US" dirty="0"/>
-              <a:t> </a:t>
-            </a:r>
-            <a:r>
-              <a:rPr lang="en-US" dirty="0" err="1"/>
-              <a:t>protocal</a:t>
-            </a:r>
-            <a:r>
-              <a:rPr lang="en-US" dirty="0"/>
-              <a:t> for ad-hoc wireless networks</a:t>
+              <a:rPr lang="en-US" dirty="0"/>
+              <a:t>Routing protocol for ad-hoc wireless networks</a:t>
             </a:r>
           </a:p>
           <a:p>
@@ -5168,18 +8197,8 @@
           <a:p>
             <a:pPr lvl="1"/>
             <a:r>
-              <a:rPr lang="en-US" sz="1200" dirty="0"/>
-              <a:t>C. Perkins, E. Belding-Royer, S. Das, "Ad hoc On-Demand Distance Vector (AODV) Routing", RFC 3561, July 2003. (</a:t>
-            </a:r>
-            <a:r>
-              <a:rPr lang="en-US" sz="1200" dirty="0">
-                <a:hlinkClick r:id="rId2"/>
-              </a:rPr>
-              <a:t>https://www.rfc-editor.org/rfc/rfc3561.txt</a:t>
-            </a:r>
-            <a:r>
-              <a:rPr lang="en-US" sz="1200" dirty="0"/>
-              <a:t>)</a:t>
+              <a:rPr lang="en-US" sz="1400" dirty="0"/>
+              <a:t>C. Perkins, E. Belding-Royer, S. Das, "Ad hoc On-Demand Distance Vector (AODV) Routing", RFC 3561, July 2003. (https://www.rfc-editor.org/rfc/rfc3561.txt)</a:t>
             </a:r>
           </a:p>
           <a:p>
@@ -5216,7 +8235,7 @@
           <p:nvPr/>
         </p:nvPicPr>
         <p:blipFill>
-          <a:blip r:embed="rId3"/>
+          <a:blip r:embed="rId2"/>
           <a:stretch>
             <a:fillRect/>
           </a:stretch>
@@ -5244,7 +8263,237 @@
 </p:sld>
 </file>
 
+<file path=ppt/slides/slide30.xml><?xml version="1.0" encoding="utf-8"?>
+<p:sld xmlns:a="http://schemas.openxmlformats.org/drawingml/2006/main" xmlns:r="http://schemas.openxmlformats.org/officeDocument/2006/relationships" xmlns:p="http://schemas.openxmlformats.org/presentationml/2006/main">
+  <p:cSld>
+    <p:spTree>
+      <p:nvGrpSpPr>
+        <p:cNvPr id="1" name=""/>
+        <p:cNvGrpSpPr/>
+        <p:nvPr/>
+      </p:nvGrpSpPr>
+      <p:grpSpPr>
+        <a:xfrm>
+          <a:off x="0" y="0"/>
+          <a:ext cx="0" cy="0"/>
+          <a:chOff x="0" y="0"/>
+          <a:chExt cx="0" cy="0"/>
+        </a:xfrm>
+      </p:grpSpPr>
+      <p:sp>
+        <p:nvSpPr>
+          <p:cNvPr id="2" name="Text Placeholder 1">
+            <a:extLst>
+              <a:ext uri="{FF2B5EF4-FFF2-40B4-BE49-F238E27FC236}">
+                <a16:creationId xmlns:a16="http://schemas.microsoft.com/office/drawing/2014/main" id="{943573FB-C3B3-4B58-ADC1-AE3095509BE5}"/>
+              </a:ext>
+            </a:extLst>
+          </p:cNvPr>
+          <p:cNvSpPr>
+            <a:spLocks noGrp="1"/>
+          </p:cNvSpPr>
+          <p:nvPr>
+            <p:ph type="body" sz="quarter" idx="10"/>
+          </p:nvPr>
+        </p:nvSpPr>
+        <p:spPr/>
+        <p:txBody>
+          <a:bodyPr/>
+          <a:lstStyle/>
+          <a:p>
+            <a:pPr algn="ctr"/>
+            <a:r>
+              <a:rPr lang="en-US" dirty="0"/>
+              <a:t>Questions?</a:t>
+            </a:r>
+          </a:p>
+        </p:txBody>
+      </p:sp>
+      <p:sp>
+        <p:nvSpPr>
+          <p:cNvPr id="3" name="Text Placeholder 2">
+            <a:extLst>
+              <a:ext uri="{FF2B5EF4-FFF2-40B4-BE49-F238E27FC236}">
+                <a16:creationId xmlns:a16="http://schemas.microsoft.com/office/drawing/2014/main" id="{7F911014-BE17-4C52-BA45-87B4DB61D8EA}"/>
+              </a:ext>
+            </a:extLst>
+          </p:cNvPr>
+          <p:cNvSpPr>
+            <a:spLocks noGrp="1"/>
+          </p:cNvSpPr>
+          <p:nvPr>
+            <p:ph type="body" sz="quarter" idx="11"/>
+          </p:nvPr>
+        </p:nvSpPr>
+        <p:spPr/>
+        <p:txBody>
+          <a:bodyPr/>
+          <a:lstStyle/>
+          <a:p>
+            <a:endParaRPr lang="en-US" dirty="0"/>
+          </a:p>
+        </p:txBody>
+      </p:sp>
+    </p:spTree>
+    <p:extLst>
+      <p:ext uri="{BB962C8B-B14F-4D97-AF65-F5344CB8AC3E}">
+        <p14:creationId xmlns:p14="http://schemas.microsoft.com/office/powerpoint/2010/main" val="2244184403"/>
+      </p:ext>
+    </p:extLst>
+  </p:cSld>
+  <p:clrMapOvr>
+    <a:masterClrMapping/>
+  </p:clrMapOvr>
+</p:sld>
+</file>
+
 <file path=ppt/slides/slide4.xml><?xml version="1.0" encoding="utf-8"?>
+<p:sld xmlns:a="http://schemas.openxmlformats.org/drawingml/2006/main" xmlns:r="http://schemas.openxmlformats.org/officeDocument/2006/relationships" xmlns:p="http://schemas.openxmlformats.org/presentationml/2006/main">
+  <p:cSld>
+    <p:spTree>
+      <p:nvGrpSpPr>
+        <p:cNvPr id="1" name=""/>
+        <p:cNvGrpSpPr/>
+        <p:nvPr/>
+      </p:nvGrpSpPr>
+      <p:grpSpPr>
+        <a:xfrm>
+          <a:off x="0" y="0"/>
+          <a:ext cx="0" cy="0"/>
+          <a:chOff x="0" y="0"/>
+          <a:chExt cx="0" cy="0"/>
+        </a:xfrm>
+      </p:grpSpPr>
+      <p:sp>
+        <p:nvSpPr>
+          <p:cNvPr id="2" name="Text Placeholder 1">
+            <a:extLst>
+              <a:ext uri="{FF2B5EF4-FFF2-40B4-BE49-F238E27FC236}">
+                <a16:creationId xmlns:a16="http://schemas.microsoft.com/office/drawing/2014/main" id="{CD57BD8E-20DB-41BE-9BE5-F884A5186C62}"/>
+              </a:ext>
+            </a:extLst>
+          </p:cNvPr>
+          <p:cNvSpPr>
+            <a:spLocks noGrp="1"/>
+          </p:cNvSpPr>
+          <p:nvPr>
+            <p:ph type="body" sz="quarter" idx="10"/>
+          </p:nvPr>
+        </p:nvSpPr>
+        <p:spPr/>
+        <p:txBody>
+          <a:bodyPr/>
+          <a:lstStyle/>
+          <a:p>
+            <a:r>
+              <a:rPr lang="en-US" dirty="0"/>
+              <a:t>AODV Principles</a:t>
+            </a:r>
+          </a:p>
+        </p:txBody>
+      </p:sp>
+      <p:sp>
+        <p:nvSpPr>
+          <p:cNvPr id="3" name="Text Placeholder 2">
+            <a:extLst>
+              <a:ext uri="{FF2B5EF4-FFF2-40B4-BE49-F238E27FC236}">
+                <a16:creationId xmlns:a16="http://schemas.microsoft.com/office/drawing/2014/main" id="{62075AB4-9BB2-4F9B-B536-EC1814FA5F4B}"/>
+              </a:ext>
+            </a:extLst>
+          </p:cNvPr>
+          <p:cNvSpPr>
+            <a:spLocks noGrp="1"/>
+          </p:cNvSpPr>
+          <p:nvPr>
+            <p:ph type="body" sz="quarter" idx="11"/>
+          </p:nvPr>
+        </p:nvSpPr>
+        <p:spPr/>
+        <p:txBody>
+          <a:bodyPr/>
+          <a:lstStyle/>
+          <a:p>
+            <a:r>
+              <a:rPr lang="en-US" dirty="0"/>
+              <a:t>Reactive routing protocol</a:t>
+            </a:r>
+          </a:p>
+          <a:p>
+            <a:r>
+              <a:rPr lang="en-US" dirty="0"/>
+              <a:t>Reduces network-wide broadcasts</a:t>
+            </a:r>
+          </a:p>
+          <a:p>
+            <a:r>
+              <a:rPr lang="en-US" dirty="0"/>
+              <a:t>Lower overhead</a:t>
+            </a:r>
+          </a:p>
+          <a:p>
+            <a:r>
+              <a:rPr lang="en-US" dirty="0"/>
+              <a:t>Discovers routes only as necessary</a:t>
+            </a:r>
+          </a:p>
+          <a:p>
+            <a:r>
+              <a:rPr lang="en-US" dirty="0"/>
+              <a:t>Relies on flooding for route discovery</a:t>
+            </a:r>
+          </a:p>
+          <a:p>
+            <a:r>
+              <a:rPr lang="en-US" dirty="0"/>
+              <a:t>Each node maintains its own route table</a:t>
+            </a:r>
+          </a:p>
+        </p:txBody>
+      </p:sp>
+      <p:pic>
+        <p:nvPicPr>
+          <p:cNvPr id="4" name="Picture 3">
+            <a:extLst>
+              <a:ext uri="{FF2B5EF4-FFF2-40B4-BE49-F238E27FC236}">
+                <a16:creationId xmlns:a16="http://schemas.microsoft.com/office/drawing/2014/main" id="{C0AB23B9-AF7F-4DAC-9136-9887F491618A}"/>
+              </a:ext>
+            </a:extLst>
+          </p:cNvPr>
+          <p:cNvPicPr>
+            <a:picLocks noChangeAspect="1"/>
+          </p:cNvPicPr>
+          <p:nvPr/>
+        </p:nvPicPr>
+        <p:blipFill>
+          <a:blip r:embed="rId2"/>
+          <a:stretch>
+            <a:fillRect/>
+          </a:stretch>
+        </p:blipFill>
+        <p:spPr>
+          <a:xfrm>
+            <a:off x="6350738" y="2072640"/>
+            <a:ext cx="2504777" cy="1885950"/>
+          </a:xfrm>
+          <a:prstGeom prst="rect">
+            <a:avLst/>
+          </a:prstGeom>
+        </p:spPr>
+      </p:pic>
+    </p:spTree>
+    <p:extLst>
+      <p:ext uri="{BB962C8B-B14F-4D97-AF65-F5344CB8AC3E}">
+        <p14:creationId xmlns:p14="http://schemas.microsoft.com/office/powerpoint/2010/main" val="795622934"/>
+      </p:ext>
+    </p:extLst>
+  </p:cSld>
+  <p:clrMapOvr>
+    <a:masterClrMapping/>
+  </p:clrMapOvr>
+</p:sld>
+</file>
+
+<file path=ppt/slides/slide5.xml><?xml version="1.0" encoding="utf-8"?>
 <p:sld xmlns:a="http://schemas.openxmlformats.org/drawingml/2006/main" xmlns:r="http://schemas.openxmlformats.org/officeDocument/2006/relationships" xmlns:p="http://schemas.openxmlformats.org/presentationml/2006/main">
   <p:cSld>
     <p:spTree>
@@ -5538,7 +8787,118 @@
 </p:sld>
 </file>
 
-<file path=ppt/slides/slide5.xml><?xml version="1.0" encoding="utf-8"?>
+<file path=ppt/slides/slide6.xml><?xml version="1.0" encoding="utf-8"?>
+<p:sld xmlns:a="http://schemas.openxmlformats.org/drawingml/2006/main" xmlns:r="http://schemas.openxmlformats.org/officeDocument/2006/relationships" xmlns:p="http://schemas.openxmlformats.org/presentationml/2006/main">
+  <p:cSld>
+    <p:spTree>
+      <p:nvGrpSpPr>
+        <p:cNvPr id="1" name=""/>
+        <p:cNvGrpSpPr/>
+        <p:nvPr/>
+      </p:nvGrpSpPr>
+      <p:grpSpPr>
+        <a:xfrm>
+          <a:off x="0" y="0"/>
+          <a:ext cx="0" cy="0"/>
+          <a:chOff x="0" y="0"/>
+          <a:chExt cx="0" cy="0"/>
+        </a:xfrm>
+      </p:grpSpPr>
+      <p:sp>
+        <p:nvSpPr>
+          <p:cNvPr id="2" name="Text Placeholder 1"/>
+          <p:cNvSpPr>
+            <a:spLocks noGrp="1"/>
+          </p:cNvSpPr>
+          <p:nvPr>
+            <p:ph type="body" sz="quarter" idx="11"/>
+          </p:nvPr>
+        </p:nvSpPr>
+        <p:spPr/>
+        <p:txBody>
+          <a:bodyPr/>
+          <a:lstStyle/>
+          <a:p>
+            <a:r>
+              <a:rPr lang="en-US" dirty="0"/>
+              <a:t>Background</a:t>
+            </a:r>
+          </a:p>
+          <a:p>
+            <a:r>
+              <a:rPr lang="en-US" b="1" dirty="0">
+                <a:solidFill>
+                  <a:srgbClr val="005F83"/>
+                </a:solidFill>
+              </a:rPr>
+              <a:t>Examples</a:t>
+            </a:r>
+          </a:p>
+          <a:p>
+            <a:r>
+              <a:rPr lang="en-US" dirty="0"/>
+              <a:t>Traffic Statistics</a:t>
+            </a:r>
+          </a:p>
+          <a:p>
+            <a:r>
+              <a:rPr lang="en-US" dirty="0"/>
+              <a:t>Future Work</a:t>
+            </a:r>
+          </a:p>
+          <a:p>
+            <a:r>
+              <a:rPr lang="en-US" dirty="0"/>
+              <a:t>Conclusions</a:t>
+            </a:r>
+          </a:p>
+          <a:p>
+            <a:r>
+              <a:rPr lang="en-US" dirty="0"/>
+              <a:t>Demo</a:t>
+            </a:r>
+          </a:p>
+          <a:p>
+            <a:endParaRPr lang="en-US" dirty="0"/>
+          </a:p>
+        </p:txBody>
+      </p:sp>
+      <p:sp>
+        <p:nvSpPr>
+          <p:cNvPr id="3" name="Text Placeholder 2"/>
+          <p:cNvSpPr>
+            <a:spLocks noGrp="1"/>
+          </p:cNvSpPr>
+          <p:nvPr>
+            <p:ph type="body" sz="quarter" idx="12"/>
+          </p:nvPr>
+        </p:nvSpPr>
+        <p:spPr/>
+        <p:txBody>
+          <a:bodyPr/>
+          <a:lstStyle/>
+          <a:p>
+            <a:r>
+              <a:rPr lang="en-US" dirty="0"/>
+              <a:t>FONTS</a:t>
+            </a:r>
+          </a:p>
+        </p:txBody>
+      </p:sp>
+    </p:spTree>
+    <p:extLst>
+      <p:ext uri="{BB962C8B-B14F-4D97-AF65-F5344CB8AC3E}">
+        <p14:creationId xmlns:p14="http://schemas.microsoft.com/office/powerpoint/2010/main" val="358135004"/>
+      </p:ext>
+    </p:extLst>
+  </p:cSld>
+  <p:clrMapOvr>
+    <a:masterClrMapping/>
+  </p:clrMapOvr>
+</p:sld>
+</file>
+
+<file path=ppt/slides/slide7.xml><?xml version="1.0" encoding="utf-8"?>
 <p:sld xmlns:a="http://schemas.openxmlformats.org/drawingml/2006/main" xmlns:r="http://schemas.openxmlformats.org/officeDocument/2006/relationships" xmlns:p="http://schemas.openxmlformats.org/presentationml/2006/main">
   <p:cSld>
     <p:spTree>
@@ -5824,7 +9184,7 @@
 </p:sld>
 </file>
 
-<file path=ppt/slides/slide6.xml><?xml version="1.0" encoding="utf-8"?>
+<file path=ppt/slides/slide8.xml><?xml version="1.0" encoding="utf-8"?>
 <p:sld xmlns:a="http://schemas.openxmlformats.org/drawingml/2006/main" xmlns:r="http://schemas.openxmlformats.org/officeDocument/2006/relationships" xmlns:p="http://schemas.openxmlformats.org/presentationml/2006/main">
   <p:cSld>
     <p:spTree>
@@ -5977,379 +9337,6 @@
 </p:sld>
 </file>
 
-<file path=ppt/slides/slide7.xml><?xml version="1.0" encoding="utf-8"?>
-<p:sld xmlns:a="http://schemas.openxmlformats.org/drawingml/2006/main" xmlns:r="http://schemas.openxmlformats.org/officeDocument/2006/relationships" xmlns:p="http://schemas.openxmlformats.org/presentationml/2006/main">
-  <p:cSld>
-    <p:spTree>
-      <p:nvGrpSpPr>
-        <p:cNvPr id="1" name=""/>
-        <p:cNvGrpSpPr/>
-        <p:nvPr/>
-      </p:nvGrpSpPr>
-      <p:grpSpPr>
-        <a:xfrm>
-          <a:off x="0" y="0"/>
-          <a:ext cx="0" cy="0"/>
-          <a:chOff x="0" y="0"/>
-          <a:chExt cx="0" cy="0"/>
-        </a:xfrm>
-      </p:grpSpPr>
-      <p:sp>
-        <p:nvSpPr>
-          <p:cNvPr id="2" name="Text Placeholder 1">
-            <a:extLst>
-              <a:ext uri="{FF2B5EF4-FFF2-40B4-BE49-F238E27FC236}">
-                <a16:creationId xmlns:a16="http://schemas.microsoft.com/office/drawing/2014/main" id="{ADFB35E9-CC85-4222-B528-A8EC5746E9C3}"/>
-              </a:ext>
-            </a:extLst>
-          </p:cNvPr>
-          <p:cNvSpPr>
-            <a:spLocks noGrp="1"/>
-          </p:cNvSpPr>
-          <p:nvPr>
-            <p:ph type="body" sz="quarter" idx="10"/>
-          </p:nvPr>
-        </p:nvSpPr>
-        <p:spPr/>
-        <p:txBody>
-          <a:bodyPr/>
-          <a:lstStyle/>
-          <a:p>
-            <a:pPr algn="ctr"/>
-            <a:r>
-              <a:rPr lang="en-US" dirty="0"/>
-              <a:t>Example 2</a:t>
-            </a:r>
-          </a:p>
-        </p:txBody>
-      </p:sp>
-      <p:sp>
-        <p:nvSpPr>
-          <p:cNvPr id="3" name="Text Placeholder 2">
-            <a:extLst>
-              <a:ext uri="{FF2B5EF4-FFF2-40B4-BE49-F238E27FC236}">
-                <a16:creationId xmlns:a16="http://schemas.microsoft.com/office/drawing/2014/main" id="{CAE15260-3969-4A3E-93CB-F0D1C7E8B4FA}"/>
-              </a:ext>
-            </a:extLst>
-          </p:cNvPr>
-          <p:cNvSpPr>
-            <a:spLocks noGrp="1"/>
-          </p:cNvSpPr>
-          <p:nvPr>
-            <p:ph type="body" sz="quarter" idx="11"/>
-          </p:nvPr>
-        </p:nvSpPr>
-        <p:spPr>
-          <a:xfrm>
-            <a:off x="2674619" y="1022633"/>
-            <a:ext cx="6180895" cy="3291536"/>
-          </a:xfrm>
-        </p:spPr>
-        <p:txBody>
-          <a:bodyPr/>
-          <a:lstStyle/>
-          <a:p>
-            <a:pPr lvl="1"/>
-            <a:r>
-              <a:rPr lang="en-US" dirty="0"/>
-              <a:t>Sending node C -&gt; G</a:t>
-            </a:r>
-          </a:p>
-          <a:p>
-            <a:pPr lvl="1"/>
-            <a:r>
-              <a:rPr lang="en-US" dirty="0"/>
-              <a:t>Intermediates nodes have route info from Ex. 1</a:t>
-            </a:r>
-          </a:p>
-          <a:p>
-            <a:r>
-              <a:rPr lang="en-US" dirty="0"/>
-              <a:t>C floods with </a:t>
-            </a:r>
-            <a:r>
-              <a:rPr lang="en-US" b="1" dirty="0">
-                <a:solidFill>
-                  <a:srgbClr val="00B0F0"/>
-                </a:solidFill>
-                <a:effectLst>
-                  <a:outerShdw blurRad="38100" dist="38100" dir="2700000" algn="tl">
-                    <a:srgbClr val="000000">
-                      <a:alpha val="43137"/>
-                    </a:srgbClr>
-                  </a:outerShdw>
-                </a:effectLst>
-              </a:rPr>
-              <a:t>RREQ</a:t>
-            </a:r>
-            <a:endParaRPr lang="en-US" dirty="0"/>
-          </a:p>
-          <a:p>
-            <a:r>
-              <a:rPr lang="en-US" dirty="0"/>
-              <a:t>D,A,&amp;G all reply with </a:t>
-            </a:r>
-            <a:r>
-              <a:rPr lang="en-US" b="1" dirty="0">
-                <a:solidFill>
-                  <a:srgbClr val="0202BE"/>
-                </a:solidFill>
-                <a:effectLst>
-                  <a:outerShdw blurRad="38100" dist="38100" dir="2700000" algn="tl">
-                    <a:srgbClr val="000000">
-                      <a:alpha val="43137"/>
-                    </a:srgbClr>
-                  </a:outerShdw>
-                </a:effectLst>
-              </a:rPr>
-              <a:t>RREPL</a:t>
-            </a:r>
-          </a:p>
-          <a:p>
-            <a:r>
-              <a:rPr lang="en-US" dirty="0"/>
-              <a:t>C picks reply with smallest hop count to destination</a:t>
-            </a:r>
-          </a:p>
-          <a:p>
-            <a:r>
-              <a:rPr lang="en-US" b="1" dirty="0">
-                <a:solidFill>
-                  <a:srgbClr val="5FDF41"/>
-                </a:solidFill>
-                <a:effectLst>
-                  <a:outerShdw blurRad="38100" dist="38100" dir="2700000" algn="tl">
-                    <a:srgbClr val="000000">
-                      <a:alpha val="43137"/>
-                    </a:srgbClr>
-                  </a:outerShdw>
-                </a:effectLst>
-              </a:rPr>
-              <a:t>Data</a:t>
-            </a:r>
-            <a:r>
-              <a:rPr lang="en-US" dirty="0"/>
-              <a:t> sent once route established</a:t>
-            </a:r>
-            <a:endParaRPr lang="en-US" b="1" dirty="0">
-              <a:solidFill>
-                <a:srgbClr val="0202BE"/>
-              </a:solidFill>
-              <a:effectLst>
-                <a:outerShdw blurRad="38100" dist="38100" dir="2700000" algn="tl">
-                  <a:srgbClr val="000000">
-                    <a:alpha val="43137"/>
-                  </a:srgbClr>
-                </a:outerShdw>
-              </a:effectLst>
-            </a:endParaRPr>
-          </a:p>
-          <a:p>
-            <a:endParaRPr lang="en-US" b="1" dirty="0">
-              <a:solidFill>
-                <a:srgbClr val="0202BE"/>
-              </a:solidFill>
-              <a:effectLst>
-                <a:outerShdw blurRad="38100" dist="38100" dir="2700000" algn="tl">
-                  <a:srgbClr val="000000">
-                    <a:alpha val="43137"/>
-                  </a:srgbClr>
-                </a:outerShdw>
-              </a:effectLst>
-            </a:endParaRPr>
-          </a:p>
-        </p:txBody>
-      </p:sp>
-      <p:pic>
-        <p:nvPicPr>
-          <p:cNvPr id="5" name="Picture 4">
-            <a:extLst>
-              <a:ext uri="{FF2B5EF4-FFF2-40B4-BE49-F238E27FC236}">
-                <a16:creationId xmlns:a16="http://schemas.microsoft.com/office/drawing/2014/main" id="{058EA78E-9682-4C8B-B352-BE12CC01E24C}"/>
-              </a:ext>
-            </a:extLst>
-          </p:cNvPr>
-          <p:cNvPicPr>
-            <a:picLocks noChangeAspect="1"/>
-          </p:cNvPicPr>
-          <p:nvPr/>
-        </p:nvPicPr>
-        <p:blipFill>
-          <a:blip r:embed="rId2"/>
-          <a:stretch>
-            <a:fillRect/>
-          </a:stretch>
-        </p:blipFill>
-        <p:spPr>
-          <a:xfrm>
-            <a:off x="758788" y="1872140"/>
-            <a:ext cx="1828800" cy="1592521"/>
-          </a:xfrm>
-          <a:prstGeom prst="rect">
-            <a:avLst/>
-          </a:prstGeom>
-        </p:spPr>
-      </p:pic>
-    </p:spTree>
-    <p:extLst>
-      <p:ext uri="{BB962C8B-B14F-4D97-AF65-F5344CB8AC3E}">
-        <p14:creationId xmlns:p14="http://schemas.microsoft.com/office/powerpoint/2010/main" val="2786245967"/>
-      </p:ext>
-    </p:extLst>
-  </p:cSld>
-  <p:clrMapOvr>
-    <a:masterClrMapping/>
-  </p:clrMapOvr>
-</p:sld>
-</file>
-
-<file path=ppt/slides/slide8.xml><?xml version="1.0" encoding="utf-8"?>
-<p:sld xmlns:a="http://schemas.openxmlformats.org/drawingml/2006/main" xmlns:r="http://schemas.openxmlformats.org/officeDocument/2006/relationships" xmlns:p="http://schemas.openxmlformats.org/presentationml/2006/main">
-  <p:cSld>
-    <p:spTree>
-      <p:nvGrpSpPr>
-        <p:cNvPr id="1" name=""/>
-        <p:cNvGrpSpPr/>
-        <p:nvPr/>
-      </p:nvGrpSpPr>
-      <p:grpSpPr>
-        <a:xfrm>
-          <a:off x="0" y="0"/>
-          <a:ext cx="0" cy="0"/>
-          <a:chOff x="0" y="0"/>
-          <a:chExt cx="0" cy="0"/>
-        </a:xfrm>
-      </p:grpSpPr>
-      <p:sp>
-        <p:nvSpPr>
-          <p:cNvPr id="2" name="Text Placeholder 1">
-            <a:extLst>
-              <a:ext uri="{FF2B5EF4-FFF2-40B4-BE49-F238E27FC236}">
-                <a16:creationId xmlns:a16="http://schemas.microsoft.com/office/drawing/2014/main" id="{27555CB1-EAF8-4E0E-BD45-905842BFE65F}"/>
-              </a:ext>
-            </a:extLst>
-          </p:cNvPr>
-          <p:cNvSpPr>
-            <a:spLocks noGrp="1"/>
-          </p:cNvSpPr>
-          <p:nvPr>
-            <p:ph type="body" sz="quarter" idx="10"/>
-          </p:nvPr>
-        </p:nvSpPr>
-        <p:spPr/>
-        <p:txBody>
-          <a:bodyPr/>
-          <a:lstStyle/>
-          <a:p>
-            <a:pPr algn="ctr"/>
-            <a:r>
-              <a:rPr lang="en-US" dirty="0"/>
-              <a:t>Example 2</a:t>
-            </a:r>
-          </a:p>
-        </p:txBody>
-      </p:sp>
-      <p:sp>
-        <p:nvSpPr>
-          <p:cNvPr id="3" name="Text Placeholder 2">
-            <a:extLst>
-              <a:ext uri="{FF2B5EF4-FFF2-40B4-BE49-F238E27FC236}">
-                <a16:creationId xmlns:a16="http://schemas.microsoft.com/office/drawing/2014/main" id="{28A202AE-9865-409D-BCB7-FA4FF773E1B7}"/>
-              </a:ext>
-            </a:extLst>
-          </p:cNvPr>
-          <p:cNvSpPr>
-            <a:spLocks noGrp="1"/>
-          </p:cNvSpPr>
-          <p:nvPr>
-            <p:ph type="body" sz="quarter" idx="11"/>
-          </p:nvPr>
-        </p:nvSpPr>
-        <p:spPr/>
-        <p:txBody>
-          <a:bodyPr/>
-          <a:lstStyle/>
-          <a:p>
-            <a:r>
-              <a:rPr lang="en-US" dirty="0"/>
-              <a:t>More routes added</a:t>
-            </a:r>
-          </a:p>
-        </p:txBody>
-      </p:sp>
-      <p:pic>
-        <p:nvPicPr>
-          <p:cNvPr id="6" name="Picture 5">
-            <a:extLst>
-              <a:ext uri="{FF2B5EF4-FFF2-40B4-BE49-F238E27FC236}">
-                <a16:creationId xmlns:a16="http://schemas.microsoft.com/office/drawing/2014/main" id="{609AADF7-6C3B-4CDA-B784-74EBE0883224}"/>
-              </a:ext>
-            </a:extLst>
-          </p:cNvPr>
-          <p:cNvPicPr>
-            <a:picLocks noChangeAspect="1"/>
-          </p:cNvPicPr>
-          <p:nvPr/>
-        </p:nvPicPr>
-        <p:blipFill>
-          <a:blip r:embed="rId2"/>
-          <a:stretch>
-            <a:fillRect/>
-          </a:stretch>
-        </p:blipFill>
-        <p:spPr>
-          <a:xfrm>
-            <a:off x="6946228" y="935922"/>
-            <a:ext cx="1828800" cy="1592521"/>
-          </a:xfrm>
-          <a:prstGeom prst="rect">
-            <a:avLst/>
-          </a:prstGeom>
-        </p:spPr>
-      </p:pic>
-      <p:pic>
-        <p:nvPicPr>
-          <p:cNvPr id="4" name="Picture 3">
-            <a:extLst>
-              <a:ext uri="{FF2B5EF4-FFF2-40B4-BE49-F238E27FC236}">
-                <a16:creationId xmlns:a16="http://schemas.microsoft.com/office/drawing/2014/main" id="{4F9A6B6D-DB65-414C-BB82-F9EE80452BFD}"/>
-              </a:ext>
-            </a:extLst>
-          </p:cNvPr>
-          <p:cNvPicPr>
-            <a:picLocks noChangeAspect="1"/>
-          </p:cNvPicPr>
-          <p:nvPr/>
-        </p:nvPicPr>
-        <p:blipFill>
-          <a:blip r:embed="rId3"/>
-          <a:stretch>
-            <a:fillRect/>
-          </a:stretch>
-        </p:blipFill>
-        <p:spPr>
-          <a:xfrm>
-            <a:off x="0" y="2725005"/>
-            <a:ext cx="9144000" cy="2418495"/>
-          </a:xfrm>
-          <a:prstGeom prst="rect">
-            <a:avLst/>
-          </a:prstGeom>
-        </p:spPr>
-      </p:pic>
-    </p:spTree>
-    <p:extLst>
-      <p:ext uri="{BB962C8B-B14F-4D97-AF65-F5344CB8AC3E}">
-        <p14:creationId xmlns:p14="http://schemas.microsoft.com/office/powerpoint/2010/main" val="4245807230"/>
-      </p:ext>
-    </p:extLst>
-  </p:cSld>
-  <p:clrMapOvr>
-    <a:masterClrMapping/>
-  </p:clrMapOvr>
-</p:sld>
-</file>
-
 <file path=ppt/slides/slide9.xml><?xml version="1.0" encoding="utf-8"?>
 <p:sld xmlns:a="http://schemas.openxmlformats.org/drawingml/2006/main" xmlns:r="http://schemas.openxmlformats.org/officeDocument/2006/relationships" xmlns:p="http://schemas.openxmlformats.org/presentationml/2006/main">
   <p:cSld>
@@ -6391,7 +9378,7 @@
             <a:pPr algn="ctr"/>
             <a:r>
               <a:rPr lang="en-US" dirty="0"/>
-              <a:t>Example 3</a:t>
+              <a:t>Example 2</a:t>
             </a:r>
           </a:p>
         </p:txBody>
@@ -6415,7 +9402,7 @@
         <p:spPr>
           <a:xfrm>
             <a:off x="2674619" y="1022633"/>
-            <a:ext cx="6294121" cy="3291536"/>
+            <a:ext cx="6180895" cy="3291536"/>
           </a:xfrm>
         </p:spPr>
         <p:txBody>
@@ -6425,28 +9412,25 @@
             <a:pPr lvl="1"/>
             <a:r>
               <a:rPr lang="en-US" dirty="0"/>
-              <a:t>Sending node D -&gt; G again</a:t>
+              <a:t>Sending node C -&gt; G</a:t>
             </a:r>
           </a:p>
           <a:p>
             <a:pPr lvl="1"/>
             <a:r>
               <a:rPr lang="en-US" dirty="0"/>
-              <a:t>Node E has been moved, breaking links</a:t>
-            </a:r>
-          </a:p>
-          <a:p>
-            <a:endParaRPr lang="en-US" dirty="0"/>
-          </a:p>
-          <a:p>
-            <a:r>
-              <a:rPr lang="en-US" dirty="0"/>
-              <a:t>D tries </a:t>
-            </a:r>
-            <a:r>
-              <a:rPr lang="en-US" dirty="0">
-                <a:solidFill>
-                  <a:srgbClr val="5FDF41"/>
+              <a:t>Intermediates nodes have route info from Ex. 1</a:t>
+            </a:r>
+          </a:p>
+          <a:p>
+            <a:r>
+              <a:rPr lang="en-US" dirty="0"/>
+              <a:t>C floods with </a:t>
+            </a:r>
+            <a:r>
+              <a:rPr lang="en-US" b="1" dirty="0">
+                <a:solidFill>
+                  <a:srgbClr val="00B0F0"/>
                 </a:solidFill>
                 <a:effectLst>
                   <a:outerShdw blurRad="38100" dist="38100" dir="2700000" algn="tl">
@@ -6456,22 +9440,19 @@
                   </a:outerShdw>
                 </a:effectLst>
               </a:rPr>
-              <a:t>sending</a:t>
-            </a:r>
-            <a:r>
-              <a:rPr lang="en-US" dirty="0"/>
-              <a:t> normally</a:t>
-            </a:r>
-          </a:p>
-          <a:p>
-            <a:r>
-              <a:rPr lang="en-US" dirty="0"/>
-              <a:t>A can’t reach E anymore, so replies with </a:t>
+              <a:t>RREQ</a:t>
+            </a:r>
+            <a:endParaRPr lang="en-US" dirty="0"/>
+          </a:p>
+          <a:p>
+            <a:r>
+              <a:rPr lang="en-US" dirty="0"/>
+              <a:t>D,A,&amp;G all reply with </a:t>
             </a:r>
             <a:r>
               <a:rPr lang="en-US" b="1" dirty="0">
                 <a:solidFill>
-                  <a:srgbClr val="FF0000"/>
+                  <a:srgbClr val="0202BE"/>
                 </a:solidFill>
                 <a:effectLst>
                   <a:outerShdw blurRad="38100" dist="38100" dir="2700000" algn="tl">
@@ -6481,18 +9462,20 @@
                   </a:outerShdw>
                 </a:effectLst>
               </a:rPr>
-              <a:t>RERR</a:t>
-            </a:r>
-          </a:p>
-          <a:p>
-            <a:r>
-              <a:rPr lang="en-US" dirty="0"/>
-              <a:t>A now knows no routes, so must </a:t>
-            </a:r>
-            <a:r>
-              <a:rPr lang="en-US" dirty="0">
-                <a:solidFill>
-                  <a:srgbClr val="00B0F0"/>
+              <a:t>RREPL</a:t>
+            </a:r>
+          </a:p>
+          <a:p>
+            <a:r>
+              <a:rPr lang="en-US" dirty="0"/>
+              <a:t>C picks reply with smallest hop count to destination</a:t>
+            </a:r>
+          </a:p>
+          <a:p>
+            <a:r>
+              <a:rPr lang="en-US" b="1" dirty="0">
+                <a:solidFill>
+                  <a:srgbClr val="5FDF41"/>
                 </a:solidFill>
                 <a:effectLst>
                   <a:outerShdw blurRad="38100" dist="38100" dir="2700000" algn="tl">
@@ -6502,53 +9485,11 @@
                   </a:outerShdw>
                 </a:effectLst>
               </a:rPr>
-              <a:t>flood</a:t>
-            </a:r>
-          </a:p>
-          <a:p>
-            <a:r>
-              <a:rPr lang="en-US" dirty="0"/>
-              <a:t>C knows a route to G so </a:t>
-            </a:r>
-            <a:r>
-              <a:rPr lang="en-US" dirty="0">
-                <a:solidFill>
-                  <a:srgbClr val="0202BE"/>
-                </a:solidFill>
-                <a:effectLst>
-                  <a:outerShdw blurRad="38100" dist="38100" dir="2700000" algn="tl">
-                    <a:srgbClr val="000000">
-                      <a:alpha val="43137"/>
-                    </a:srgbClr>
-                  </a:outerShdw>
-                </a:effectLst>
-              </a:rPr>
-              <a:t>replies</a:t>
-            </a:r>
-          </a:p>
-          <a:p>
-            <a:r>
-              <a:rPr lang="en-US" dirty="0"/>
-              <a:t>D </a:t>
-            </a:r>
-            <a:r>
-              <a:rPr lang="en-US" dirty="0">
-                <a:solidFill>
-                  <a:srgbClr val="5FDF41"/>
-                </a:solidFill>
-                <a:effectLst>
-                  <a:outerShdw blurRad="38100" dist="38100" dir="2700000" algn="tl">
-                    <a:srgbClr val="000000">
-                      <a:alpha val="43137"/>
-                    </a:srgbClr>
-                  </a:outerShdw>
-                </a:effectLst>
-              </a:rPr>
-              <a:t>sends</a:t>
-            </a:r>
-            <a:r>
-              <a:rPr lang="en-US" dirty="0"/>
-              <a:t> to G</a:t>
+              <a:t>Data</a:t>
+            </a:r>
+            <a:r>
+              <a:rPr lang="en-US" dirty="0"/>
+              <a:t> sent once route established</a:t>
             </a:r>
             <a:endParaRPr lang="en-US" b="1" dirty="0">
               <a:solidFill>
@@ -6563,14 +9504,28 @@
               </a:effectLst>
             </a:endParaRPr>
           </a:p>
+          <a:p>
+            <a:endParaRPr lang="en-US" b="1" dirty="0">
+              <a:solidFill>
+                <a:srgbClr val="0202BE"/>
+              </a:solidFill>
+              <a:effectLst>
+                <a:outerShdw blurRad="38100" dist="38100" dir="2700000" algn="tl">
+                  <a:srgbClr val="000000">
+                    <a:alpha val="43137"/>
+                  </a:srgbClr>
+                </a:outerShdw>
+              </a:effectLst>
+            </a:endParaRPr>
+          </a:p>
         </p:txBody>
       </p:sp>
       <p:pic>
         <p:nvPicPr>
-          <p:cNvPr id="14" name="Picture 13">
+          <p:cNvPr id="5" name="Picture 4">
             <a:extLst>
               <a:ext uri="{FF2B5EF4-FFF2-40B4-BE49-F238E27FC236}">
-                <a16:creationId xmlns:a16="http://schemas.microsoft.com/office/drawing/2014/main" id="{47E6F946-6CEC-493A-BBDC-361C1BA932E5}"/>
+                <a16:creationId xmlns:a16="http://schemas.microsoft.com/office/drawing/2014/main" id="{058EA78E-9682-4C8B-B352-BE12CC01E24C}"/>
               </a:ext>
             </a:extLst>
           </p:cNvPr>
@@ -6587,37 +9542,7 @@
         </p:blipFill>
         <p:spPr>
           <a:xfrm>
-            <a:off x="671757" y="2954180"/>
-            <a:ext cx="1828800" cy="1592521"/>
-          </a:xfrm>
-          <a:prstGeom prst="rect">
-            <a:avLst/>
-          </a:prstGeom>
-        </p:spPr>
-      </p:pic>
-      <p:pic>
-        <p:nvPicPr>
-          <p:cNvPr id="18" name="Picture 17">
-            <a:extLst>
-              <a:ext uri="{FF2B5EF4-FFF2-40B4-BE49-F238E27FC236}">
-                <a16:creationId xmlns:a16="http://schemas.microsoft.com/office/drawing/2014/main" id="{081C35C0-38A2-431B-B76F-9D1D8121BDC3}"/>
-              </a:ext>
-            </a:extLst>
-          </p:cNvPr>
-          <p:cNvPicPr>
-            <a:picLocks noChangeAspect="1"/>
-          </p:cNvPicPr>
-          <p:nvPr/>
-        </p:nvPicPr>
-        <p:blipFill>
-          <a:blip r:embed="rId3"/>
-          <a:stretch>
-            <a:fillRect/>
-          </a:stretch>
-        </p:blipFill>
-        <p:spPr>
-          <a:xfrm>
-            <a:off x="671757" y="966787"/>
+            <a:off x="758788" y="1872140"/>
             <a:ext cx="1828800" cy="1592521"/>
           </a:xfrm>
           <a:prstGeom prst="rect">
@@ -6628,7 +9553,7 @@
     </p:spTree>
     <p:extLst>
       <p:ext uri="{BB962C8B-B14F-4D97-AF65-F5344CB8AC3E}">
-        <p14:creationId xmlns:p14="http://schemas.microsoft.com/office/powerpoint/2010/main" val="1996454356"/>
+        <p14:creationId xmlns:p14="http://schemas.microsoft.com/office/powerpoint/2010/main" val="2786245967"/>
       </p:ext>
     </p:extLst>
   </p:cSld>

</xml_diff>

<commit_message>
Added one additional slide to comply with rubric.
</commit_message>
<xml_diff>
--- a/doc/presentation.pptx
+++ b/doc/presentation.pptx
@@ -7,7 +7,7 @@
     <p:sldMasterId id="2147483672" r:id="rId3"/>
   </p:sldMasterIdLst>
   <p:handoutMasterIdLst>
-    <p:handoutMasterId r:id="rId34"/>
+    <p:handoutMasterId r:id="rId35"/>
   </p:handoutMasterIdLst>
   <p:sldIdLst>
     <p:sldId id="259" r:id="rId4"/>
@@ -15,31 +15,32 @@
     <p:sldId id="260" r:id="rId6"/>
     <p:sldId id="278" r:id="rId7"/>
     <p:sldId id="258" r:id="rId8"/>
-    <p:sldId id="279" r:id="rId9"/>
-    <p:sldId id="264" r:id="rId10"/>
-    <p:sldId id="266" r:id="rId11"/>
-    <p:sldId id="265" r:id="rId12"/>
-    <p:sldId id="267" r:id="rId13"/>
-    <p:sldId id="268" r:id="rId14"/>
-    <p:sldId id="269" r:id="rId15"/>
-    <p:sldId id="289" r:id="rId16"/>
-    <p:sldId id="290" r:id="rId17"/>
-    <p:sldId id="280" r:id="rId18"/>
-    <p:sldId id="270" r:id="rId19"/>
-    <p:sldId id="275" r:id="rId20"/>
-    <p:sldId id="271" r:id="rId21"/>
-    <p:sldId id="276" r:id="rId22"/>
-    <p:sldId id="273" r:id="rId23"/>
-    <p:sldId id="277" r:id="rId24"/>
-    <p:sldId id="291" r:id="rId25"/>
-    <p:sldId id="293" r:id="rId26"/>
-    <p:sldId id="281" r:id="rId27"/>
-    <p:sldId id="282" r:id="rId28"/>
-    <p:sldId id="283" r:id="rId29"/>
-    <p:sldId id="285" r:id="rId30"/>
-    <p:sldId id="286" r:id="rId31"/>
-    <p:sldId id="287" r:id="rId32"/>
-    <p:sldId id="288" r:id="rId33"/>
+    <p:sldId id="294" r:id="rId9"/>
+    <p:sldId id="279" r:id="rId10"/>
+    <p:sldId id="264" r:id="rId11"/>
+    <p:sldId id="266" r:id="rId12"/>
+    <p:sldId id="265" r:id="rId13"/>
+    <p:sldId id="267" r:id="rId14"/>
+    <p:sldId id="268" r:id="rId15"/>
+    <p:sldId id="269" r:id="rId16"/>
+    <p:sldId id="289" r:id="rId17"/>
+    <p:sldId id="290" r:id="rId18"/>
+    <p:sldId id="280" r:id="rId19"/>
+    <p:sldId id="270" r:id="rId20"/>
+    <p:sldId id="275" r:id="rId21"/>
+    <p:sldId id="271" r:id="rId22"/>
+    <p:sldId id="276" r:id="rId23"/>
+    <p:sldId id="273" r:id="rId24"/>
+    <p:sldId id="277" r:id="rId25"/>
+    <p:sldId id="291" r:id="rId26"/>
+    <p:sldId id="293" r:id="rId27"/>
+    <p:sldId id="281" r:id="rId28"/>
+    <p:sldId id="282" r:id="rId29"/>
+    <p:sldId id="283" r:id="rId30"/>
+    <p:sldId id="285" r:id="rId31"/>
+    <p:sldId id="286" r:id="rId32"/>
+    <p:sldId id="287" r:id="rId33"/>
+    <p:sldId id="288" r:id="rId34"/>
   </p:sldIdLst>
   <p:sldSz cx="9144000" cy="5143500" type="screen16x9"/>
   <p:notesSz cx="6858000" cy="9144000"/>
@@ -4859,6 +4860,232 @@
           <p:cNvPr id="2" name="Text Placeholder 1">
             <a:extLst>
               <a:ext uri="{FF2B5EF4-FFF2-40B4-BE49-F238E27FC236}">
+                <a16:creationId xmlns:a16="http://schemas.microsoft.com/office/drawing/2014/main" id="{ADFB35E9-CC85-4222-B528-A8EC5746E9C3}"/>
+              </a:ext>
+            </a:extLst>
+          </p:cNvPr>
+          <p:cNvSpPr>
+            <a:spLocks noGrp="1"/>
+          </p:cNvSpPr>
+          <p:nvPr>
+            <p:ph type="body" sz="quarter" idx="10"/>
+          </p:nvPr>
+        </p:nvSpPr>
+        <p:spPr/>
+        <p:txBody>
+          <a:bodyPr/>
+          <a:lstStyle/>
+          <a:p>
+            <a:pPr algn="ctr"/>
+            <a:r>
+              <a:rPr lang="en-US" dirty="0"/>
+              <a:t>Example 2</a:t>
+            </a:r>
+          </a:p>
+        </p:txBody>
+      </p:sp>
+      <p:sp>
+        <p:nvSpPr>
+          <p:cNvPr id="3" name="Text Placeholder 2">
+            <a:extLst>
+              <a:ext uri="{FF2B5EF4-FFF2-40B4-BE49-F238E27FC236}">
+                <a16:creationId xmlns:a16="http://schemas.microsoft.com/office/drawing/2014/main" id="{CAE15260-3969-4A3E-93CB-F0D1C7E8B4FA}"/>
+              </a:ext>
+            </a:extLst>
+          </p:cNvPr>
+          <p:cNvSpPr>
+            <a:spLocks noGrp="1"/>
+          </p:cNvSpPr>
+          <p:nvPr>
+            <p:ph type="body" sz="quarter" idx="11"/>
+          </p:nvPr>
+        </p:nvSpPr>
+        <p:spPr>
+          <a:xfrm>
+            <a:off x="2674619" y="1022633"/>
+            <a:ext cx="6180895" cy="3291536"/>
+          </a:xfrm>
+        </p:spPr>
+        <p:txBody>
+          <a:bodyPr/>
+          <a:lstStyle/>
+          <a:p>
+            <a:pPr lvl="1"/>
+            <a:r>
+              <a:rPr lang="en-US" dirty="0"/>
+              <a:t>Sending node C -&gt; G</a:t>
+            </a:r>
+          </a:p>
+          <a:p>
+            <a:pPr lvl="1"/>
+            <a:r>
+              <a:rPr lang="en-US" dirty="0"/>
+              <a:t>Intermediates nodes have route info from Ex. 1</a:t>
+            </a:r>
+          </a:p>
+          <a:p>
+            <a:r>
+              <a:rPr lang="en-US" dirty="0"/>
+              <a:t>C floods with </a:t>
+            </a:r>
+            <a:r>
+              <a:rPr lang="en-US" b="1" dirty="0">
+                <a:solidFill>
+                  <a:srgbClr val="00B0F0"/>
+                </a:solidFill>
+                <a:effectLst>
+                  <a:outerShdw blurRad="38100" dist="38100" dir="2700000" algn="tl">
+                    <a:srgbClr val="000000">
+                      <a:alpha val="43137"/>
+                    </a:srgbClr>
+                  </a:outerShdw>
+                </a:effectLst>
+              </a:rPr>
+              <a:t>RREQ</a:t>
+            </a:r>
+            <a:endParaRPr lang="en-US" dirty="0"/>
+          </a:p>
+          <a:p>
+            <a:r>
+              <a:rPr lang="en-US" dirty="0"/>
+              <a:t>D,A,&amp;G all reply with </a:t>
+            </a:r>
+            <a:r>
+              <a:rPr lang="en-US" b="1" dirty="0">
+                <a:solidFill>
+                  <a:srgbClr val="0202BE"/>
+                </a:solidFill>
+                <a:effectLst>
+                  <a:outerShdw blurRad="38100" dist="38100" dir="2700000" algn="tl">
+                    <a:srgbClr val="000000">
+                      <a:alpha val="43137"/>
+                    </a:srgbClr>
+                  </a:outerShdw>
+                </a:effectLst>
+              </a:rPr>
+              <a:t>RREPL</a:t>
+            </a:r>
+          </a:p>
+          <a:p>
+            <a:r>
+              <a:rPr lang="en-US" dirty="0"/>
+              <a:t>C picks reply with smallest hop count to destination</a:t>
+            </a:r>
+          </a:p>
+          <a:p>
+            <a:r>
+              <a:rPr lang="en-US" b="1" dirty="0">
+                <a:solidFill>
+                  <a:srgbClr val="5FDF41"/>
+                </a:solidFill>
+                <a:effectLst>
+                  <a:outerShdw blurRad="38100" dist="38100" dir="2700000" algn="tl">
+                    <a:srgbClr val="000000">
+                      <a:alpha val="43137"/>
+                    </a:srgbClr>
+                  </a:outerShdw>
+                </a:effectLst>
+              </a:rPr>
+              <a:t>Data</a:t>
+            </a:r>
+            <a:r>
+              <a:rPr lang="en-US" dirty="0"/>
+              <a:t> sent once route established</a:t>
+            </a:r>
+            <a:endParaRPr lang="en-US" b="1" dirty="0">
+              <a:solidFill>
+                <a:srgbClr val="0202BE"/>
+              </a:solidFill>
+              <a:effectLst>
+                <a:outerShdw blurRad="38100" dist="38100" dir="2700000" algn="tl">
+                  <a:srgbClr val="000000">
+                    <a:alpha val="43137"/>
+                  </a:srgbClr>
+                </a:outerShdw>
+              </a:effectLst>
+            </a:endParaRPr>
+          </a:p>
+          <a:p>
+            <a:endParaRPr lang="en-US" b="1" dirty="0">
+              <a:solidFill>
+                <a:srgbClr val="0202BE"/>
+              </a:solidFill>
+              <a:effectLst>
+                <a:outerShdw blurRad="38100" dist="38100" dir="2700000" algn="tl">
+                  <a:srgbClr val="000000">
+                    <a:alpha val="43137"/>
+                  </a:srgbClr>
+                </a:outerShdw>
+              </a:effectLst>
+            </a:endParaRPr>
+          </a:p>
+        </p:txBody>
+      </p:sp>
+      <p:pic>
+        <p:nvPicPr>
+          <p:cNvPr id="5" name="Picture 4">
+            <a:extLst>
+              <a:ext uri="{FF2B5EF4-FFF2-40B4-BE49-F238E27FC236}">
+                <a16:creationId xmlns:a16="http://schemas.microsoft.com/office/drawing/2014/main" id="{058EA78E-9682-4C8B-B352-BE12CC01E24C}"/>
+              </a:ext>
+            </a:extLst>
+          </p:cNvPr>
+          <p:cNvPicPr>
+            <a:picLocks noChangeAspect="1"/>
+          </p:cNvPicPr>
+          <p:nvPr/>
+        </p:nvPicPr>
+        <p:blipFill>
+          <a:blip r:embed="rId2"/>
+          <a:stretch>
+            <a:fillRect/>
+          </a:stretch>
+        </p:blipFill>
+        <p:spPr>
+          <a:xfrm>
+            <a:off x="758788" y="1872140"/>
+            <a:ext cx="1828800" cy="1592521"/>
+          </a:xfrm>
+          <a:prstGeom prst="rect">
+            <a:avLst/>
+          </a:prstGeom>
+        </p:spPr>
+      </p:pic>
+    </p:spTree>
+    <p:extLst>
+      <p:ext uri="{BB962C8B-B14F-4D97-AF65-F5344CB8AC3E}">
+        <p14:creationId xmlns:p14="http://schemas.microsoft.com/office/powerpoint/2010/main" val="2786245967"/>
+      </p:ext>
+    </p:extLst>
+  </p:cSld>
+  <p:clrMapOvr>
+    <a:masterClrMapping/>
+  </p:clrMapOvr>
+</p:sld>
+</file>
+
+<file path=ppt/slides/slide11.xml><?xml version="1.0" encoding="utf-8"?>
+<p:sld xmlns:a="http://schemas.openxmlformats.org/drawingml/2006/main" xmlns:r="http://schemas.openxmlformats.org/officeDocument/2006/relationships" xmlns:p="http://schemas.openxmlformats.org/presentationml/2006/main">
+  <p:cSld>
+    <p:spTree>
+      <p:nvGrpSpPr>
+        <p:cNvPr id="1" name=""/>
+        <p:cNvGrpSpPr/>
+        <p:nvPr/>
+      </p:nvGrpSpPr>
+      <p:grpSpPr>
+        <a:xfrm>
+          <a:off x="0" y="0"/>
+          <a:ext cx="0" cy="0"/>
+          <a:chOff x="0" y="0"/>
+          <a:chExt cx="0" cy="0"/>
+        </a:xfrm>
+      </p:grpSpPr>
+      <p:sp>
+        <p:nvSpPr>
+          <p:cNvPr id="2" name="Text Placeholder 1">
+            <a:extLst>
+              <a:ext uri="{FF2B5EF4-FFF2-40B4-BE49-F238E27FC236}">
                 <a16:creationId xmlns:a16="http://schemas.microsoft.com/office/drawing/2014/main" id="{27555CB1-EAF8-4E0E-BD45-905842BFE65F}"/>
               </a:ext>
             </a:extLst>
@@ -4984,7 +5211,7 @@
 </p:sld>
 </file>
 
-<file path=ppt/slides/slide11.xml><?xml version="1.0" encoding="utf-8"?>
+<file path=ppt/slides/slide12.xml><?xml version="1.0" encoding="utf-8"?>
 <p:sld xmlns:a="http://schemas.openxmlformats.org/drawingml/2006/main" xmlns:r="http://schemas.openxmlformats.org/officeDocument/2006/relationships" xmlns:p="http://schemas.openxmlformats.org/presentationml/2006/main">
   <p:cSld>
     <p:spTree>
@@ -5272,7 +5499,7 @@
 </p:sld>
 </file>
 
-<file path=ppt/slides/slide12.xml><?xml version="1.0" encoding="utf-8"?>
+<file path=ppt/slides/slide13.xml><?xml version="1.0" encoding="utf-8"?>
 <p:sld xmlns:a="http://schemas.openxmlformats.org/drawingml/2006/main" xmlns:r="http://schemas.openxmlformats.org/officeDocument/2006/relationships" xmlns:p="http://schemas.openxmlformats.org/presentationml/2006/main">
   <p:cSld>
     <p:spTree>
@@ -5444,7 +5671,7 @@
 </p:sld>
 </file>
 
-<file path=ppt/slides/slide13.xml><?xml version="1.0" encoding="utf-8"?>
+<file path=ppt/slides/slide14.xml><?xml version="1.0" encoding="utf-8"?>
 <p:sld xmlns:a="http://schemas.openxmlformats.org/drawingml/2006/main" xmlns:r="http://schemas.openxmlformats.org/officeDocument/2006/relationships" xmlns:p="http://schemas.openxmlformats.org/presentationml/2006/main">
   <p:cSld>
     <p:spTree>
@@ -5791,7 +6018,7 @@
 </p:sld>
 </file>
 
-<file path=ppt/slides/slide14.xml><?xml version="1.0" encoding="utf-8"?>
+<file path=ppt/slides/slide15.xml><?xml version="1.0" encoding="utf-8"?>
 <p:sld xmlns:a="http://schemas.openxmlformats.org/drawingml/2006/main" xmlns:r="http://schemas.openxmlformats.org/officeDocument/2006/relationships" xmlns:p="http://schemas.openxmlformats.org/presentationml/2006/main">
   <p:cSld>
     <p:spTree>
@@ -5904,7 +6131,7 @@
 </p:sld>
 </file>
 
-<file path=ppt/slides/slide15.xml><?xml version="1.0" encoding="utf-8"?>
+<file path=ppt/slides/slide16.xml><?xml version="1.0" encoding="utf-8"?>
 <p:sld xmlns:a="http://schemas.openxmlformats.org/drawingml/2006/main" xmlns:r="http://schemas.openxmlformats.org/officeDocument/2006/relationships" xmlns:p="http://schemas.openxmlformats.org/presentationml/2006/main">
   <p:cSld>
     <p:spTree>
@@ -6006,159 +6233,6 @@
     <p:extLst>
       <p:ext uri="{BB962C8B-B14F-4D97-AF65-F5344CB8AC3E}">
         <p14:creationId xmlns:p14="http://schemas.microsoft.com/office/powerpoint/2010/main" val="1226428970"/>
-      </p:ext>
-    </p:extLst>
-  </p:cSld>
-  <p:clrMapOvr>
-    <a:masterClrMapping/>
-  </p:clrMapOvr>
-</p:sld>
-</file>
-
-<file path=ppt/slides/slide16.xml><?xml version="1.0" encoding="utf-8"?>
-<p:sld xmlns:a="http://schemas.openxmlformats.org/drawingml/2006/main" xmlns:r="http://schemas.openxmlformats.org/officeDocument/2006/relationships" xmlns:p="http://schemas.openxmlformats.org/presentationml/2006/main">
-  <p:cSld>
-    <p:spTree>
-      <p:nvGrpSpPr>
-        <p:cNvPr id="1" name=""/>
-        <p:cNvGrpSpPr/>
-        <p:nvPr/>
-      </p:nvGrpSpPr>
-      <p:grpSpPr>
-        <a:xfrm>
-          <a:off x="0" y="0"/>
-          <a:ext cx="0" cy="0"/>
-          <a:chOff x="0" y="0"/>
-          <a:chExt cx="0" cy="0"/>
-        </a:xfrm>
-      </p:grpSpPr>
-      <p:sp>
-        <p:nvSpPr>
-          <p:cNvPr id="2" name="Text Placeholder 1">
-            <a:extLst>
-              <a:ext uri="{FF2B5EF4-FFF2-40B4-BE49-F238E27FC236}">
-                <a16:creationId xmlns:a16="http://schemas.microsoft.com/office/drawing/2014/main" id="{55F5DA41-E620-4CD7-8D1E-DDAC4A88CC52}"/>
-              </a:ext>
-            </a:extLst>
-          </p:cNvPr>
-          <p:cNvSpPr>
-            <a:spLocks noGrp="1"/>
-          </p:cNvSpPr>
-          <p:nvPr>
-            <p:ph type="body" sz="quarter" idx="10"/>
-          </p:nvPr>
-        </p:nvSpPr>
-        <p:spPr/>
-        <p:txBody>
-          <a:bodyPr/>
-          <a:lstStyle/>
-          <a:p>
-            <a:pPr algn="ctr"/>
-            <a:r>
-              <a:rPr lang="en-US" dirty="0"/>
-              <a:t>Static Network</a:t>
-            </a:r>
-          </a:p>
-        </p:txBody>
-      </p:sp>
-      <p:sp>
-        <p:nvSpPr>
-          <p:cNvPr id="3" name="Text Placeholder 2">
-            <a:extLst>
-              <a:ext uri="{FF2B5EF4-FFF2-40B4-BE49-F238E27FC236}">
-                <a16:creationId xmlns:a16="http://schemas.microsoft.com/office/drawing/2014/main" id="{1E701D65-BD27-4895-957D-EBCF7126A2CD}"/>
-              </a:ext>
-            </a:extLst>
-          </p:cNvPr>
-          <p:cNvSpPr>
-            <a:spLocks noGrp="1"/>
-          </p:cNvSpPr>
-          <p:nvPr>
-            <p:ph type="body" sz="quarter" idx="11"/>
-          </p:nvPr>
-        </p:nvSpPr>
-        <p:spPr>
-          <a:xfrm>
-            <a:off x="5050315" y="1302545"/>
-            <a:ext cx="3805200" cy="3011623"/>
-          </a:xfrm>
-        </p:spPr>
-        <p:txBody>
-          <a:bodyPr/>
-          <a:lstStyle/>
-          <a:p>
-            <a:r>
-              <a:rPr lang="en-US" dirty="0"/>
-              <a:t>500 random packets sent</a:t>
-            </a:r>
-          </a:p>
-          <a:p>
-            <a:r>
-              <a:rPr lang="en-US" dirty="0"/>
-              <a:t>No movement, nodes remain in the same place</a:t>
-            </a:r>
-          </a:p>
-          <a:p>
-            <a:r>
-              <a:rPr lang="en-US" dirty="0"/>
-              <a:t>No </a:t>
-            </a:r>
-            <a:r>
-              <a:rPr lang="en-US" b="1" dirty="0">
-                <a:solidFill>
-                  <a:srgbClr val="FF0000"/>
-                </a:solidFill>
-                <a:effectLst>
-                  <a:outerShdw blurRad="38100" dist="38100" dir="2700000" algn="tl">
-                    <a:srgbClr val="000000">
-                      <a:alpha val="43137"/>
-                    </a:srgbClr>
-                  </a:outerShdw>
-                </a:effectLst>
-              </a:rPr>
-              <a:t>RERR</a:t>
-            </a:r>
-            <a:r>
-              <a:rPr lang="en-US" dirty="0"/>
-              <a:t>s</a:t>
-            </a:r>
-          </a:p>
-        </p:txBody>
-      </p:sp>
-      <p:pic>
-        <p:nvPicPr>
-          <p:cNvPr id="5" name="Picture 4">
-            <a:extLst>
-              <a:ext uri="{FF2B5EF4-FFF2-40B4-BE49-F238E27FC236}">
-                <a16:creationId xmlns:a16="http://schemas.microsoft.com/office/drawing/2014/main" id="{B8F3F7EC-D1D2-4118-AAE8-283CB3DC68B7}"/>
-              </a:ext>
-            </a:extLst>
-          </p:cNvPr>
-          <p:cNvPicPr>
-            <a:picLocks noChangeAspect="1"/>
-          </p:cNvPicPr>
-          <p:nvPr/>
-        </p:nvPicPr>
-        <p:blipFill>
-          <a:blip r:embed="rId2"/>
-          <a:stretch>
-            <a:fillRect/>
-          </a:stretch>
-        </p:blipFill>
-        <p:spPr>
-          <a:xfrm>
-            <a:off x="478315" y="1302545"/>
-            <a:ext cx="4571999" cy="3429000"/>
-          </a:xfrm>
-          <a:prstGeom prst="rect">
-            <a:avLst/>
-          </a:prstGeom>
-        </p:spPr>
-      </p:pic>
-    </p:spTree>
-    <p:extLst>
-      <p:ext uri="{BB962C8B-B14F-4D97-AF65-F5344CB8AC3E}">
-        <p14:creationId xmlns:p14="http://schemas.microsoft.com/office/powerpoint/2010/main" val="4276717774"/>
       </p:ext>
     </p:extLst>
   </p:cSld>
@@ -6242,13 +6316,38 @@
           <a:p>
             <a:r>
               <a:rPr lang="en-US" dirty="0"/>
-              <a:t>No movement</a:t>
-            </a:r>
-          </a:p>
-          <a:p>
-            <a:r>
-              <a:rPr lang="en-US" dirty="0"/>
-              <a:t>Propagation delays</a:t>
+              <a:t>500 random packets sent</a:t>
+            </a:r>
+          </a:p>
+          <a:p>
+            <a:r>
+              <a:rPr lang="en-US" dirty="0"/>
+              <a:t>No movement, nodes remain in the same place</a:t>
+            </a:r>
+          </a:p>
+          <a:p>
+            <a:r>
+              <a:rPr lang="en-US" dirty="0"/>
+              <a:t>No </a:t>
+            </a:r>
+            <a:r>
+              <a:rPr lang="en-US" b="1" dirty="0">
+                <a:solidFill>
+                  <a:srgbClr val="FF0000"/>
+                </a:solidFill>
+                <a:effectLst>
+                  <a:outerShdw blurRad="38100" dist="38100" dir="2700000" algn="tl">
+                    <a:srgbClr val="000000">
+                      <a:alpha val="43137"/>
+                    </a:srgbClr>
+                  </a:outerShdw>
+                </a:effectLst>
+              </a:rPr>
+              <a:t>RERR</a:t>
+            </a:r>
+            <a:r>
+              <a:rPr lang="en-US" dirty="0"/>
+              <a:t>s</a:t>
             </a:r>
           </a:p>
         </p:txBody>
@@ -6276,7 +6375,7 @@
         <p:spPr>
           <a:xfrm>
             <a:off x="478315" y="1302545"/>
-            <a:ext cx="4571999" cy="3428999"/>
+            <a:ext cx="4571999" cy="3429000"/>
           </a:xfrm>
           <a:prstGeom prst="rect">
             <a:avLst/>
@@ -6286,7 +6385,7 @@
     </p:spTree>
     <p:extLst>
       <p:ext uri="{BB962C8B-B14F-4D97-AF65-F5344CB8AC3E}">
-        <p14:creationId xmlns:p14="http://schemas.microsoft.com/office/powerpoint/2010/main" val="3939320531"/>
+        <p14:creationId xmlns:p14="http://schemas.microsoft.com/office/powerpoint/2010/main" val="4276717774"/>
       </p:ext>
     </p:extLst>
   </p:cSld>
@@ -6337,7 +6436,7 @@
             <a:pPr algn="ctr"/>
             <a:r>
               <a:rPr lang="en-US" dirty="0"/>
-              <a:t>Mobile Network</a:t>
+              <a:t>Static Network</a:t>
             </a:r>
           </a:p>
         </p:txBody>
@@ -6370,13 +6469,13 @@
           <a:p>
             <a:r>
               <a:rPr lang="en-US" dirty="0"/>
-              <a:t>500 random packets sent</a:t>
-            </a:r>
-          </a:p>
-          <a:p>
-            <a:r>
-              <a:rPr lang="en-US" dirty="0"/>
-              <a:t>Movement every 50 packets</a:t>
+              <a:t>No movement</a:t>
+            </a:r>
+          </a:p>
+          <a:p>
+            <a:r>
+              <a:rPr lang="en-US" dirty="0"/>
+              <a:t>Propagation delays</a:t>
             </a:r>
           </a:p>
         </p:txBody>
@@ -6404,7 +6503,7 @@
         <p:spPr>
           <a:xfrm>
             <a:off x="478315" y="1302545"/>
-            <a:ext cx="4571999" cy="3429000"/>
+            <a:ext cx="4571999" cy="3428999"/>
           </a:xfrm>
           <a:prstGeom prst="rect">
             <a:avLst/>
@@ -6414,7 +6513,7 @@
     </p:spTree>
     <p:extLst>
       <p:ext uri="{BB962C8B-B14F-4D97-AF65-F5344CB8AC3E}">
-        <p14:creationId xmlns:p14="http://schemas.microsoft.com/office/powerpoint/2010/main" val="2540642590"/>
+        <p14:creationId xmlns:p14="http://schemas.microsoft.com/office/powerpoint/2010/main" val="3939320531"/>
       </p:ext>
     </p:extLst>
   </p:cSld>
@@ -6465,7 +6564,7 @@
             <a:pPr algn="ctr"/>
             <a:r>
               <a:rPr lang="en-US" dirty="0"/>
-              <a:t>Static Network</a:t>
+              <a:t>Mobile Network</a:t>
             </a:r>
           </a:p>
         </p:txBody>
@@ -6498,13 +6597,13 @@
           <a:p>
             <a:r>
               <a:rPr lang="en-US" dirty="0"/>
+              <a:t>500 random packets sent</a:t>
+            </a:r>
+          </a:p>
+          <a:p>
+            <a:r>
+              <a:rPr lang="en-US" dirty="0"/>
               <a:t>Movement every 50 packets</a:t>
-            </a:r>
-          </a:p>
-          <a:p>
-            <a:r>
-              <a:rPr lang="en-US" dirty="0"/>
-              <a:t>Propagation delays</a:t>
             </a:r>
           </a:p>
         </p:txBody>
@@ -6532,7 +6631,7 @@
         <p:spPr>
           <a:xfrm>
             <a:off x="478315" y="1302545"/>
-            <a:ext cx="4571998" cy="3428999"/>
+            <a:ext cx="4571999" cy="3429000"/>
           </a:xfrm>
           <a:prstGeom prst="rect">
             <a:avLst/>
@@ -6542,7 +6641,7 @@
     </p:spTree>
     <p:extLst>
       <p:ext uri="{BB962C8B-B14F-4D97-AF65-F5344CB8AC3E}">
-        <p14:creationId xmlns:p14="http://schemas.microsoft.com/office/powerpoint/2010/main" val="4274964592"/>
+        <p14:creationId xmlns:p14="http://schemas.microsoft.com/office/powerpoint/2010/main" val="2540642590"/>
       </p:ext>
     </p:extLst>
   </p:cSld>
@@ -6701,7 +6800,7 @@
             <a:pPr algn="ctr"/>
             <a:r>
               <a:rPr lang="en-US" dirty="0"/>
-              <a:t>Highly Mobile Network</a:t>
+              <a:t>Static Network</a:t>
             </a:r>
           </a:p>
         </p:txBody>
@@ -6734,13 +6833,13 @@
           <a:p>
             <a:r>
               <a:rPr lang="en-US" dirty="0"/>
-              <a:t>500 random packets sent</a:t>
-            </a:r>
-          </a:p>
-          <a:p>
-            <a:r>
-              <a:rPr lang="en-US" dirty="0"/>
-              <a:t>Movement every 5 packets sent</a:t>
+              <a:t>Movement every 50 packets</a:t>
+            </a:r>
+          </a:p>
+          <a:p>
+            <a:r>
+              <a:rPr lang="en-US" dirty="0"/>
+              <a:t>Propagation delays</a:t>
             </a:r>
           </a:p>
         </p:txBody>
@@ -6778,7 +6877,7 @@
     </p:spTree>
     <p:extLst>
       <p:ext uri="{BB962C8B-B14F-4D97-AF65-F5344CB8AC3E}">
-        <p14:creationId xmlns:p14="http://schemas.microsoft.com/office/powerpoint/2010/main" val="271066549"/>
+        <p14:creationId xmlns:p14="http://schemas.microsoft.com/office/powerpoint/2010/main" val="4274964592"/>
       </p:ext>
     </p:extLst>
   </p:cSld>
@@ -6829,7 +6928,7 @@
             <a:pPr algn="ctr"/>
             <a:r>
               <a:rPr lang="en-US" dirty="0"/>
-              <a:t>Static Network</a:t>
+              <a:t>Highly Mobile Network</a:t>
             </a:r>
           </a:p>
         </p:txBody>
@@ -6862,13 +6961,13 @@
           <a:p>
             <a:r>
               <a:rPr lang="en-US" dirty="0"/>
-              <a:t>Movement every 50 packets sent</a:t>
-            </a:r>
-          </a:p>
-          <a:p>
-            <a:r>
-              <a:rPr lang="en-US" dirty="0"/>
-              <a:t>Propagation delays</a:t>
+              <a:t>500 random packets sent</a:t>
+            </a:r>
+          </a:p>
+          <a:p>
+            <a:r>
+              <a:rPr lang="en-US" dirty="0"/>
+              <a:t>Movement every 5 packets sent</a:t>
             </a:r>
           </a:p>
         </p:txBody>
@@ -6906,7 +7005,7 @@
     </p:spTree>
     <p:extLst>
       <p:ext uri="{BB962C8B-B14F-4D97-AF65-F5344CB8AC3E}">
-        <p14:creationId xmlns:p14="http://schemas.microsoft.com/office/powerpoint/2010/main" val="1301453758"/>
+        <p14:creationId xmlns:p14="http://schemas.microsoft.com/office/powerpoint/2010/main" val="271066549"/>
       </p:ext>
     </p:extLst>
   </p:cSld>
@@ -6957,6 +7056,134 @@
             <a:pPr algn="ctr"/>
             <a:r>
               <a:rPr lang="en-US" dirty="0"/>
+              <a:t>Static Network</a:t>
+            </a:r>
+          </a:p>
+        </p:txBody>
+      </p:sp>
+      <p:sp>
+        <p:nvSpPr>
+          <p:cNvPr id="3" name="Text Placeholder 2">
+            <a:extLst>
+              <a:ext uri="{FF2B5EF4-FFF2-40B4-BE49-F238E27FC236}">
+                <a16:creationId xmlns:a16="http://schemas.microsoft.com/office/drawing/2014/main" id="{1E701D65-BD27-4895-957D-EBCF7126A2CD}"/>
+              </a:ext>
+            </a:extLst>
+          </p:cNvPr>
+          <p:cNvSpPr>
+            <a:spLocks noGrp="1"/>
+          </p:cNvSpPr>
+          <p:nvPr>
+            <p:ph type="body" sz="quarter" idx="11"/>
+          </p:nvPr>
+        </p:nvSpPr>
+        <p:spPr>
+          <a:xfrm>
+            <a:off x="5050315" y="1302545"/>
+            <a:ext cx="3805200" cy="3011623"/>
+          </a:xfrm>
+        </p:spPr>
+        <p:txBody>
+          <a:bodyPr/>
+          <a:lstStyle/>
+          <a:p>
+            <a:r>
+              <a:rPr lang="en-US" dirty="0"/>
+              <a:t>Movement every 50 packets sent</a:t>
+            </a:r>
+          </a:p>
+          <a:p>
+            <a:r>
+              <a:rPr lang="en-US" dirty="0"/>
+              <a:t>Propagation delays</a:t>
+            </a:r>
+          </a:p>
+        </p:txBody>
+      </p:sp>
+      <p:pic>
+        <p:nvPicPr>
+          <p:cNvPr id="5" name="Picture 4">
+            <a:extLst>
+              <a:ext uri="{FF2B5EF4-FFF2-40B4-BE49-F238E27FC236}">
+                <a16:creationId xmlns:a16="http://schemas.microsoft.com/office/drawing/2014/main" id="{B8F3F7EC-D1D2-4118-AAE8-283CB3DC68B7}"/>
+              </a:ext>
+            </a:extLst>
+          </p:cNvPr>
+          <p:cNvPicPr>
+            <a:picLocks noChangeAspect="1"/>
+          </p:cNvPicPr>
+          <p:nvPr/>
+        </p:nvPicPr>
+        <p:blipFill>
+          <a:blip r:embed="rId2"/>
+          <a:stretch>
+            <a:fillRect/>
+          </a:stretch>
+        </p:blipFill>
+        <p:spPr>
+          <a:xfrm>
+            <a:off x="478315" y="1302545"/>
+            <a:ext cx="4571998" cy="3428999"/>
+          </a:xfrm>
+          <a:prstGeom prst="rect">
+            <a:avLst/>
+          </a:prstGeom>
+        </p:spPr>
+      </p:pic>
+    </p:spTree>
+    <p:extLst>
+      <p:ext uri="{BB962C8B-B14F-4D97-AF65-F5344CB8AC3E}">
+        <p14:creationId xmlns:p14="http://schemas.microsoft.com/office/powerpoint/2010/main" val="1301453758"/>
+      </p:ext>
+    </p:extLst>
+  </p:cSld>
+  <p:clrMapOvr>
+    <a:masterClrMapping/>
+  </p:clrMapOvr>
+</p:sld>
+</file>
+
+<file path=ppt/slides/slide23.xml><?xml version="1.0" encoding="utf-8"?>
+<p:sld xmlns:a="http://schemas.openxmlformats.org/drawingml/2006/main" xmlns:r="http://schemas.openxmlformats.org/officeDocument/2006/relationships" xmlns:p="http://schemas.openxmlformats.org/presentationml/2006/main">
+  <p:cSld>
+    <p:spTree>
+      <p:nvGrpSpPr>
+        <p:cNvPr id="1" name=""/>
+        <p:cNvGrpSpPr/>
+        <p:nvPr/>
+      </p:nvGrpSpPr>
+      <p:grpSpPr>
+        <a:xfrm>
+          <a:off x="0" y="0"/>
+          <a:ext cx="0" cy="0"/>
+          <a:chOff x="0" y="0"/>
+          <a:chExt cx="0" cy="0"/>
+        </a:xfrm>
+      </p:grpSpPr>
+      <p:sp>
+        <p:nvSpPr>
+          <p:cNvPr id="2" name="Text Placeholder 1">
+            <a:extLst>
+              <a:ext uri="{FF2B5EF4-FFF2-40B4-BE49-F238E27FC236}">
+                <a16:creationId xmlns:a16="http://schemas.microsoft.com/office/drawing/2014/main" id="{55F5DA41-E620-4CD7-8D1E-DDAC4A88CC52}"/>
+              </a:ext>
+            </a:extLst>
+          </p:cNvPr>
+          <p:cNvSpPr>
+            <a:spLocks noGrp="1"/>
+          </p:cNvSpPr>
+          <p:nvPr>
+            <p:ph type="body" sz="quarter" idx="10"/>
+          </p:nvPr>
+        </p:nvSpPr>
+        <p:spPr/>
+        <p:txBody>
+          <a:bodyPr/>
+          <a:lstStyle/>
+          <a:p>
+            <a:pPr algn="ctr"/>
+            <a:r>
+              <a:rPr lang="en-US" dirty="0"/>
               <a:t>One-Dimensional Network</a:t>
             </a:r>
           </a:p>
@@ -7050,7 +7277,7 @@
 </p:sld>
 </file>
 
-<file path=ppt/slides/slide23.xml><?xml version="1.0" encoding="utf-8"?>
+<file path=ppt/slides/slide24.xml><?xml version="1.0" encoding="utf-8"?>
 <p:sld xmlns:a="http://schemas.openxmlformats.org/drawingml/2006/main" xmlns:r="http://schemas.openxmlformats.org/officeDocument/2006/relationships" xmlns:p="http://schemas.openxmlformats.org/presentationml/2006/main">
   <p:cSld>
     <p:spTree>
@@ -7521,7 +7748,7 @@
 </p:sld>
 </file>
 
-<file path=ppt/slides/slide24.xml><?xml version="1.0" encoding="utf-8"?>
+<file path=ppt/slides/slide25.xml><?xml version="1.0" encoding="utf-8"?>
 <p:sld xmlns:a="http://schemas.openxmlformats.org/drawingml/2006/main" xmlns:r="http://schemas.openxmlformats.org/officeDocument/2006/relationships" xmlns:p="http://schemas.openxmlformats.org/presentationml/2006/main">
   <p:cSld>
     <p:spTree>
@@ -7635,7 +7862,7 @@
 </p:sld>
 </file>
 
-<file path=ppt/slides/slide25.xml><?xml version="1.0" encoding="utf-8"?>
+<file path=ppt/slides/slide26.xml><?xml version="1.0" encoding="utf-8"?>
 <p:sld xmlns:a="http://schemas.openxmlformats.org/drawingml/2006/main" xmlns:r="http://schemas.openxmlformats.org/officeDocument/2006/relationships" xmlns:p="http://schemas.openxmlformats.org/presentationml/2006/main">
   <p:cSld>
     <p:spTree>
@@ -7727,7 +7954,7 @@
 </p:sld>
 </file>
 
-<file path=ppt/slides/slide26.xml><?xml version="1.0" encoding="utf-8"?>
+<file path=ppt/slides/slide27.xml><?xml version="1.0" encoding="utf-8"?>
 <p:sld xmlns:a="http://schemas.openxmlformats.org/drawingml/2006/main" xmlns:r="http://schemas.openxmlformats.org/officeDocument/2006/relationships" xmlns:p="http://schemas.openxmlformats.org/presentationml/2006/main">
   <p:cSld>
     <p:spTree>
@@ -7835,7 +8062,7 @@
 </p:sld>
 </file>
 
-<file path=ppt/slides/slide27.xml><?xml version="1.0" encoding="utf-8"?>
+<file path=ppt/slides/slide28.xml><?xml version="1.0" encoding="utf-8"?>
 <p:sld xmlns:a="http://schemas.openxmlformats.org/drawingml/2006/main" xmlns:r="http://schemas.openxmlformats.org/officeDocument/2006/relationships" xmlns:p="http://schemas.openxmlformats.org/presentationml/2006/main">
   <p:cSld>
     <p:spTree>
@@ -7936,7 +8163,7 @@
 </p:sld>
 </file>
 
-<file path=ppt/slides/slide28.xml><?xml version="1.0" encoding="utf-8"?>
+<file path=ppt/slides/slide29.xml><?xml version="1.0" encoding="utf-8"?>
 <p:sld xmlns:a="http://schemas.openxmlformats.org/drawingml/2006/main" xmlns:r="http://schemas.openxmlformats.org/officeDocument/2006/relationships" xmlns:p="http://schemas.openxmlformats.org/presentationml/2006/main">
   <p:cSld>
     <p:spTree>
@@ -8035,90 +8262,6 @@
     <p:extLst>
       <p:ext uri="{BB962C8B-B14F-4D97-AF65-F5344CB8AC3E}">
         <p14:creationId xmlns:p14="http://schemas.microsoft.com/office/powerpoint/2010/main" val="26880505"/>
-      </p:ext>
-    </p:extLst>
-  </p:cSld>
-  <p:clrMapOvr>
-    <a:masterClrMapping/>
-  </p:clrMapOvr>
-</p:sld>
-</file>
-
-<file path=ppt/slides/slide29.xml><?xml version="1.0" encoding="utf-8"?>
-<p:sld xmlns:a="http://schemas.openxmlformats.org/drawingml/2006/main" xmlns:r="http://schemas.openxmlformats.org/officeDocument/2006/relationships" xmlns:p="http://schemas.openxmlformats.org/presentationml/2006/main">
-  <p:cSld>
-    <p:spTree>
-      <p:nvGrpSpPr>
-        <p:cNvPr id="1" name=""/>
-        <p:cNvGrpSpPr/>
-        <p:nvPr/>
-      </p:nvGrpSpPr>
-      <p:grpSpPr>
-        <a:xfrm>
-          <a:off x="0" y="0"/>
-          <a:ext cx="0" cy="0"/>
-          <a:chOff x="0" y="0"/>
-          <a:chExt cx="0" cy="0"/>
-        </a:xfrm>
-      </p:grpSpPr>
-      <p:sp>
-        <p:nvSpPr>
-          <p:cNvPr id="2" name="Text Placeholder 1">
-            <a:extLst>
-              <a:ext uri="{FF2B5EF4-FFF2-40B4-BE49-F238E27FC236}">
-                <a16:creationId xmlns:a16="http://schemas.microsoft.com/office/drawing/2014/main" id="{943573FB-C3B3-4B58-ADC1-AE3095509BE5}"/>
-              </a:ext>
-            </a:extLst>
-          </p:cNvPr>
-          <p:cNvSpPr>
-            <a:spLocks noGrp="1"/>
-          </p:cNvSpPr>
-          <p:nvPr>
-            <p:ph type="body" sz="quarter" idx="10"/>
-          </p:nvPr>
-        </p:nvSpPr>
-        <p:spPr/>
-        <p:txBody>
-          <a:bodyPr/>
-          <a:lstStyle/>
-          <a:p>
-            <a:pPr algn="ctr"/>
-            <a:r>
-              <a:rPr lang="en-US" dirty="0"/>
-              <a:t>Demo</a:t>
-            </a:r>
-          </a:p>
-        </p:txBody>
-      </p:sp>
-      <p:sp>
-        <p:nvSpPr>
-          <p:cNvPr id="3" name="Text Placeholder 2">
-            <a:extLst>
-              <a:ext uri="{FF2B5EF4-FFF2-40B4-BE49-F238E27FC236}">
-                <a16:creationId xmlns:a16="http://schemas.microsoft.com/office/drawing/2014/main" id="{7F911014-BE17-4C52-BA45-87B4DB61D8EA}"/>
-              </a:ext>
-            </a:extLst>
-          </p:cNvPr>
-          <p:cNvSpPr>
-            <a:spLocks noGrp="1"/>
-          </p:cNvSpPr>
-          <p:nvPr>
-            <p:ph type="body" sz="quarter" idx="11"/>
-          </p:nvPr>
-        </p:nvSpPr>
-        <p:spPr/>
-        <p:txBody>
-          <a:bodyPr/>
-          <a:lstStyle/>
-          <a:p>
-            <a:endParaRPr lang="en-US" dirty="0"/>
-          </a:p>
-        </p:txBody>
-      </p:sp>
-    </p:spTree>
-    <p:extLst>
-      <p:ext uri="{BB962C8B-B14F-4D97-AF65-F5344CB8AC3E}">
-        <p14:creationId xmlns:p14="http://schemas.microsoft.com/office/powerpoint/2010/main" val="1765434017"/>
       </p:ext>
     </p:extLst>
   </p:cSld>
@@ -8264,6 +8407,90 @@
 </file>
 
 <file path=ppt/slides/slide30.xml><?xml version="1.0" encoding="utf-8"?>
+<p:sld xmlns:a="http://schemas.openxmlformats.org/drawingml/2006/main" xmlns:r="http://schemas.openxmlformats.org/officeDocument/2006/relationships" xmlns:p="http://schemas.openxmlformats.org/presentationml/2006/main">
+  <p:cSld>
+    <p:spTree>
+      <p:nvGrpSpPr>
+        <p:cNvPr id="1" name=""/>
+        <p:cNvGrpSpPr/>
+        <p:nvPr/>
+      </p:nvGrpSpPr>
+      <p:grpSpPr>
+        <a:xfrm>
+          <a:off x="0" y="0"/>
+          <a:ext cx="0" cy="0"/>
+          <a:chOff x="0" y="0"/>
+          <a:chExt cx="0" cy="0"/>
+        </a:xfrm>
+      </p:grpSpPr>
+      <p:sp>
+        <p:nvSpPr>
+          <p:cNvPr id="2" name="Text Placeholder 1">
+            <a:extLst>
+              <a:ext uri="{FF2B5EF4-FFF2-40B4-BE49-F238E27FC236}">
+                <a16:creationId xmlns:a16="http://schemas.microsoft.com/office/drawing/2014/main" id="{943573FB-C3B3-4B58-ADC1-AE3095509BE5}"/>
+              </a:ext>
+            </a:extLst>
+          </p:cNvPr>
+          <p:cNvSpPr>
+            <a:spLocks noGrp="1"/>
+          </p:cNvSpPr>
+          <p:nvPr>
+            <p:ph type="body" sz="quarter" idx="10"/>
+          </p:nvPr>
+        </p:nvSpPr>
+        <p:spPr/>
+        <p:txBody>
+          <a:bodyPr/>
+          <a:lstStyle/>
+          <a:p>
+            <a:pPr algn="ctr"/>
+            <a:r>
+              <a:rPr lang="en-US" dirty="0"/>
+              <a:t>Demo</a:t>
+            </a:r>
+          </a:p>
+        </p:txBody>
+      </p:sp>
+      <p:sp>
+        <p:nvSpPr>
+          <p:cNvPr id="3" name="Text Placeholder 2">
+            <a:extLst>
+              <a:ext uri="{FF2B5EF4-FFF2-40B4-BE49-F238E27FC236}">
+                <a16:creationId xmlns:a16="http://schemas.microsoft.com/office/drawing/2014/main" id="{7F911014-BE17-4C52-BA45-87B4DB61D8EA}"/>
+              </a:ext>
+            </a:extLst>
+          </p:cNvPr>
+          <p:cNvSpPr>
+            <a:spLocks noGrp="1"/>
+          </p:cNvSpPr>
+          <p:nvPr>
+            <p:ph type="body" sz="quarter" idx="11"/>
+          </p:nvPr>
+        </p:nvSpPr>
+        <p:spPr/>
+        <p:txBody>
+          <a:bodyPr/>
+          <a:lstStyle/>
+          <a:p>
+            <a:endParaRPr lang="en-US" dirty="0"/>
+          </a:p>
+        </p:txBody>
+      </p:sp>
+    </p:spTree>
+    <p:extLst>
+      <p:ext uri="{BB962C8B-B14F-4D97-AF65-F5344CB8AC3E}">
+        <p14:creationId xmlns:p14="http://schemas.microsoft.com/office/powerpoint/2010/main" val="1765434017"/>
+      </p:ext>
+    </p:extLst>
+  </p:cSld>
+  <p:clrMapOvr>
+    <a:masterClrMapping/>
+  </p:clrMapOvr>
+</p:sld>
+</file>
+
+<file path=ppt/slides/slide31.xml><?xml version="1.0" encoding="utf-8"?>
 <p:sld xmlns:a="http://schemas.openxmlformats.org/drawingml/2006/main" xmlns:r="http://schemas.openxmlformats.org/officeDocument/2006/relationships" xmlns:p="http://schemas.openxmlformats.org/presentationml/2006/main">
   <p:cSld>
     <p:spTree>
@@ -8806,6 +9033,115 @@
       </p:grpSpPr>
       <p:sp>
         <p:nvSpPr>
+          <p:cNvPr id="2" name="Text Placeholder 1">
+            <a:extLst>
+              <a:ext uri="{FF2B5EF4-FFF2-40B4-BE49-F238E27FC236}">
+                <a16:creationId xmlns:a16="http://schemas.microsoft.com/office/drawing/2014/main" id="{6B754EAE-5F9B-4B16-8BE0-1E46D1E852CD}"/>
+              </a:ext>
+            </a:extLst>
+          </p:cNvPr>
+          <p:cNvSpPr>
+            <a:spLocks noGrp="1"/>
+          </p:cNvSpPr>
+          <p:nvPr>
+            <p:ph type="body" sz="quarter" idx="10"/>
+          </p:nvPr>
+        </p:nvSpPr>
+        <p:spPr/>
+        <p:txBody>
+          <a:bodyPr/>
+          <a:lstStyle/>
+          <a:p>
+            <a:r>
+              <a:rPr lang="en-US" dirty="0"/>
+              <a:t>Approach</a:t>
+            </a:r>
+          </a:p>
+        </p:txBody>
+      </p:sp>
+      <p:sp>
+        <p:nvSpPr>
+          <p:cNvPr id="3" name="Text Placeholder 2">
+            <a:extLst>
+              <a:ext uri="{FF2B5EF4-FFF2-40B4-BE49-F238E27FC236}">
+                <a16:creationId xmlns:a16="http://schemas.microsoft.com/office/drawing/2014/main" id="{CB949514-D14A-4F9F-9BD9-641BD8BF8B63}"/>
+              </a:ext>
+            </a:extLst>
+          </p:cNvPr>
+          <p:cNvSpPr>
+            <a:spLocks noGrp="1"/>
+          </p:cNvSpPr>
+          <p:nvPr>
+            <p:ph type="body" sz="quarter" idx="11"/>
+          </p:nvPr>
+        </p:nvSpPr>
+        <p:spPr/>
+        <p:txBody>
+          <a:bodyPr/>
+          <a:lstStyle/>
+          <a:p>
+            <a:r>
+              <a:rPr lang="en-US" dirty="0"/>
+              <a:t>Implement in MATLAB, make use of high-quality GUI environment</a:t>
+            </a:r>
+          </a:p>
+          <a:p>
+            <a:r>
+              <a:rPr lang="en-US" dirty="0"/>
+              <a:t>Focus on resiliency throughout node movement (broken links, etc.)</a:t>
+            </a:r>
+          </a:p>
+          <a:p>
+            <a:r>
+              <a:rPr lang="en-US" dirty="0"/>
+              <a:t>Serve as more of a demonstration tool rather than an in-depth simulation</a:t>
+            </a:r>
+          </a:p>
+          <a:p>
+            <a:r>
+              <a:rPr lang="en-US" dirty="0"/>
+              <a:t>Focus on showing step-by-step progress </a:t>
+            </a:r>
+            <a:r>
+              <a:rPr lang="en-US"/>
+              <a:t>of algorithm</a:t>
+            </a:r>
+            <a:endParaRPr lang="en-US" dirty="0"/>
+          </a:p>
+        </p:txBody>
+      </p:sp>
+    </p:spTree>
+    <p:extLst>
+      <p:ext uri="{BB962C8B-B14F-4D97-AF65-F5344CB8AC3E}">
+        <p14:creationId xmlns:p14="http://schemas.microsoft.com/office/powerpoint/2010/main" val="1746524136"/>
+      </p:ext>
+    </p:extLst>
+  </p:cSld>
+  <p:clrMapOvr>
+    <a:masterClrMapping/>
+  </p:clrMapOvr>
+</p:sld>
+</file>
+
+<file path=ppt/slides/slide7.xml><?xml version="1.0" encoding="utf-8"?>
+<p:sld xmlns:a="http://schemas.openxmlformats.org/drawingml/2006/main" xmlns:r="http://schemas.openxmlformats.org/officeDocument/2006/relationships" xmlns:p="http://schemas.openxmlformats.org/presentationml/2006/main">
+  <p:cSld>
+    <p:spTree>
+      <p:nvGrpSpPr>
+        <p:cNvPr id="1" name=""/>
+        <p:cNvGrpSpPr/>
+        <p:nvPr/>
+      </p:nvGrpSpPr>
+      <p:grpSpPr>
+        <a:xfrm>
+          <a:off x="0" y="0"/>
+          <a:ext cx="0" cy="0"/>
+          <a:chOff x="0" y="0"/>
+          <a:chExt cx="0" cy="0"/>
+        </a:xfrm>
+      </p:grpSpPr>
+      <p:sp>
+        <p:nvSpPr>
           <p:cNvPr id="2" name="Text Placeholder 1"/>
           <p:cNvSpPr>
             <a:spLocks noGrp="1"/>
@@ -8898,7 +9234,7 @@
 </p:sld>
 </file>
 
-<file path=ppt/slides/slide7.xml><?xml version="1.0" encoding="utf-8"?>
+<file path=ppt/slides/slide8.xml><?xml version="1.0" encoding="utf-8"?>
 <p:sld xmlns:a="http://schemas.openxmlformats.org/drawingml/2006/main" xmlns:r="http://schemas.openxmlformats.org/officeDocument/2006/relationships" xmlns:p="http://schemas.openxmlformats.org/presentationml/2006/main">
   <p:cSld>
     <p:spTree>
@@ -9184,7 +9520,7 @@
 </p:sld>
 </file>
 
-<file path=ppt/slides/slide8.xml><?xml version="1.0" encoding="utf-8"?>
+<file path=ppt/slides/slide9.xml><?xml version="1.0" encoding="utf-8"?>
 <p:sld xmlns:a="http://schemas.openxmlformats.org/drawingml/2006/main" xmlns:r="http://schemas.openxmlformats.org/officeDocument/2006/relationships" xmlns:p="http://schemas.openxmlformats.org/presentationml/2006/main">
   <p:cSld>
     <p:spTree>
@@ -9328,232 +9664,6 @@
     <p:extLst>
       <p:ext uri="{BB962C8B-B14F-4D97-AF65-F5344CB8AC3E}">
         <p14:creationId xmlns:p14="http://schemas.microsoft.com/office/powerpoint/2010/main" val="2462945653"/>
-      </p:ext>
-    </p:extLst>
-  </p:cSld>
-  <p:clrMapOvr>
-    <a:masterClrMapping/>
-  </p:clrMapOvr>
-</p:sld>
-</file>
-
-<file path=ppt/slides/slide9.xml><?xml version="1.0" encoding="utf-8"?>
-<p:sld xmlns:a="http://schemas.openxmlformats.org/drawingml/2006/main" xmlns:r="http://schemas.openxmlformats.org/officeDocument/2006/relationships" xmlns:p="http://schemas.openxmlformats.org/presentationml/2006/main">
-  <p:cSld>
-    <p:spTree>
-      <p:nvGrpSpPr>
-        <p:cNvPr id="1" name=""/>
-        <p:cNvGrpSpPr/>
-        <p:nvPr/>
-      </p:nvGrpSpPr>
-      <p:grpSpPr>
-        <a:xfrm>
-          <a:off x="0" y="0"/>
-          <a:ext cx="0" cy="0"/>
-          <a:chOff x="0" y="0"/>
-          <a:chExt cx="0" cy="0"/>
-        </a:xfrm>
-      </p:grpSpPr>
-      <p:sp>
-        <p:nvSpPr>
-          <p:cNvPr id="2" name="Text Placeholder 1">
-            <a:extLst>
-              <a:ext uri="{FF2B5EF4-FFF2-40B4-BE49-F238E27FC236}">
-                <a16:creationId xmlns:a16="http://schemas.microsoft.com/office/drawing/2014/main" id="{ADFB35E9-CC85-4222-B528-A8EC5746E9C3}"/>
-              </a:ext>
-            </a:extLst>
-          </p:cNvPr>
-          <p:cNvSpPr>
-            <a:spLocks noGrp="1"/>
-          </p:cNvSpPr>
-          <p:nvPr>
-            <p:ph type="body" sz="quarter" idx="10"/>
-          </p:nvPr>
-        </p:nvSpPr>
-        <p:spPr/>
-        <p:txBody>
-          <a:bodyPr/>
-          <a:lstStyle/>
-          <a:p>
-            <a:pPr algn="ctr"/>
-            <a:r>
-              <a:rPr lang="en-US" dirty="0"/>
-              <a:t>Example 2</a:t>
-            </a:r>
-          </a:p>
-        </p:txBody>
-      </p:sp>
-      <p:sp>
-        <p:nvSpPr>
-          <p:cNvPr id="3" name="Text Placeholder 2">
-            <a:extLst>
-              <a:ext uri="{FF2B5EF4-FFF2-40B4-BE49-F238E27FC236}">
-                <a16:creationId xmlns:a16="http://schemas.microsoft.com/office/drawing/2014/main" id="{CAE15260-3969-4A3E-93CB-F0D1C7E8B4FA}"/>
-              </a:ext>
-            </a:extLst>
-          </p:cNvPr>
-          <p:cNvSpPr>
-            <a:spLocks noGrp="1"/>
-          </p:cNvSpPr>
-          <p:nvPr>
-            <p:ph type="body" sz="quarter" idx="11"/>
-          </p:nvPr>
-        </p:nvSpPr>
-        <p:spPr>
-          <a:xfrm>
-            <a:off x="2674619" y="1022633"/>
-            <a:ext cx="6180895" cy="3291536"/>
-          </a:xfrm>
-        </p:spPr>
-        <p:txBody>
-          <a:bodyPr/>
-          <a:lstStyle/>
-          <a:p>
-            <a:pPr lvl="1"/>
-            <a:r>
-              <a:rPr lang="en-US" dirty="0"/>
-              <a:t>Sending node C -&gt; G</a:t>
-            </a:r>
-          </a:p>
-          <a:p>
-            <a:pPr lvl="1"/>
-            <a:r>
-              <a:rPr lang="en-US" dirty="0"/>
-              <a:t>Intermediates nodes have route info from Ex. 1</a:t>
-            </a:r>
-          </a:p>
-          <a:p>
-            <a:r>
-              <a:rPr lang="en-US" dirty="0"/>
-              <a:t>C floods with </a:t>
-            </a:r>
-            <a:r>
-              <a:rPr lang="en-US" b="1" dirty="0">
-                <a:solidFill>
-                  <a:srgbClr val="00B0F0"/>
-                </a:solidFill>
-                <a:effectLst>
-                  <a:outerShdw blurRad="38100" dist="38100" dir="2700000" algn="tl">
-                    <a:srgbClr val="000000">
-                      <a:alpha val="43137"/>
-                    </a:srgbClr>
-                  </a:outerShdw>
-                </a:effectLst>
-              </a:rPr>
-              <a:t>RREQ</a:t>
-            </a:r>
-            <a:endParaRPr lang="en-US" dirty="0"/>
-          </a:p>
-          <a:p>
-            <a:r>
-              <a:rPr lang="en-US" dirty="0"/>
-              <a:t>D,A,&amp;G all reply with </a:t>
-            </a:r>
-            <a:r>
-              <a:rPr lang="en-US" b="1" dirty="0">
-                <a:solidFill>
-                  <a:srgbClr val="0202BE"/>
-                </a:solidFill>
-                <a:effectLst>
-                  <a:outerShdw blurRad="38100" dist="38100" dir="2700000" algn="tl">
-                    <a:srgbClr val="000000">
-                      <a:alpha val="43137"/>
-                    </a:srgbClr>
-                  </a:outerShdw>
-                </a:effectLst>
-              </a:rPr>
-              <a:t>RREPL</a:t>
-            </a:r>
-          </a:p>
-          <a:p>
-            <a:r>
-              <a:rPr lang="en-US" dirty="0"/>
-              <a:t>C picks reply with smallest hop count to destination</a:t>
-            </a:r>
-          </a:p>
-          <a:p>
-            <a:r>
-              <a:rPr lang="en-US" b="1" dirty="0">
-                <a:solidFill>
-                  <a:srgbClr val="5FDF41"/>
-                </a:solidFill>
-                <a:effectLst>
-                  <a:outerShdw blurRad="38100" dist="38100" dir="2700000" algn="tl">
-                    <a:srgbClr val="000000">
-                      <a:alpha val="43137"/>
-                    </a:srgbClr>
-                  </a:outerShdw>
-                </a:effectLst>
-              </a:rPr>
-              <a:t>Data</a:t>
-            </a:r>
-            <a:r>
-              <a:rPr lang="en-US" dirty="0"/>
-              <a:t> sent once route established</a:t>
-            </a:r>
-            <a:endParaRPr lang="en-US" b="1" dirty="0">
-              <a:solidFill>
-                <a:srgbClr val="0202BE"/>
-              </a:solidFill>
-              <a:effectLst>
-                <a:outerShdw blurRad="38100" dist="38100" dir="2700000" algn="tl">
-                  <a:srgbClr val="000000">
-                    <a:alpha val="43137"/>
-                  </a:srgbClr>
-                </a:outerShdw>
-              </a:effectLst>
-            </a:endParaRPr>
-          </a:p>
-          <a:p>
-            <a:endParaRPr lang="en-US" b="1" dirty="0">
-              <a:solidFill>
-                <a:srgbClr val="0202BE"/>
-              </a:solidFill>
-              <a:effectLst>
-                <a:outerShdw blurRad="38100" dist="38100" dir="2700000" algn="tl">
-                  <a:srgbClr val="000000">
-                    <a:alpha val="43137"/>
-                  </a:srgbClr>
-                </a:outerShdw>
-              </a:effectLst>
-            </a:endParaRPr>
-          </a:p>
-        </p:txBody>
-      </p:sp>
-      <p:pic>
-        <p:nvPicPr>
-          <p:cNvPr id="5" name="Picture 4">
-            <a:extLst>
-              <a:ext uri="{FF2B5EF4-FFF2-40B4-BE49-F238E27FC236}">
-                <a16:creationId xmlns:a16="http://schemas.microsoft.com/office/drawing/2014/main" id="{058EA78E-9682-4C8B-B352-BE12CC01E24C}"/>
-              </a:ext>
-            </a:extLst>
-          </p:cNvPr>
-          <p:cNvPicPr>
-            <a:picLocks noChangeAspect="1"/>
-          </p:cNvPicPr>
-          <p:nvPr/>
-        </p:nvPicPr>
-        <p:blipFill>
-          <a:blip r:embed="rId2"/>
-          <a:stretch>
-            <a:fillRect/>
-          </a:stretch>
-        </p:blipFill>
-        <p:spPr>
-          <a:xfrm>
-            <a:off x="758788" y="1872140"/>
-            <a:ext cx="1828800" cy="1592521"/>
-          </a:xfrm>
-          <a:prstGeom prst="rect">
-            <a:avLst/>
-          </a:prstGeom>
-        </p:spPr>
-      </p:pic>
-    </p:spTree>
-    <p:extLst>
-      <p:ext uri="{BB962C8B-B14F-4D97-AF65-F5344CB8AC3E}">
-        <p14:creationId xmlns:p14="http://schemas.microsoft.com/office/powerpoint/2010/main" val="2786245967"/>
       </p:ext>
     </p:extLst>
   </p:cSld>

</xml_diff>

<commit_message>
Fixed agenda label in presentation.
</commit_message>
<xml_diff>
--- a/doc/presentation.pptx
+++ b/doc/presentation.pptx
@@ -244,7 +244,7 @@
           <a:p>
             <a:fld id="{8258EE4D-8A6D-FE43-9221-048F51E281B9}" type="datetimeFigureOut">
               <a:rPr lang="en-US" smtClean="0"/>
-              <a:t>4/29/2018</a:t>
+              <a:t>4/30/2018</a:t>
             </a:fld>
             <a:endParaRPr lang="en-US"/>
           </a:p>
@@ -6224,8 +6224,11 @@
           <a:p>
             <a:r>
               <a:rPr lang="en-US" dirty="0"/>
-              <a:t>FONTS</a:t>
-            </a:r>
+              <a:t>Agenda</a:t>
+            </a:r>
+          </a:p>
+          <a:p>
+            <a:endParaRPr lang="en-US" dirty="0"/>
           </a:p>
         </p:txBody>
       </p:sp>
@@ -6741,7 +6744,7 @@
           <a:p>
             <a:r>
               <a:rPr lang="en-US" dirty="0"/>
-              <a:t>FONTS</a:t>
+              <a:t>Agenda</a:t>
             </a:r>
           </a:p>
         </p:txBody>
@@ -7844,8 +7847,11 @@
           <a:p>
             <a:r>
               <a:rPr lang="en-US" dirty="0"/>
-              <a:t>FONTS</a:t>
-            </a:r>
+              <a:t>Agenda</a:t>
+            </a:r>
+          </a:p>
+          <a:p>
+            <a:endParaRPr lang="en-US" dirty="0"/>
           </a:p>
         </p:txBody>
       </p:sp>
@@ -8253,8 +8259,11 @@
           <a:p>
             <a:r>
               <a:rPr lang="en-US" dirty="0"/>
-              <a:t>FONTS</a:t>
-            </a:r>
+              <a:t>Agenda</a:t>
+            </a:r>
+          </a:p>
+          <a:p>
+            <a:endParaRPr lang="en-US" dirty="0"/>
           </a:p>
         </p:txBody>
       </p:sp>
@@ -9216,8 +9225,11 @@
           <a:p>
             <a:r>
               <a:rPr lang="en-US" dirty="0"/>
-              <a:t>FONTS</a:t>
-            </a:r>
+              <a:t>Agenda</a:t>
+            </a:r>
+          </a:p>
+          <a:p>
+            <a:endParaRPr lang="en-US" dirty="0"/>
           </a:p>
         </p:txBody>
       </p:sp>

</xml_diff>